<commit_message>
Linux- Socket, IPC updated
Linux- Socket, IPC updated
</commit_message>
<xml_diff>
--- a/DataStructure/Project/Doc/Text Indexing.pptx
+++ b/DataStructure/Project/Doc/Text Indexing.pptx
@@ -2,33 +2,23 @@
 <file path=ppt/presentation.xml><?xml version="1.0" encoding="utf-8"?>
 <p:presentation xmlns:a="http://schemas.openxmlformats.org/drawingml/2006/main" xmlns:r="http://schemas.openxmlformats.org/officeDocument/2006/relationships" xmlns:p="http://schemas.openxmlformats.org/presentationml/2006/main" saveSubsetFonts="1">
   <p:sldMasterIdLst>
-    <p:sldMasterId id="2147483648" r:id="rId1"/>
+    <p:sldMasterId id="2147483660" r:id="rId1"/>
   </p:sldMasterIdLst>
   <p:notesMasterIdLst>
-    <p:notesMasterId r:id="rId23"/>
+    <p:notesMasterId r:id="rId13"/>
   </p:notesMasterIdLst>
   <p:sldIdLst>
     <p:sldId id="256" r:id="rId2"/>
     <p:sldId id="257" r:id="rId3"/>
     <p:sldId id="258" r:id="rId4"/>
     <p:sldId id="277" r:id="rId5"/>
-    <p:sldId id="263" r:id="rId6"/>
-    <p:sldId id="264" r:id="rId7"/>
-    <p:sldId id="266" r:id="rId8"/>
-    <p:sldId id="265" r:id="rId9"/>
-    <p:sldId id="267" r:id="rId10"/>
-    <p:sldId id="268" r:id="rId11"/>
-    <p:sldId id="269" r:id="rId12"/>
-    <p:sldId id="271" r:id="rId13"/>
-    <p:sldId id="272" r:id="rId14"/>
-    <p:sldId id="270" r:id="rId15"/>
-    <p:sldId id="273" r:id="rId16"/>
-    <p:sldId id="274" r:id="rId17"/>
-    <p:sldId id="260" r:id="rId18"/>
-    <p:sldId id="261" r:id="rId19"/>
-    <p:sldId id="275" r:id="rId20"/>
-    <p:sldId id="276" r:id="rId21"/>
-    <p:sldId id="259" r:id="rId22"/>
+    <p:sldId id="265" r:id="rId6"/>
+    <p:sldId id="267" r:id="rId7"/>
+    <p:sldId id="260" r:id="rId8"/>
+    <p:sldId id="261" r:id="rId9"/>
+    <p:sldId id="275" r:id="rId10"/>
+    <p:sldId id="276" r:id="rId11"/>
+    <p:sldId id="259" r:id="rId12"/>
   </p:sldIdLst>
   <p:sldSz cx="9144000" cy="6858000" type="screen4x3"/>
   <p:notesSz cx="6858000" cy="9144000"/>
@@ -212,7 +202,7 @@
           <a:p>
             <a:fld id="{0A500800-A406-42F4-92F8-71DA571B8C6E}" type="datetimeFigureOut">
               <a:rPr lang="en-US" smtClean="0"/>
-              <a:t>5/29/2016</a:t>
+              <a:t>6/14/2016</a:t>
             </a:fld>
             <a:endParaRPr lang="en-US"/>
           </a:p>
@@ -593,19 +583,30 @@
         </p:nvSpPr>
         <p:spPr>
           <a:xfrm>
-            <a:off x="685800" y="2130425"/>
-            <a:ext cx="7772400" cy="1470025"/>
+            <a:off x="685800" y="1905000"/>
+            <a:ext cx="7543800" cy="2593975"/>
           </a:xfrm>
         </p:spPr>
         <p:txBody>
-          <a:bodyPr/>
-          <a:lstStyle/>
+          <a:bodyPr anchor="b"/>
+          <a:lstStyle>
+            <a:lvl1pPr>
+              <a:defRPr sz="6600">
+                <a:ln>
+                  <a:noFill/>
+                </a:ln>
+                <a:solidFill>
+                  <a:schemeClr val="tx2"/>
+                </a:solidFill>
+              </a:defRPr>
+            </a:lvl1pPr>
+          </a:lstStyle>
           <a:p>
             <a:r>
               <a:rPr lang="en-US" smtClean="0"/>
               <a:t>Click to edit Master title style</a:t>
             </a:r>
-            <a:endParaRPr lang="en-US"/>
+            <a:endParaRPr lang="en-US" dirty="0"/>
           </a:p>
         </p:txBody>
       </p:sp>
@@ -621,16 +622,18 @@
         </p:nvSpPr>
         <p:spPr>
           <a:xfrm>
-            <a:off x="1371600" y="3886200"/>
-            <a:ext cx="6400800" cy="1752600"/>
+            <a:off x="685800" y="4572000"/>
+            <a:ext cx="6461760" cy="1066800"/>
           </a:xfrm>
         </p:spPr>
         <p:txBody>
-          <a:bodyPr/>
+          <a:bodyPr anchor="t">
+            <a:normAutofit/>
+          </a:bodyPr>
           <a:lstStyle>
-            <a:lvl1pPr marL="0" indent="0" algn="ctr">
-              <a:buNone/>
-              <a:defRPr>
+            <a:lvl1pPr marL="0" indent="0" algn="l">
+              <a:buNone/>
+              <a:defRPr sz="2000">
                 <a:solidFill>
                   <a:schemeClr val="tx1">
                     <a:tint val="75000"/>
@@ -724,7 +727,7 @@
               <a:rPr lang="en-US" smtClean="0"/>
               <a:t>Click to edit Master subtitle style</a:t>
             </a:r>
-            <a:endParaRPr lang="en-US"/>
+            <a:endParaRPr lang="en-US" dirty="0"/>
           </a:p>
         </p:txBody>
       </p:sp>
@@ -746,7 +749,7 @@
             <a:fld id="{1D8BD707-D9CF-40AE-B4C6-C98DA3205C09}" type="datetimeFigureOut">
               <a:rPr lang="en-US" smtClean="0"/>
               <a:pPr/>
-              <a:t>5/29/2016</a:t>
+              <a:t>6/14/2016</a:t>
             </a:fld>
             <a:endParaRPr lang="en-US"/>
           </a:p>
@@ -913,7 +916,7 @@
             <a:fld id="{1D8BD707-D9CF-40AE-B4C6-C98DA3205C09}" type="datetimeFigureOut">
               <a:rPr lang="en-US" smtClean="0"/>
               <a:pPr/>
-              <a:t>5/29/2016</a:t>
+              <a:t>6/14/2016</a:t>
             </a:fld>
             <a:endParaRPr lang="en-US"/>
           </a:p>
@@ -1000,18 +1003,18 @@
         <p:spPr>
           <a:xfrm>
             <a:off x="6629400" y="274638"/>
-            <a:ext cx="2057400" cy="5851525"/>
+            <a:ext cx="1752600" cy="5851525"/>
           </a:xfrm>
         </p:spPr>
         <p:txBody>
-          <a:bodyPr vert="eaVert"/>
+          <a:bodyPr vert="eaVert" anchor="b" anchorCtr="0"/>
           <a:lstStyle/>
           <a:p>
             <a:r>
               <a:rPr lang="en-US" smtClean="0"/>
               <a:t>Click to edit Master title style</a:t>
             </a:r>
-            <a:endParaRPr lang="en-US"/>
+            <a:endParaRPr lang="en-US" dirty="0"/>
           </a:p>
         </p:txBody>
       </p:sp>
@@ -1090,7 +1093,7 @@
             <a:fld id="{1D8BD707-D9CF-40AE-B4C6-C98DA3205C09}" type="datetimeFigureOut">
               <a:rPr lang="en-US" smtClean="0"/>
               <a:pPr/>
-              <a:t>5/29/2016</a:t>
+              <a:t>6/14/2016</a:t>
             </a:fld>
             <a:endParaRPr lang="en-US"/>
           </a:p>
@@ -1257,7 +1260,7 @@
             <a:fld id="{1D8BD707-D9CF-40AE-B4C6-C98DA3205C09}" type="datetimeFigureOut">
               <a:rPr lang="en-US" smtClean="0"/>
               <a:pPr/>
-              <a:t>5/29/2016</a:t>
+              <a:t>6/14/2016</a:t>
             </a:fld>
             <a:endParaRPr lang="en-US"/>
           </a:p>
@@ -1343,15 +1346,15 @@
         </p:nvSpPr>
         <p:spPr>
           <a:xfrm>
-            <a:off x="722313" y="4406900"/>
-            <a:ext cx="7772400" cy="1362075"/>
+            <a:off x="722313" y="5486400"/>
+            <a:ext cx="7659687" cy="1168400"/>
           </a:xfrm>
         </p:spPr>
         <p:txBody>
           <a:bodyPr anchor="t"/>
           <a:lstStyle>
             <a:lvl1pPr algn="l">
-              <a:defRPr sz="4000" b="1" cap="all"/>
+              <a:defRPr sz="3600" b="0" cap="all"/>
             </a:lvl1pPr>
           </a:lstStyle>
           <a:p>
@@ -1359,7 +1362,7 @@
               <a:rPr lang="en-US" smtClean="0"/>
               <a:t>Click to edit Master title style</a:t>
             </a:r>
-            <a:endParaRPr lang="en-US"/>
+            <a:endParaRPr lang="en-US" dirty="0"/>
           </a:p>
         </p:txBody>
       </p:sp>
@@ -1375,8 +1378,8 @@
         </p:nvSpPr>
         <p:spPr>
           <a:xfrm>
-            <a:off x="722313" y="2906713"/>
-            <a:ext cx="7772400" cy="1500187"/>
+            <a:off x="722313" y="3852863"/>
+            <a:ext cx="6135687" cy="1633538"/>
           </a:xfrm>
         </p:spPr>
         <p:txBody>
@@ -1500,7 +1503,7 @@
             <a:fld id="{1D8BD707-D9CF-40AE-B4C6-C98DA3205C09}" type="datetimeFigureOut">
               <a:rPr lang="en-US" smtClean="0"/>
               <a:pPr/>
-              <a:t>5/29/2016</a:t>
+              <a:t>6/14/2016</a:t>
             </a:fld>
             <a:endParaRPr lang="en-US"/>
           </a:p>
@@ -1609,8 +1612,8 @@
         </p:nvSpPr>
         <p:spPr>
           <a:xfrm>
-            <a:off x="457200" y="1600200"/>
-            <a:ext cx="4038600" cy="4525963"/>
+            <a:off x="457200" y="1536192"/>
+            <a:ext cx="3657600" cy="4590288"/>
           </a:xfrm>
         </p:spPr>
         <p:txBody>
@@ -1678,7 +1681,7 @@
               <a:rPr lang="en-US" smtClean="0"/>
               <a:t>Fifth level</a:t>
             </a:r>
-            <a:endParaRPr lang="en-US"/>
+            <a:endParaRPr lang="en-US" dirty="0"/>
           </a:p>
         </p:txBody>
       </p:sp>
@@ -1694,8 +1697,8 @@
         </p:nvSpPr>
         <p:spPr>
           <a:xfrm>
-            <a:off x="4648200" y="1600200"/>
-            <a:ext cx="4038600" cy="4525963"/>
+            <a:off x="4419600" y="1536192"/>
+            <a:ext cx="3657600" cy="4590288"/>
           </a:xfrm>
         </p:spPr>
         <p:txBody>
@@ -1763,7 +1766,7 @@
               <a:rPr lang="en-US" smtClean="0"/>
               <a:t>Fifth level</a:t>
             </a:r>
-            <a:endParaRPr lang="en-US"/>
+            <a:endParaRPr lang="en-US" dirty="0"/>
           </a:p>
         </p:txBody>
       </p:sp>
@@ -1785,7 +1788,7 @@
             <a:fld id="{1D8BD707-D9CF-40AE-B4C6-C98DA3205C09}" type="datetimeFigureOut">
               <a:rPr lang="en-US" smtClean="0"/>
               <a:pPr/>
-              <a:t>5/29/2016</a:t>
+              <a:t>6/14/2016</a:t>
             </a:fld>
             <a:endParaRPr lang="en-US"/>
           </a:p>
@@ -1899,15 +1902,21 @@
         <p:spPr>
           <a:xfrm>
             <a:off x="457200" y="1535113"/>
-            <a:ext cx="4040188" cy="639762"/>
+            <a:ext cx="3657600" cy="639762"/>
           </a:xfrm>
         </p:spPr>
         <p:txBody>
-          <a:bodyPr anchor="b"/>
+          <a:bodyPr anchor="b">
+            <a:noAutofit/>
+          </a:bodyPr>
           <a:lstStyle>
-            <a:lvl1pPr marL="0" indent="0">
-              <a:buNone/>
-              <a:defRPr sz="2400" b="1"/>
+            <a:lvl1pPr marL="0" indent="0" algn="ctr">
+              <a:buNone/>
+              <a:defRPr sz="2000" b="1">
+                <a:solidFill>
+                  <a:schemeClr val="tx2"/>
+                </a:solidFill>
+              </a:defRPr>
             </a:lvl1pPr>
             <a:lvl2pPr marL="457200" indent="0">
               <a:buNone/>
@@ -1964,7 +1973,7 @@
         <p:spPr>
           <a:xfrm>
             <a:off x="457200" y="2174875"/>
-            <a:ext cx="4040188" cy="3951288"/>
+            <a:ext cx="3657600" cy="3951288"/>
           </a:xfrm>
         </p:spPr>
         <p:txBody>
@@ -2032,7 +2041,7 @@
               <a:rPr lang="en-US" smtClean="0"/>
               <a:t>Fifth level</a:t>
             </a:r>
-            <a:endParaRPr lang="en-US"/>
+            <a:endParaRPr lang="en-US" dirty="0"/>
           </a:p>
         </p:txBody>
       </p:sp>
@@ -2048,16 +2057,22 @@
         </p:nvSpPr>
         <p:spPr>
           <a:xfrm>
-            <a:off x="4645025" y="1535113"/>
-            <a:ext cx="4041775" cy="639762"/>
+            <a:off x="4419600" y="1535113"/>
+            <a:ext cx="3657600" cy="639762"/>
           </a:xfrm>
         </p:spPr>
         <p:txBody>
-          <a:bodyPr anchor="b"/>
+          <a:bodyPr anchor="b">
+            <a:noAutofit/>
+          </a:bodyPr>
           <a:lstStyle>
-            <a:lvl1pPr marL="0" indent="0">
-              <a:buNone/>
-              <a:defRPr sz="2400" b="1"/>
+            <a:lvl1pPr marL="0" indent="0" algn="ctr">
+              <a:buNone/>
+              <a:defRPr sz="2000" b="1">
+                <a:solidFill>
+                  <a:schemeClr val="tx2"/>
+                </a:solidFill>
+              </a:defRPr>
             </a:lvl1pPr>
             <a:lvl2pPr marL="457200" indent="0">
               <a:buNone/>
@@ -2113,8 +2128,8 @@
         </p:nvSpPr>
         <p:spPr>
           <a:xfrm>
-            <a:off x="4645025" y="2174875"/>
-            <a:ext cx="4041775" cy="3951288"/>
+            <a:off x="4419600" y="2174875"/>
+            <a:ext cx="3657600" cy="3951288"/>
           </a:xfrm>
         </p:spPr>
         <p:txBody>
@@ -2204,7 +2219,7 @@
             <a:fld id="{1D8BD707-D9CF-40AE-B4C6-C98DA3205C09}" type="datetimeFigureOut">
               <a:rPr lang="en-US" smtClean="0"/>
               <a:pPr/>
-              <a:t>5/29/2016</a:t>
+              <a:t>6/14/2016</a:t>
             </a:fld>
             <a:endParaRPr lang="en-US"/>
           </a:p>
@@ -2319,7 +2334,7 @@
             <a:fld id="{1D8BD707-D9CF-40AE-B4C6-C98DA3205C09}" type="datetimeFigureOut">
               <a:rPr lang="en-US" smtClean="0"/>
               <a:pPr/>
-              <a:t>5/29/2016</a:t>
+              <a:t>6/14/2016</a:t>
             </a:fld>
             <a:endParaRPr lang="en-US"/>
           </a:p>
@@ -2411,7 +2426,7 @@
             <a:fld id="{1D8BD707-D9CF-40AE-B4C6-C98DA3205C09}" type="datetimeFigureOut">
               <a:rPr lang="en-US" smtClean="0"/>
               <a:pPr/>
-              <a:t>5/29/2016</a:t>
+              <a:t>6/14/2016</a:t>
             </a:fld>
             <a:endParaRPr lang="en-US"/>
           </a:p>
@@ -2497,15 +2512,15 @@
         </p:nvSpPr>
         <p:spPr>
           <a:xfrm>
-            <a:off x="457200" y="273050"/>
-            <a:ext cx="3008313" cy="1162050"/>
+            <a:off x="304801" y="5495544"/>
+            <a:ext cx="7772400" cy="594360"/>
           </a:xfrm>
         </p:spPr>
         <p:txBody>
           <a:bodyPr anchor="b"/>
           <a:lstStyle>
-            <a:lvl1pPr algn="l">
-              <a:defRPr sz="2000" b="1"/>
+            <a:lvl1pPr algn="ctr">
+              <a:defRPr sz="2200" b="1"/>
             </a:lvl1pPr>
           </a:lstStyle>
           <a:p>
@@ -2513,117 +2528,34 @@
               <a:rPr lang="en-US" smtClean="0"/>
               <a:t>Click to edit Master title style</a:t>
             </a:r>
-            <a:endParaRPr lang="en-US"/>
-          </a:p>
-        </p:txBody>
-      </p:sp>
-      <p:sp>
-        <p:nvSpPr>
-          <p:cNvPr id="3" name="Content Placeholder 2"/>
-          <p:cNvSpPr>
-            <a:spLocks noGrp="1"/>
-          </p:cNvSpPr>
-          <p:nvPr>
-            <p:ph idx="1"/>
+            <a:endParaRPr lang="en-US" dirty="0"/>
+          </a:p>
+        </p:txBody>
+      </p:sp>
+      <p:sp>
+        <p:nvSpPr>
+          <p:cNvPr id="4" name="Text Placeholder 3"/>
+          <p:cNvSpPr>
+            <a:spLocks noGrp="1"/>
+          </p:cNvSpPr>
+          <p:nvPr>
+            <p:ph type="body" sz="half" idx="2"/>
           </p:nvPr>
         </p:nvSpPr>
         <p:spPr>
           <a:xfrm>
-            <a:off x="3575050" y="273050"/>
-            <a:ext cx="5111750" cy="5853113"/>
+            <a:off x="304799" y="6096000"/>
+            <a:ext cx="7772401" cy="609600"/>
           </a:xfrm>
         </p:spPr>
         <p:txBody>
-          <a:bodyPr/>
+          <a:bodyPr>
+            <a:normAutofit/>
+          </a:bodyPr>
           <a:lstStyle>
-            <a:lvl1pPr>
-              <a:defRPr sz="3200"/>
-            </a:lvl1pPr>
-            <a:lvl2pPr>
-              <a:defRPr sz="2800"/>
-            </a:lvl2pPr>
-            <a:lvl3pPr>
-              <a:defRPr sz="2400"/>
-            </a:lvl3pPr>
-            <a:lvl4pPr>
-              <a:defRPr sz="2000"/>
-            </a:lvl4pPr>
-            <a:lvl5pPr>
-              <a:defRPr sz="2000"/>
-            </a:lvl5pPr>
-            <a:lvl6pPr>
-              <a:defRPr sz="2000"/>
-            </a:lvl6pPr>
-            <a:lvl7pPr>
-              <a:defRPr sz="2000"/>
-            </a:lvl7pPr>
-            <a:lvl8pPr>
-              <a:defRPr sz="2000"/>
-            </a:lvl8pPr>
-            <a:lvl9pPr>
-              <a:defRPr sz="2000"/>
-            </a:lvl9pPr>
-          </a:lstStyle>
-          <a:p>
-            <a:pPr lvl="0"/>
-            <a:r>
-              <a:rPr lang="en-US" smtClean="0"/>
-              <a:t>Click to edit Master text styles</a:t>
-            </a:r>
-          </a:p>
-          <a:p>
-            <a:pPr lvl="1"/>
-            <a:r>
-              <a:rPr lang="en-US" smtClean="0"/>
-              <a:t>Second level</a:t>
-            </a:r>
-          </a:p>
-          <a:p>
-            <a:pPr lvl="2"/>
-            <a:r>
-              <a:rPr lang="en-US" smtClean="0"/>
-              <a:t>Third level</a:t>
-            </a:r>
-          </a:p>
-          <a:p>
-            <a:pPr lvl="3"/>
-            <a:r>
-              <a:rPr lang="en-US" smtClean="0"/>
-              <a:t>Fourth level</a:t>
-            </a:r>
-          </a:p>
-          <a:p>
-            <a:pPr lvl="4"/>
-            <a:r>
-              <a:rPr lang="en-US" smtClean="0"/>
-              <a:t>Fifth level</a:t>
-            </a:r>
-            <a:endParaRPr lang="en-US"/>
-          </a:p>
-        </p:txBody>
-      </p:sp>
-      <p:sp>
-        <p:nvSpPr>
-          <p:cNvPr id="4" name="Text Placeholder 3"/>
-          <p:cNvSpPr>
-            <a:spLocks noGrp="1"/>
-          </p:cNvSpPr>
-          <p:nvPr>
-            <p:ph type="body" sz="half" idx="2"/>
-          </p:nvPr>
-        </p:nvSpPr>
-        <p:spPr>
-          <a:xfrm>
-            <a:off x="457200" y="1435100"/>
-            <a:ext cx="3008313" cy="4691063"/>
-          </a:xfrm>
-        </p:spPr>
-        <p:txBody>
-          <a:bodyPr/>
-          <a:lstStyle>
-            <a:lvl1pPr marL="0" indent="0">
-              <a:buNone/>
-              <a:defRPr sz="1400"/>
+            <a:lvl1pPr marL="0" indent="0" algn="ctr">
+              <a:buNone/>
+              <a:defRPr sz="1600"/>
             </a:lvl1pPr>
             <a:lvl2pPr marL="457200" indent="0">
               <a:buNone/>
@@ -2685,7 +2617,7 @@
             <a:fld id="{1D8BD707-D9CF-40AE-B4C6-C98DA3205C09}" type="datetimeFigureOut">
               <a:rPr lang="en-US" smtClean="0"/>
               <a:pPr/>
-              <a:t>5/29/2016</a:t>
+              <a:t>6/14/2016</a:t>
             </a:fld>
             <a:endParaRPr lang="en-US"/>
           </a:p>
@@ -2730,6 +2662,63 @@
               <a:pPr/>
               <a:t>‹#›</a:t>
             </a:fld>
+            <a:endParaRPr lang="en-US"/>
+          </a:p>
+        </p:txBody>
+      </p:sp>
+      <p:sp>
+        <p:nvSpPr>
+          <p:cNvPr id="9" name="Content Placeholder 8"/>
+          <p:cNvSpPr>
+            <a:spLocks noGrp="1"/>
+          </p:cNvSpPr>
+          <p:nvPr>
+            <p:ph sz="quarter" idx="13"/>
+          </p:nvPr>
+        </p:nvSpPr>
+        <p:spPr>
+          <a:xfrm>
+            <a:off x="304800" y="381000"/>
+            <a:ext cx="7772400" cy="4942840"/>
+          </a:xfrm>
+        </p:spPr>
+        <p:txBody>
+          <a:bodyPr/>
+          <a:lstStyle/>
+          <a:p>
+            <a:pPr lvl="0"/>
+            <a:r>
+              <a:rPr lang="en-US" smtClean="0"/>
+              <a:t>Click to edit Master text styles</a:t>
+            </a:r>
+          </a:p>
+          <a:p>
+            <a:pPr lvl="1"/>
+            <a:r>
+              <a:rPr lang="en-US" smtClean="0"/>
+              <a:t>Second level</a:t>
+            </a:r>
+          </a:p>
+          <a:p>
+            <a:pPr lvl="2"/>
+            <a:r>
+              <a:rPr lang="en-US" smtClean="0"/>
+              <a:t>Third level</a:t>
+            </a:r>
+          </a:p>
+          <a:p>
+            <a:pPr lvl="3"/>
+            <a:r>
+              <a:rPr lang="en-US" smtClean="0"/>
+              <a:t>Fourth level</a:t>
+            </a:r>
+          </a:p>
+          <a:p>
+            <a:pPr lvl="4"/>
+            <a:r>
+              <a:rPr lang="en-US" smtClean="0"/>
+              <a:t>Fifth level</a:t>
+            </a:r>
             <a:endParaRPr lang="en-US"/>
           </a:p>
         </p:txBody>
@@ -2771,15 +2760,22 @@
         </p:nvSpPr>
         <p:spPr>
           <a:xfrm>
-            <a:off x="1792288" y="4800600"/>
-            <a:ext cx="5486400" cy="566738"/>
+            <a:off x="301752" y="5495278"/>
+            <a:ext cx="7772400" cy="594626"/>
           </a:xfrm>
         </p:spPr>
         <p:txBody>
           <a:bodyPr anchor="b"/>
           <a:lstStyle>
-            <a:lvl1pPr algn="l">
-              <a:defRPr sz="2000" b="1"/>
+            <a:lvl1pPr algn="ctr">
+              <a:defRPr sz="2200" b="1">
+                <a:ln>
+                  <a:noFill/>
+                </a:ln>
+                <a:solidFill>
+                  <a:schemeClr val="tx2"/>
+                </a:solidFill>
+              </a:defRPr>
             </a:lvl1pPr>
           </a:lstStyle>
           <a:p>
@@ -2787,7 +2783,7 @@
               <a:rPr lang="en-US" smtClean="0"/>
               <a:t>Click to edit Master title style</a:t>
             </a:r>
-            <a:endParaRPr lang="en-US"/>
+            <a:endParaRPr lang="en-US" dirty="0"/>
           </a:p>
         </p:txBody>
       </p:sp>
@@ -2803,8 +2799,8 @@
         </p:nvSpPr>
         <p:spPr>
           <a:xfrm>
-            <a:off x="1792288" y="612775"/>
-            <a:ext cx="5486400" cy="4114800"/>
+            <a:off x="0" y="0"/>
+            <a:ext cx="8458200" cy="5486400"/>
           </a:xfrm>
         </p:spPr>
         <p:txBody>
@@ -2848,7 +2844,11 @@
             </a:lvl9pPr>
           </a:lstStyle>
           <a:p>
-            <a:endParaRPr lang="en-US"/>
+            <a:r>
+              <a:rPr lang="en-US" smtClean="0"/>
+              <a:t>Click icon to add picture</a:t>
+            </a:r>
+            <a:endParaRPr lang="en-US" dirty="0"/>
           </a:p>
         </p:txBody>
       </p:sp>
@@ -2864,16 +2864,18 @@
         </p:nvSpPr>
         <p:spPr>
           <a:xfrm>
-            <a:off x="1792288" y="5367338"/>
-            <a:ext cx="5486400" cy="804862"/>
+            <a:off x="301752" y="6096000"/>
+            <a:ext cx="7772400" cy="612648"/>
           </a:xfrm>
         </p:spPr>
         <p:txBody>
-          <a:bodyPr/>
+          <a:bodyPr>
+            <a:normAutofit/>
+          </a:bodyPr>
           <a:lstStyle>
-            <a:lvl1pPr marL="0" indent="0">
-              <a:buNone/>
-              <a:defRPr sz="1400"/>
+            <a:lvl1pPr marL="0" indent="0" algn="ctr">
+              <a:buNone/>
+              <a:defRPr sz="1600"/>
             </a:lvl1pPr>
             <a:lvl2pPr marL="457200" indent="0">
               <a:buNone/>
@@ -2919,7 +2921,7 @@
       </p:sp>
       <p:sp>
         <p:nvSpPr>
-          <p:cNvPr id="5" name="Date Placeholder 4"/>
+          <p:cNvPr id="8" name="Date Placeholder 7"/>
           <p:cNvSpPr>
             <a:spLocks noGrp="1"/>
           </p:cNvSpPr>
@@ -2935,7 +2937,7 @@
             <a:fld id="{1D8BD707-D9CF-40AE-B4C6-C98DA3205C09}" type="datetimeFigureOut">
               <a:rPr lang="en-US" smtClean="0"/>
               <a:pPr/>
-              <a:t>5/29/2016</a:t>
+              <a:t>6/14/2016</a:t>
             </a:fld>
             <a:endParaRPr lang="en-US"/>
           </a:p>
@@ -2943,31 +2945,12 @@
       </p:sp>
       <p:sp>
         <p:nvSpPr>
-          <p:cNvPr id="6" name="Footer Placeholder 5"/>
-          <p:cNvSpPr>
-            <a:spLocks noGrp="1"/>
-          </p:cNvSpPr>
-          <p:nvPr>
-            <p:ph type="ftr" sz="quarter" idx="11"/>
-          </p:nvPr>
-        </p:nvSpPr>
-        <p:spPr/>
-        <p:txBody>
-          <a:bodyPr/>
-          <a:lstStyle/>
-          <a:p>
-            <a:endParaRPr lang="en-US"/>
-          </a:p>
-        </p:txBody>
-      </p:sp>
-      <p:sp>
-        <p:nvSpPr>
-          <p:cNvPr id="7" name="Slide Number Placeholder 6"/>
-          <p:cNvSpPr>
-            <a:spLocks noGrp="1"/>
-          </p:cNvSpPr>
-          <p:nvPr>
-            <p:ph type="sldNum" sz="quarter" idx="12"/>
+          <p:cNvPr id="9" name="Slide Number Placeholder 8"/>
+          <p:cNvSpPr>
+            <a:spLocks noGrp="1"/>
+          </p:cNvSpPr>
+          <p:nvPr>
+            <p:ph type="sldNum" sz="quarter" idx="11"/>
           </p:nvPr>
         </p:nvSpPr>
         <p:spPr/>
@@ -2980,6 +2963,25 @@
               <a:pPr/>
               <a:t>‹#›</a:t>
             </a:fld>
+            <a:endParaRPr lang="en-US"/>
+          </a:p>
+        </p:txBody>
+      </p:sp>
+      <p:sp>
+        <p:nvSpPr>
+          <p:cNvPr id="10" name="Footer Placeholder 9"/>
+          <p:cNvSpPr>
+            <a:spLocks noGrp="1"/>
+          </p:cNvSpPr>
+          <p:nvPr>
+            <p:ph type="ftr" sz="quarter" idx="12"/>
+          </p:nvPr>
+        </p:nvSpPr>
+        <p:spPr/>
+        <p:txBody>
+          <a:bodyPr/>
+          <a:lstStyle/>
+          <a:p>
             <a:endParaRPr lang="en-US"/>
           </a:p>
         </p:txBody>
@@ -2996,7 +2998,7 @@
 <p:sldMaster xmlns:a="http://schemas.openxmlformats.org/drawingml/2006/main" xmlns:r="http://schemas.openxmlformats.org/officeDocument/2006/relationships" xmlns:p="http://schemas.openxmlformats.org/presentationml/2006/main">
   <p:cSld>
     <p:bg>
-      <p:bgRef idx="1001">
+      <p:bgRef idx="1002">
         <a:schemeClr val="bg1"/>
       </p:bgRef>
     </p:bg>
@@ -3027,7 +3029,7 @@
         <p:spPr>
           <a:xfrm>
             <a:off x="457200" y="274638"/>
-            <a:ext cx="8229600" cy="1143000"/>
+            <a:ext cx="7620000" cy="1143000"/>
           </a:xfrm>
           <a:prstGeom prst="rect">
             <a:avLst/>
@@ -3035,7 +3037,7 @@
         </p:spPr>
         <p:txBody>
           <a:bodyPr vert="horz" lIns="91440" tIns="45720" rIns="91440" bIns="45720" rtlCol="0" anchor="ctr">
-            <a:normAutofit/>
+            <a:noAutofit/>
           </a:bodyPr>
           <a:lstStyle/>
           <a:p>
@@ -3043,7 +3045,7 @@
               <a:rPr lang="en-US" smtClean="0"/>
               <a:t>Click to edit Master title style</a:t>
             </a:r>
-            <a:endParaRPr lang="en-US"/>
+            <a:endParaRPr lang="en-US" dirty="0"/>
           </a:p>
         </p:txBody>
       </p:sp>
@@ -3060,7 +3062,7 @@
         <p:spPr>
           <a:xfrm>
             <a:off x="457200" y="1600200"/>
-            <a:ext cx="8229600" cy="4525963"/>
+            <a:ext cx="7620000" cy="4800600"/>
           </a:xfrm>
           <a:prstGeom prst="rect">
             <a:avLst/>
@@ -3105,24 +3107,163 @@
               <a:rPr lang="en-US" smtClean="0"/>
               <a:t>Fifth level</a:t>
             </a:r>
-            <a:endParaRPr lang="en-US"/>
-          </a:p>
-        </p:txBody>
-      </p:sp>
-      <p:sp>
-        <p:nvSpPr>
-          <p:cNvPr id="4" name="Date Placeholder 3"/>
-          <p:cNvSpPr>
-            <a:spLocks noGrp="1"/>
-          </p:cNvSpPr>
-          <p:nvPr>
-            <p:ph type="dt" sz="half" idx="2"/>
-          </p:nvPr>
+            <a:endParaRPr lang="en-US" dirty="0"/>
+          </a:p>
+        </p:txBody>
+      </p:sp>
+      <p:sp>
+        <p:nvSpPr>
+          <p:cNvPr id="7" name="Rectangle 6"/>
+          <p:cNvSpPr/>
+          <p:nvPr/>
         </p:nvSpPr>
         <p:spPr>
           <a:xfrm>
-            <a:off x="457200" y="6356350"/>
-            <a:ext cx="2133600" cy="365125"/>
+            <a:off x="8458200" y="0"/>
+            <a:ext cx="685800" cy="6858000"/>
+          </a:xfrm>
+          <a:prstGeom prst="rect">
+            <a:avLst/>
+          </a:prstGeom>
+          <a:solidFill>
+            <a:schemeClr val="tx2"/>
+          </a:solidFill>
+          <a:ln>
+            <a:noFill/>
+          </a:ln>
+        </p:spPr>
+        <p:style>
+          <a:lnRef idx="2">
+            <a:schemeClr val="accent1">
+              <a:shade val="50000"/>
+            </a:schemeClr>
+          </a:lnRef>
+          <a:fillRef idx="1">
+            <a:schemeClr val="accent1"/>
+          </a:fillRef>
+          <a:effectRef idx="0">
+            <a:schemeClr val="accent1"/>
+          </a:effectRef>
+          <a:fontRef idx="minor">
+            <a:schemeClr val="lt1"/>
+          </a:fontRef>
+        </p:style>
+        <p:txBody>
+          <a:bodyPr rtlCol="0" anchor="ctr"/>
+          <a:lstStyle/>
+          <a:p>
+            <a:pPr algn="ctr"/>
+            <a:endParaRPr lang="en-US"/>
+          </a:p>
+        </p:txBody>
+      </p:sp>
+      <p:sp>
+        <p:nvSpPr>
+          <p:cNvPr id="8" name="Rectangle 7"/>
+          <p:cNvSpPr/>
+          <p:nvPr/>
+        </p:nvSpPr>
+        <p:spPr>
+          <a:xfrm>
+            <a:off x="8458200" y="5486400"/>
+            <a:ext cx="685800" cy="685800"/>
+          </a:xfrm>
+          <a:prstGeom prst="rect">
+            <a:avLst/>
+          </a:prstGeom>
+          <a:solidFill>
+            <a:schemeClr val="accent1"/>
+          </a:solidFill>
+          <a:ln>
+            <a:noFill/>
+          </a:ln>
+        </p:spPr>
+        <p:style>
+          <a:lnRef idx="2">
+            <a:schemeClr val="accent1">
+              <a:shade val="50000"/>
+            </a:schemeClr>
+          </a:lnRef>
+          <a:fillRef idx="1">
+            <a:schemeClr val="accent1"/>
+          </a:fillRef>
+          <a:effectRef idx="0">
+            <a:schemeClr val="accent1"/>
+          </a:effectRef>
+          <a:fontRef idx="minor">
+            <a:schemeClr val="lt1"/>
+          </a:fontRef>
+        </p:style>
+        <p:txBody>
+          <a:bodyPr rtlCol="0" anchor="ctr"/>
+          <a:lstStyle/>
+          <a:p>
+            <a:pPr algn="ctr"/>
+            <a:endParaRPr lang="en-US"/>
+          </a:p>
+        </p:txBody>
+      </p:sp>
+      <p:sp>
+        <p:nvSpPr>
+          <p:cNvPr id="6" name="Slide Number Placeholder 5"/>
+          <p:cNvSpPr>
+            <a:spLocks noGrp="1"/>
+          </p:cNvSpPr>
+          <p:nvPr>
+            <p:ph type="sldNum" sz="quarter" idx="4"/>
+          </p:nvPr>
+        </p:nvSpPr>
+        <p:spPr>
+          <a:xfrm>
+            <a:off x="8531788" y="5648960"/>
+            <a:ext cx="548640" cy="396240"/>
+          </a:xfrm>
+          <a:prstGeom prst="bracketPair">
+            <a:avLst>
+              <a:gd name="adj" fmla="val 17949"/>
+            </a:avLst>
+          </a:prstGeom>
+          <a:ln w="19050">
+            <a:solidFill>
+              <a:srgbClr val="FFFFFF"/>
+            </a:solidFill>
+          </a:ln>
+        </p:spPr>
+        <p:txBody>
+          <a:bodyPr vert="horz" lIns="0" tIns="0" rIns="0" bIns="0" rtlCol="0" anchor="ctr"/>
+          <a:lstStyle>
+            <a:lvl1pPr algn="ctr">
+              <a:defRPr sz="1800">
+                <a:solidFill>
+                  <a:srgbClr val="FFFFFF"/>
+                </a:solidFill>
+              </a:defRPr>
+            </a:lvl1pPr>
+          </a:lstStyle>
+          <a:p>
+            <a:fld id="{B6F15528-21DE-4FAA-801E-634DDDAF4B2B}" type="slidenum">
+              <a:rPr lang="en-US" smtClean="0"/>
+              <a:pPr/>
+              <a:t>‹#›</a:t>
+            </a:fld>
+            <a:endParaRPr lang="en-US"/>
+          </a:p>
+        </p:txBody>
+      </p:sp>
+      <p:sp>
+        <p:nvSpPr>
+          <p:cNvPr id="5" name="Footer Placeholder 4"/>
+          <p:cNvSpPr>
+            <a:spLocks noGrp="1"/>
+          </p:cNvSpPr>
+          <p:nvPr>
+            <p:ph type="ftr" sz="quarter" idx="3"/>
+          </p:nvPr>
+        </p:nvSpPr>
+        <p:spPr>
+          <a:xfrm rot="16200000">
+            <a:off x="7586910" y="4048760"/>
+            <a:ext cx="2367281" cy="365760"/>
           </a:xfrm>
           <a:prstGeom prst="rect">
             <a:avLst/>
@@ -3131,40 +3272,33 @@
         <p:txBody>
           <a:bodyPr vert="horz" lIns="91440" tIns="45720" rIns="91440" bIns="45720" rtlCol="0" anchor="ctr"/>
           <a:lstStyle>
-            <a:lvl1pPr algn="l">
+            <a:lvl1pPr algn="r">
               <a:defRPr sz="1200">
                 <a:solidFill>
-                  <a:schemeClr val="tx1">
-                    <a:tint val="75000"/>
-                  </a:schemeClr>
+                  <a:schemeClr val="bg2"/>
                 </a:solidFill>
               </a:defRPr>
             </a:lvl1pPr>
           </a:lstStyle>
           <a:p>
-            <a:fld id="{1D8BD707-D9CF-40AE-B4C6-C98DA3205C09}" type="datetimeFigureOut">
-              <a:rPr lang="en-US" smtClean="0"/>
-              <a:pPr/>
-              <a:t>5/29/2016</a:t>
-            </a:fld>
             <a:endParaRPr lang="en-US"/>
           </a:p>
         </p:txBody>
       </p:sp>
       <p:sp>
         <p:nvSpPr>
-          <p:cNvPr id="5" name="Footer Placeholder 4"/>
-          <p:cNvSpPr>
-            <a:spLocks noGrp="1"/>
-          </p:cNvSpPr>
-          <p:nvPr>
-            <p:ph type="ftr" sz="quarter" idx="3"/>
+          <p:cNvPr id="4" name="Date Placeholder 3"/>
+          <p:cNvSpPr>
+            <a:spLocks noGrp="1"/>
+          </p:cNvSpPr>
+          <p:nvPr>
+            <p:ph type="dt" sz="half" idx="2"/>
           </p:nvPr>
         </p:nvSpPr>
         <p:spPr>
-          <a:xfrm>
-            <a:off x="3124200" y="6356350"/>
-            <a:ext cx="2895600" cy="365125"/>
+          <a:xfrm rot="16200000">
+            <a:off x="7551351" y="1645920"/>
+            <a:ext cx="2438399" cy="365760"/>
           </a:xfrm>
           <a:prstGeom prst="rect">
             <a:avLst/>
@@ -3173,58 +3307,19 @@
         <p:txBody>
           <a:bodyPr vert="horz" lIns="91440" tIns="45720" rIns="91440" bIns="45720" rtlCol="0" anchor="ctr"/>
           <a:lstStyle>
-            <a:lvl1pPr algn="ctr">
+            <a:lvl1pPr algn="l">
               <a:defRPr sz="1200">
                 <a:solidFill>
-                  <a:schemeClr val="tx1">
-                    <a:tint val="75000"/>
-                  </a:schemeClr>
+                  <a:schemeClr val="bg2"/>
                 </a:solidFill>
               </a:defRPr>
             </a:lvl1pPr>
           </a:lstStyle>
           <a:p>
-            <a:endParaRPr lang="en-US"/>
-          </a:p>
-        </p:txBody>
-      </p:sp>
-      <p:sp>
-        <p:nvSpPr>
-          <p:cNvPr id="6" name="Slide Number Placeholder 5"/>
-          <p:cNvSpPr>
-            <a:spLocks noGrp="1"/>
-          </p:cNvSpPr>
-          <p:nvPr>
-            <p:ph type="sldNum" sz="quarter" idx="4"/>
-          </p:nvPr>
-        </p:nvSpPr>
-        <p:spPr>
-          <a:xfrm>
-            <a:off x="6553200" y="6356350"/>
-            <a:ext cx="2133600" cy="365125"/>
-          </a:xfrm>
-          <a:prstGeom prst="rect">
-            <a:avLst/>
-          </a:prstGeom>
-        </p:spPr>
-        <p:txBody>
-          <a:bodyPr vert="horz" lIns="91440" tIns="45720" rIns="91440" bIns="45720" rtlCol="0" anchor="ctr"/>
-          <a:lstStyle>
-            <a:lvl1pPr algn="r">
-              <a:defRPr sz="1200">
-                <a:solidFill>
-                  <a:schemeClr val="tx1">
-                    <a:tint val="75000"/>
-                  </a:schemeClr>
-                </a:solidFill>
-              </a:defRPr>
-            </a:lvl1pPr>
-          </a:lstStyle>
-          <a:p>
-            <a:fld id="{B6F15528-21DE-4FAA-801E-634DDDAF4B2B}" type="slidenum">
+            <a:fld id="{1D8BD707-D9CF-40AE-B4C6-C98DA3205C09}" type="datetimeFigureOut">
               <a:rPr lang="en-US" smtClean="0"/>
               <a:pPr/>
-              <a:t>‹#›</a:t>
+              <a:t>6/14/2016</a:t>
             </a:fld>
             <a:endParaRPr lang="en-US"/>
           </a:p>
@@ -3234,29 +3329,33 @@
   </p:cSld>
   <p:clrMap bg1="lt1" tx1="dk1" bg2="lt2" tx2="dk2" accent1="accent1" accent2="accent2" accent3="accent3" accent4="accent4" accent5="accent5" accent6="accent6" hlink="hlink" folHlink="folHlink"/>
   <p:sldLayoutIdLst>
-    <p:sldLayoutId id="2147483649" r:id="rId1"/>
-    <p:sldLayoutId id="2147483650" r:id="rId2"/>
-    <p:sldLayoutId id="2147483651" r:id="rId3"/>
-    <p:sldLayoutId id="2147483652" r:id="rId4"/>
-    <p:sldLayoutId id="2147483653" r:id="rId5"/>
-    <p:sldLayoutId id="2147483654" r:id="rId6"/>
-    <p:sldLayoutId id="2147483655" r:id="rId7"/>
-    <p:sldLayoutId id="2147483656" r:id="rId8"/>
-    <p:sldLayoutId id="2147483657" r:id="rId9"/>
-    <p:sldLayoutId id="2147483658" r:id="rId10"/>
-    <p:sldLayoutId id="2147483659" r:id="rId11"/>
+    <p:sldLayoutId id="2147483661" r:id="rId1"/>
+    <p:sldLayoutId id="2147483662" r:id="rId2"/>
+    <p:sldLayoutId id="2147483663" r:id="rId3"/>
+    <p:sldLayoutId id="2147483664" r:id="rId4"/>
+    <p:sldLayoutId id="2147483665" r:id="rId5"/>
+    <p:sldLayoutId id="2147483666" r:id="rId6"/>
+    <p:sldLayoutId id="2147483667" r:id="rId7"/>
+    <p:sldLayoutId id="2147483668" r:id="rId8"/>
+    <p:sldLayoutId id="2147483669" r:id="rId9"/>
+    <p:sldLayoutId id="2147483670" r:id="rId10"/>
+    <p:sldLayoutId id="2147483671" r:id="rId11"/>
   </p:sldLayoutIdLst>
   <p:txStyles>
     <p:titleStyle>
-      <a:lvl1pPr algn="ctr" defTabSz="914400" rtl="0" eaLnBrk="1" latinLnBrk="0" hangingPunct="1">
+      <a:lvl1pPr algn="l" defTabSz="914400" rtl="0" eaLnBrk="1" latinLnBrk="0" hangingPunct="1">
         <a:spcBef>
           <a:spcPct val="0"/>
         </a:spcBef>
         <a:buNone/>
-        <a:defRPr sz="4400" kern="1200">
+        <a:defRPr sz="4600" kern="1200" cap="none" spc="-100" baseline="0">
+          <a:ln>
+            <a:noFill/>
+          </a:ln>
           <a:solidFill>
-            <a:schemeClr val="tx1"/>
+            <a:schemeClr val="tx2"/>
           </a:solidFill>
+          <a:effectLst/>
           <a:latin typeface="+mj-lt"/>
           <a:ea typeface="+mj-ea"/>
           <a:cs typeface="+mj-cs"/>
@@ -3264,13 +3363,16 @@
       </a:lvl1pPr>
     </p:titleStyle>
     <p:bodyStyle>
-      <a:lvl1pPr marL="342900" indent="-342900" algn="l" defTabSz="914400" rtl="0" eaLnBrk="1" latinLnBrk="0" hangingPunct="1">
+      <a:lvl1pPr marL="342900" indent="-228600" algn="l" defTabSz="914400" rtl="0" eaLnBrk="1" latinLnBrk="0" hangingPunct="1">
         <a:spcBef>
           <a:spcPct val="20000"/>
         </a:spcBef>
+        <a:buClr>
+          <a:schemeClr val="accent1"/>
+        </a:buClr>
         <a:buFont typeface="Arial" pitchFamily="34" charset="0"/>
         <a:buChar char="•"/>
-        <a:defRPr sz="3200" kern="1200">
+        <a:defRPr sz="2200" kern="1200">
           <a:solidFill>
             <a:schemeClr val="tx1"/>
           </a:solidFill>
@@ -3279,70 +3381,13 @@
           <a:cs typeface="+mn-cs"/>
         </a:defRPr>
       </a:lvl1pPr>
-      <a:lvl2pPr marL="742950" indent="-285750" algn="l" defTabSz="914400" rtl="0" eaLnBrk="1" latinLnBrk="0" hangingPunct="1">
+      <a:lvl2pPr marL="640080" indent="-228600" algn="l" defTabSz="914400" rtl="0" eaLnBrk="1" latinLnBrk="0" hangingPunct="1">
         <a:spcBef>
           <a:spcPct val="20000"/>
         </a:spcBef>
-        <a:buFont typeface="Arial" pitchFamily="34" charset="0"/>
-        <a:buChar char="–"/>
-        <a:defRPr sz="2800" kern="1200">
-          <a:solidFill>
-            <a:schemeClr val="tx1"/>
-          </a:solidFill>
-          <a:latin typeface="+mn-lt"/>
-          <a:ea typeface="+mn-ea"/>
-          <a:cs typeface="+mn-cs"/>
-        </a:defRPr>
-      </a:lvl2pPr>
-      <a:lvl3pPr marL="1143000" indent="-228600" algn="l" defTabSz="914400" rtl="0" eaLnBrk="1" latinLnBrk="0" hangingPunct="1">
-        <a:spcBef>
-          <a:spcPct val="20000"/>
-        </a:spcBef>
-        <a:buFont typeface="Arial" pitchFamily="34" charset="0"/>
-        <a:buChar char="•"/>
-        <a:defRPr sz="2400" kern="1200">
-          <a:solidFill>
-            <a:schemeClr val="tx1"/>
-          </a:solidFill>
-          <a:latin typeface="+mn-lt"/>
-          <a:ea typeface="+mn-ea"/>
-          <a:cs typeface="+mn-cs"/>
-        </a:defRPr>
-      </a:lvl3pPr>
-      <a:lvl4pPr marL="1600200" indent="-228600" algn="l" defTabSz="914400" rtl="0" eaLnBrk="1" latinLnBrk="0" hangingPunct="1">
-        <a:spcBef>
-          <a:spcPct val="20000"/>
-        </a:spcBef>
-        <a:buFont typeface="Arial" pitchFamily="34" charset="0"/>
-        <a:buChar char="–"/>
-        <a:defRPr sz="2000" kern="1200">
-          <a:solidFill>
-            <a:schemeClr val="tx1"/>
-          </a:solidFill>
-          <a:latin typeface="+mn-lt"/>
-          <a:ea typeface="+mn-ea"/>
-          <a:cs typeface="+mn-cs"/>
-        </a:defRPr>
-      </a:lvl4pPr>
-      <a:lvl5pPr marL="2057400" indent="-228600" algn="l" defTabSz="914400" rtl="0" eaLnBrk="1" latinLnBrk="0" hangingPunct="1">
-        <a:spcBef>
-          <a:spcPct val="20000"/>
-        </a:spcBef>
-        <a:buFont typeface="Arial" pitchFamily="34" charset="0"/>
-        <a:buChar char="»"/>
-        <a:defRPr sz="2000" kern="1200">
-          <a:solidFill>
-            <a:schemeClr val="tx1"/>
-          </a:solidFill>
-          <a:latin typeface="+mn-lt"/>
-          <a:ea typeface="+mn-ea"/>
-          <a:cs typeface="+mn-cs"/>
-        </a:defRPr>
-      </a:lvl5pPr>
-      <a:lvl6pPr marL="2514600" indent="-228600" algn="l" defTabSz="914400" rtl="0" eaLnBrk="1" latinLnBrk="0" hangingPunct="1">
-        <a:spcBef>
-          <a:spcPct val="20000"/>
-        </a:spcBef>
+        <a:buClr>
+          <a:schemeClr val="accent2"/>
+        </a:buClr>
         <a:buFont typeface="Arial" pitchFamily="34" charset="0"/>
         <a:buChar char="•"/>
         <a:defRPr sz="2000" kern="1200">
@@ -3353,14 +3398,89 @@
           <a:ea typeface="+mn-ea"/>
           <a:cs typeface="+mn-cs"/>
         </a:defRPr>
-      </a:lvl6pPr>
-      <a:lvl7pPr marL="2971800" indent="-228600" algn="l" defTabSz="914400" rtl="0" eaLnBrk="1" latinLnBrk="0" hangingPunct="1">
+      </a:lvl2pPr>
+      <a:lvl3pPr marL="1005840" indent="-228600" algn="l" defTabSz="914400" rtl="0" eaLnBrk="1" latinLnBrk="0" hangingPunct="1">
         <a:spcBef>
           <a:spcPct val="20000"/>
         </a:spcBef>
+        <a:buClr>
+          <a:schemeClr val="accent3"/>
+        </a:buClr>
         <a:buFont typeface="Arial" pitchFamily="34" charset="0"/>
         <a:buChar char="•"/>
-        <a:defRPr sz="2000" kern="1200">
+        <a:defRPr sz="1800" kern="1200">
+          <a:solidFill>
+            <a:schemeClr val="tx1"/>
+          </a:solidFill>
+          <a:latin typeface="+mn-lt"/>
+          <a:ea typeface="+mn-ea"/>
+          <a:cs typeface="+mn-cs"/>
+        </a:defRPr>
+      </a:lvl3pPr>
+      <a:lvl4pPr marL="1280160" indent="-228600" algn="l" defTabSz="914400" rtl="0" eaLnBrk="1" latinLnBrk="0" hangingPunct="1">
+        <a:spcBef>
+          <a:spcPct val="20000"/>
+        </a:spcBef>
+        <a:buClr>
+          <a:schemeClr val="accent4"/>
+        </a:buClr>
+        <a:buFont typeface="Arial" pitchFamily="34" charset="0"/>
+        <a:buChar char="•"/>
+        <a:defRPr sz="1600" kern="1200">
+          <a:solidFill>
+            <a:schemeClr val="tx1"/>
+          </a:solidFill>
+          <a:latin typeface="+mn-lt"/>
+          <a:ea typeface="+mn-ea"/>
+          <a:cs typeface="+mn-cs"/>
+        </a:defRPr>
+      </a:lvl4pPr>
+      <a:lvl5pPr marL="1554480" indent="-228600" algn="l" defTabSz="914400" rtl="0" eaLnBrk="1" latinLnBrk="0" hangingPunct="1">
+        <a:spcBef>
+          <a:spcPct val="20000"/>
+        </a:spcBef>
+        <a:buClr>
+          <a:schemeClr val="accent5"/>
+        </a:buClr>
+        <a:buFont typeface="Arial" pitchFamily="34" charset="0"/>
+        <a:buChar char="•"/>
+        <a:defRPr sz="1400" kern="1200" baseline="0">
+          <a:solidFill>
+            <a:schemeClr val="tx1"/>
+          </a:solidFill>
+          <a:latin typeface="+mn-lt"/>
+          <a:ea typeface="+mn-ea"/>
+          <a:cs typeface="+mn-cs"/>
+        </a:defRPr>
+      </a:lvl5pPr>
+      <a:lvl6pPr marL="1737360" indent="-182880" algn="l" defTabSz="914400" rtl="0" eaLnBrk="1" latinLnBrk="0" hangingPunct="1">
+        <a:spcBef>
+          <a:spcPct val="20000"/>
+        </a:spcBef>
+        <a:buClr>
+          <a:schemeClr val="accent1"/>
+        </a:buClr>
+        <a:buFont typeface="Arial" pitchFamily="34" charset="0"/>
+        <a:buChar char="•"/>
+        <a:defRPr sz="1400" kern="1200" baseline="0">
+          <a:solidFill>
+            <a:schemeClr val="tx1"/>
+          </a:solidFill>
+          <a:latin typeface="+mn-lt"/>
+          <a:ea typeface="+mn-ea"/>
+          <a:cs typeface="+mn-cs"/>
+        </a:defRPr>
+      </a:lvl6pPr>
+      <a:lvl7pPr marL="1920240" indent="-182880" algn="l" defTabSz="914400" rtl="0" eaLnBrk="1" latinLnBrk="0" hangingPunct="1">
+        <a:spcBef>
+          <a:spcPct val="20000"/>
+        </a:spcBef>
+        <a:buClr>
+          <a:schemeClr val="accent2"/>
+        </a:buClr>
+        <a:buFont typeface="Arial" pitchFamily="34" charset="0"/>
+        <a:buChar char="•"/>
+        <a:defRPr sz="1400" kern="1200">
           <a:solidFill>
             <a:schemeClr val="tx1"/>
           </a:solidFill>
@@ -3369,13 +3489,16 @@
           <a:cs typeface="+mn-cs"/>
         </a:defRPr>
       </a:lvl7pPr>
-      <a:lvl8pPr marL="3429000" indent="-228600" algn="l" defTabSz="914400" rtl="0" eaLnBrk="1" latinLnBrk="0" hangingPunct="1">
+      <a:lvl8pPr marL="2103120" indent="-182880" algn="l" defTabSz="914400" rtl="0" eaLnBrk="1" latinLnBrk="0" hangingPunct="1">
         <a:spcBef>
           <a:spcPct val="20000"/>
         </a:spcBef>
+        <a:buClr>
+          <a:schemeClr val="accent3"/>
+        </a:buClr>
         <a:buFont typeface="Arial" pitchFamily="34" charset="0"/>
         <a:buChar char="•"/>
-        <a:defRPr sz="2000" kern="1200">
+        <a:defRPr sz="1400" kern="1200">
           <a:solidFill>
             <a:schemeClr val="tx1"/>
           </a:solidFill>
@@ -3384,13 +3507,16 @@
           <a:cs typeface="+mn-cs"/>
         </a:defRPr>
       </a:lvl8pPr>
-      <a:lvl9pPr marL="3886200" indent="-228600" algn="l" defTabSz="914400" rtl="0" eaLnBrk="1" latinLnBrk="0" hangingPunct="1">
+      <a:lvl9pPr marL="2286000" indent="-182880" algn="l" defTabSz="914400" rtl="0" eaLnBrk="1" latinLnBrk="0" hangingPunct="1">
         <a:spcBef>
           <a:spcPct val="20000"/>
         </a:spcBef>
+        <a:buClr>
+          <a:schemeClr val="accent4"/>
+        </a:buClr>
         <a:buFont typeface="Arial" pitchFamily="34" charset="0"/>
         <a:buChar char="•"/>
-        <a:defRPr sz="2000" kern="1200">
+        <a:defRPr sz="1400" kern="1200">
           <a:solidFill>
             <a:schemeClr val="tx1"/>
           </a:solidFill>
@@ -3619,67 +3745,46 @@
             <p:ph type="title"/>
           </p:nvPr>
         </p:nvSpPr>
+        <p:spPr/>
+        <p:txBody>
+          <a:bodyPr/>
+          <a:lstStyle/>
+          <a:p>
+            <a:r>
+              <a:rPr lang="en-US" dirty="0" smtClean="0"/>
+              <a:t>Conclusion</a:t>
+            </a:r>
+            <a:endParaRPr lang="en-US" dirty="0"/>
+          </a:p>
+        </p:txBody>
+      </p:sp>
+      <p:sp>
+        <p:nvSpPr>
+          <p:cNvPr id="3" name="Content Placeholder 2"/>
+          <p:cNvSpPr>
+            <a:spLocks noGrp="1"/>
+          </p:cNvSpPr>
+          <p:nvPr>
+            <p:ph idx="1"/>
+          </p:nvPr>
+        </p:nvSpPr>
         <p:spPr>
           <a:xfrm>
-            <a:off x="457200" y="76200"/>
-            <a:ext cx="8229600" cy="1143000"/>
+            <a:off x="457200" y="1524000"/>
+            <a:ext cx="8229600" cy="4525963"/>
           </a:xfrm>
         </p:spPr>
         <p:txBody>
           <a:bodyPr/>
           <a:lstStyle/>
           <a:p>
+            <a:pPr marL="0" indent="0">
+              <a:buNone/>
+            </a:pPr>
             <a:r>
               <a:rPr lang="en-US" dirty="0" smtClean="0"/>
-              <a:t>Algorithm- </a:t>
-            </a:r>
-            <a:r>
-              <a:rPr lang="en-US" dirty="0" err="1" smtClean="0"/>
-              <a:t>cont</a:t>
-            </a:r>
-            <a:r>
-              <a:rPr lang="en-US" dirty="0" smtClean="0"/>
-              <a:t>…</a:t>
-            </a:r>
-            <a:endParaRPr lang="en-US" dirty="0"/>
-          </a:p>
-        </p:txBody>
-      </p:sp>
-      <p:sp>
-        <p:nvSpPr>
-          <p:cNvPr id="3" name="Content Placeholder 2"/>
-          <p:cNvSpPr>
-            <a:spLocks noGrp="1"/>
-          </p:cNvSpPr>
-          <p:nvPr>
-            <p:ph idx="1"/>
-          </p:nvPr>
-        </p:nvSpPr>
-        <p:spPr>
-          <a:xfrm>
-            <a:off x="457200" y="990600"/>
-            <a:ext cx="8382000" cy="5410200"/>
-          </a:xfrm>
-        </p:spPr>
-        <p:txBody>
-          <a:bodyPr>
-            <a:normAutofit/>
-          </a:bodyPr>
-          <a:lstStyle/>
-          <a:p>
-            <a:pPr marL="914400" lvl="2" indent="0">
-              <a:buNone/>
-            </a:pPr>
-            <a:endParaRPr lang="en-US" dirty="0" smtClean="0"/>
-          </a:p>
-          <a:p>
-            <a:pPr lvl="1"/>
-            <a:endParaRPr lang="en-US" dirty="0" smtClean="0"/>
-          </a:p>
-          <a:p>
-            <a:pPr marL="457200" lvl="1" indent="0">
-              <a:buNone/>
-            </a:pPr>
+              <a:t>Proposed text Indexing is a good proposal for small data search engine. Helps in retrieval of information like searching for a word from a set of documents.  </a:t>
+            </a:r>
             <a:endParaRPr lang="en-US" dirty="0"/>
           </a:p>
         </p:txBody>
@@ -3687,7 +3792,7 @@
     </p:spTree>
     <p:extLst>
       <p:ext uri="{BB962C8B-B14F-4D97-AF65-F5344CB8AC3E}">
-        <p14:creationId xmlns:p14="http://schemas.microsoft.com/office/powerpoint/2010/main" val="2242372452"/>
+        <p14:creationId xmlns:p14="http://schemas.microsoft.com/office/powerpoint/2010/main" val="2097359749"/>
       </p:ext>
     </p:extLst>
   </p:cSld>
@@ -3731,27 +3836,14 @@
             <p:ph type="title"/>
           </p:nvPr>
         </p:nvSpPr>
-        <p:spPr>
-          <a:xfrm>
-            <a:off x="457200" y="76200"/>
-            <a:ext cx="8229600" cy="1143000"/>
-          </a:xfrm>
-        </p:spPr>
+        <p:spPr/>
         <p:txBody>
           <a:bodyPr/>
           <a:lstStyle/>
           <a:p>
             <a:r>
               <a:rPr lang="en-US" dirty="0" smtClean="0"/>
-              <a:t>Algorithm- </a:t>
-            </a:r>
-            <a:r>
-              <a:rPr lang="en-US" dirty="0" err="1" smtClean="0"/>
-              <a:t>cont</a:t>
-            </a:r>
-            <a:r>
-              <a:rPr lang="en-US" dirty="0" smtClean="0"/>
-              <a:t>…</a:t>
+              <a:t>References</a:t>
             </a:r>
             <a:endParaRPr lang="en-US" dirty="0"/>
           </a:p>
@@ -3767,27 +3859,60 @@
             <p:ph idx="1"/>
           </p:nvPr>
         </p:nvSpPr>
-        <p:spPr>
-          <a:xfrm>
-            <a:off x="457200" y="990600"/>
-            <a:ext cx="8458200" cy="5562600"/>
-          </a:xfrm>
-        </p:spPr>
+        <p:spPr/>
         <p:txBody>
           <a:bodyPr>
             <a:normAutofit/>
           </a:bodyPr>
           <a:lstStyle/>
           <a:p>
-            <a:pPr lvl="1"/>
-            <a:endParaRPr lang="en-US" dirty="0"/>
+            <a:pPr marL="0" indent="0">
+              <a:buNone/>
+            </a:pPr>
+            <a:r>
+              <a:rPr lang="en-US" sz="1400" dirty="0"/>
+              <a:t>1</a:t>
+            </a:r>
+            <a:r>
+              <a:rPr lang="en-US" sz="1400" dirty="0" smtClean="0"/>
+              <a:t>.</a:t>
+            </a:r>
+            <a:r>
+              <a:rPr lang="en-US" sz="1400" b="1" dirty="0"/>
+              <a:t> https://en.wikipedia.org/wiki/Search_engine_indexing</a:t>
+            </a:r>
+            <a:endParaRPr lang="en-US" sz="1400" dirty="0"/>
+          </a:p>
+          <a:p>
+            <a:pPr marL="0" indent="0">
+              <a:buNone/>
+            </a:pPr>
+            <a:endParaRPr lang="en-US" sz="1400" dirty="0" smtClean="0"/>
+          </a:p>
+          <a:p>
+            <a:pPr marL="0" indent="0">
+              <a:buNone/>
+            </a:pPr>
+            <a:endParaRPr lang="en-US" sz="1400" dirty="0" smtClean="0"/>
+          </a:p>
+          <a:p>
+            <a:pPr marL="0" indent="0">
+              <a:buNone/>
+            </a:pPr>
+            <a:endParaRPr lang="en-US" sz="1400" dirty="0"/>
+          </a:p>
+          <a:p>
+            <a:pPr marL="0" indent="0">
+              <a:buNone/>
+            </a:pPr>
+            <a:endParaRPr lang="en-US" sz="1400" dirty="0"/>
           </a:p>
         </p:txBody>
       </p:sp>
     </p:spTree>
     <p:extLst>
       <p:ext uri="{BB962C8B-B14F-4D97-AF65-F5344CB8AC3E}">
-        <p14:creationId xmlns:p14="http://schemas.microsoft.com/office/powerpoint/2010/main" val="1787869985"/>
+        <p14:creationId xmlns:p14="http://schemas.microsoft.com/office/powerpoint/2010/main" val="2090016322"/>
       </p:ext>
     </p:extLst>
   </p:cSld>
@@ -3804,7 +3929,7 @@
 </p:sld>
 </file>
 
-<file path=ppt/slides/slide12.xml><?xml version="1.0" encoding="utf-8"?>
+<file path=ppt/slides/slide2.xml><?xml version="1.0" encoding="utf-8"?>
 <p:sld xmlns:a="http://schemas.openxmlformats.org/drawingml/2006/main" xmlns:r="http://schemas.openxmlformats.org/officeDocument/2006/relationships" xmlns:p="http://schemas.openxmlformats.org/presentationml/2006/main">
   <p:cSld>
     <p:spTree>
@@ -3831,27 +3956,14 @@
             <p:ph type="title"/>
           </p:nvPr>
         </p:nvSpPr>
-        <p:spPr>
-          <a:xfrm>
-            <a:off x="457200" y="76200"/>
-            <a:ext cx="8229600" cy="1143000"/>
-          </a:xfrm>
-        </p:spPr>
+        <p:spPr/>
         <p:txBody>
           <a:bodyPr/>
           <a:lstStyle/>
           <a:p>
             <a:r>
               <a:rPr lang="en-US" dirty="0" smtClean="0"/>
-              <a:t>Algorithm- </a:t>
-            </a:r>
-            <a:r>
-              <a:rPr lang="en-US" dirty="0" err="1" smtClean="0"/>
-              <a:t>cont</a:t>
-            </a:r>
-            <a:r>
-              <a:rPr lang="en-US" dirty="0" smtClean="0"/>
-              <a:t>…</a:t>
+              <a:t>Abstract</a:t>
             </a:r>
             <a:endParaRPr lang="en-US" dirty="0"/>
           </a:p>
@@ -3867,18 +3979,64 @@
             <p:ph idx="1"/>
           </p:nvPr>
         </p:nvSpPr>
-        <p:spPr>
-          <a:xfrm>
-            <a:off x="304800" y="990600"/>
-            <a:ext cx="8686800" cy="5562600"/>
-          </a:xfrm>
-        </p:spPr>
+        <p:spPr/>
         <p:txBody>
           <a:bodyPr>
             <a:normAutofit/>
           </a:bodyPr>
           <a:lstStyle/>
           <a:p>
+            <a:r>
+              <a:rPr lang="en-US" dirty="0" smtClean="0"/>
+              <a:t>Introduction</a:t>
+            </a:r>
+          </a:p>
+          <a:p>
+            <a:r>
+              <a:rPr lang="en-US" dirty="0" smtClean="0"/>
+              <a:t>Flowchart</a:t>
+            </a:r>
+          </a:p>
+          <a:p>
+            <a:r>
+              <a:rPr lang="en-US" dirty="0" smtClean="0"/>
+              <a:t>Algorithm</a:t>
+            </a:r>
+          </a:p>
+          <a:p>
+            <a:r>
+              <a:rPr lang="en-US" dirty="0" smtClean="0"/>
+              <a:t>Advantages and Disadvantages</a:t>
+            </a:r>
+          </a:p>
+          <a:p>
+            <a:r>
+              <a:rPr lang="en-US" dirty="0" smtClean="0"/>
+              <a:t>Challenges</a:t>
+            </a:r>
+          </a:p>
+          <a:p>
+            <a:r>
+              <a:rPr lang="en-US" dirty="0" smtClean="0"/>
+              <a:t>Further Improvements</a:t>
+            </a:r>
+          </a:p>
+          <a:p>
+            <a:r>
+              <a:rPr lang="en-US" dirty="0" smtClean="0"/>
+              <a:t>References</a:t>
+            </a:r>
+          </a:p>
+          <a:p>
+            <a:r>
+              <a:rPr lang="en-US" dirty="0" smtClean="0"/>
+              <a:t>Conclusion</a:t>
+            </a:r>
+          </a:p>
+          <a:p>
+            <a:pPr marL="0" indent="0">
+              <a:buNone/>
+            </a:pPr>
             <a:endParaRPr lang="en-US" dirty="0"/>
           </a:p>
         </p:txBody>
@@ -3886,7 +4044,7 @@
     </p:spTree>
     <p:extLst>
       <p:ext uri="{BB962C8B-B14F-4D97-AF65-F5344CB8AC3E}">
-        <p14:creationId xmlns:p14="http://schemas.microsoft.com/office/powerpoint/2010/main" val="2903851524"/>
+        <p14:creationId xmlns:p14="http://schemas.microsoft.com/office/powerpoint/2010/main" val="265109911"/>
       </p:ext>
     </p:extLst>
   </p:cSld>
@@ -3903,7 +4061,7 @@
 </p:sld>
 </file>
 
-<file path=ppt/slides/slide13.xml><?xml version="1.0" encoding="utf-8"?>
+<file path=ppt/slides/slide3.xml><?xml version="1.0" encoding="utf-8"?>
 <p:sld xmlns:a="http://schemas.openxmlformats.org/drawingml/2006/main" xmlns:r="http://schemas.openxmlformats.org/officeDocument/2006/relationships" xmlns:p="http://schemas.openxmlformats.org/presentationml/2006/main">
   <p:cSld>
     <p:spTree>
@@ -3932,25 +4090,19 @@
         </p:nvSpPr>
         <p:spPr>
           <a:xfrm>
-            <a:off x="457200" y="76200"/>
-            <a:ext cx="8229600" cy="1143000"/>
+            <a:off x="457200" y="274638"/>
+            <a:ext cx="8153400" cy="715962"/>
           </a:xfrm>
         </p:spPr>
         <p:txBody>
-          <a:bodyPr/>
+          <a:bodyPr>
+            <a:normAutofit fontScale="90000"/>
+          </a:bodyPr>
           <a:lstStyle/>
           <a:p>
             <a:r>
               <a:rPr lang="en-US" dirty="0" smtClean="0"/>
-              <a:t>Algorithm- </a:t>
-            </a:r>
-            <a:r>
-              <a:rPr lang="en-US" dirty="0" err="1" smtClean="0"/>
-              <a:t>cont</a:t>
-            </a:r>
-            <a:r>
-              <a:rPr lang="en-US" dirty="0" smtClean="0"/>
-              <a:t>…</a:t>
+              <a:t>Introduction</a:t>
             </a:r>
             <a:endParaRPr lang="en-US" dirty="0"/>
           </a:p>
@@ -3968,8 +4120,8 @@
         </p:nvSpPr>
         <p:spPr>
           <a:xfrm>
-            <a:off x="304800" y="914400"/>
-            <a:ext cx="8686800" cy="5867400"/>
+            <a:off x="457200" y="1066800"/>
+            <a:ext cx="8229600" cy="5059363"/>
           </a:xfrm>
         </p:spPr>
         <p:txBody>
@@ -3978,14 +4130,44 @@
           </a:bodyPr>
           <a:lstStyle/>
           <a:p>
-            <a:endParaRPr lang="en-US" dirty="0"/>
+            <a:r>
+              <a:rPr lang="en-US" sz="2400" dirty="0" smtClean="0"/>
+              <a:t>This project is about text indexing, a method to collect, parse and store data for fast and efficient ways of retrieving/searching information</a:t>
+            </a:r>
+          </a:p>
+          <a:p>
+            <a:r>
+              <a:rPr lang="en-US" sz="2400" dirty="0" smtClean="0"/>
+              <a:t>Helps in finding required words within one or more text files and thus serves as a search query through a database.</a:t>
+            </a:r>
+          </a:p>
+          <a:p>
+            <a:r>
+              <a:rPr lang="en-US" sz="2400" dirty="0" smtClean="0"/>
+              <a:t>Index data structure:</a:t>
+            </a:r>
+          </a:p>
+          <a:p>
+            <a:pPr lvl="1"/>
+            <a:r>
+              <a:rPr lang="en-US" sz="2000" dirty="0" smtClean="0"/>
+              <a:t>Stores a list of occurrence of the words in the form of </a:t>
+            </a:r>
+            <a:r>
+              <a:rPr lang="en-US" sz="2000" dirty="0" err="1" smtClean="0"/>
+              <a:t>hashtable</a:t>
+            </a:r>
+            <a:r>
+              <a:rPr lang="en-US" sz="2000" dirty="0" smtClean="0"/>
+              <a:t>. </a:t>
+            </a:r>
           </a:p>
         </p:txBody>
       </p:sp>
     </p:spTree>
     <p:extLst>
       <p:ext uri="{BB962C8B-B14F-4D97-AF65-F5344CB8AC3E}">
-        <p14:creationId xmlns:p14="http://schemas.microsoft.com/office/powerpoint/2010/main" val="2027860682"/>
+        <p14:creationId xmlns:p14="http://schemas.microsoft.com/office/powerpoint/2010/main" val="794887019"/>
       </p:ext>
     </p:extLst>
   </p:cSld>
@@ -4002,7 +4184,7 @@
 </p:sld>
 </file>
 
-<file path=ppt/slides/slide14.xml><?xml version="1.0" encoding="utf-8"?>
+<file path=ppt/slides/slide4.xml><?xml version="1.0" encoding="utf-8"?>
 <p:sld xmlns:a="http://schemas.openxmlformats.org/drawingml/2006/main" xmlns:r="http://schemas.openxmlformats.org/officeDocument/2006/relationships" xmlns:p="http://schemas.openxmlformats.org/presentationml/2006/main">
   <p:cSld>
     <p:spTree>
@@ -4021,54 +4203,18 @@
       </p:grpSpPr>
       <p:sp>
         <p:nvSpPr>
-          <p:cNvPr id="2" name="Title 1"/>
-          <p:cNvSpPr>
-            <a:spLocks noGrp="1"/>
-          </p:cNvSpPr>
-          <p:nvPr>
-            <p:ph type="title"/>
+          <p:cNvPr id="3" name="Content Placeholder 2"/>
+          <p:cNvSpPr>
+            <a:spLocks noGrp="1"/>
+          </p:cNvSpPr>
+          <p:nvPr>
+            <p:ph idx="1"/>
           </p:nvPr>
         </p:nvSpPr>
         <p:spPr>
           <a:xfrm>
-            <a:off x="457200" y="76200"/>
-            <a:ext cx="8229600" cy="1143000"/>
-          </a:xfrm>
-        </p:spPr>
-        <p:txBody>
-          <a:bodyPr/>
-          <a:lstStyle/>
-          <a:p>
-            <a:r>
-              <a:rPr lang="en-US" dirty="0" smtClean="0"/>
-              <a:t>Algorithm- </a:t>
-            </a:r>
-            <a:r>
-              <a:rPr lang="en-US" dirty="0" err="1" smtClean="0"/>
-              <a:t>cont</a:t>
-            </a:r>
-            <a:r>
-              <a:rPr lang="en-US" dirty="0" smtClean="0"/>
-              <a:t>…</a:t>
-            </a:r>
-            <a:endParaRPr lang="en-US" dirty="0"/>
-          </a:p>
-        </p:txBody>
-      </p:sp>
-      <p:sp>
-        <p:nvSpPr>
-          <p:cNvPr id="3" name="Content Placeholder 2"/>
-          <p:cNvSpPr>
-            <a:spLocks noGrp="1"/>
-          </p:cNvSpPr>
-          <p:nvPr>
-            <p:ph idx="1"/>
-          </p:nvPr>
-        </p:nvSpPr>
-        <p:spPr>
-          <a:xfrm>
-            <a:off x="609600" y="1143000"/>
-            <a:ext cx="8382000" cy="5410200"/>
+            <a:off x="457200" y="609600"/>
+            <a:ext cx="8229600" cy="4525963"/>
           </a:xfrm>
         </p:spPr>
         <p:txBody>
@@ -4077,19 +4223,197 @@
           </a:bodyPr>
           <a:lstStyle/>
           <a:p>
+            <a:r>
+              <a:rPr lang="en-US" sz="2400" dirty="0"/>
+              <a:t> Index inverted/ merging:</a:t>
+            </a:r>
+          </a:p>
+          <a:p>
             <a:pPr lvl="1"/>
+            <a:r>
+              <a:rPr lang="en-US" dirty="0"/>
+              <a:t>This architecture supports incremental indexing, where a merge identifies the documents to be added or updated and then parse each document into words. </a:t>
+            </a:r>
+          </a:p>
+          <a:p>
+            <a:pPr lvl="1"/>
+            <a:r>
+              <a:rPr lang="en-US" dirty="0"/>
+              <a:t>After parsing, the indexer adds the referenced documents to the document list for the appropriate words.</a:t>
+            </a:r>
+          </a:p>
+          <a:p>
+            <a:pPr lvl="1"/>
+            <a:r>
+              <a:rPr lang="en-US" dirty="0" err="1"/>
+              <a:t>Th</a:t>
+            </a:r>
+            <a:r>
+              <a:rPr lang="en-US" dirty="0"/>
+              <a:t> </a:t>
+            </a:r>
+            <a:r>
+              <a:rPr lang="en-US" dirty="0" err="1"/>
+              <a:t>eprocess</a:t>
+            </a:r>
+            <a:r>
+              <a:rPr lang="en-US" dirty="0"/>
+              <a:t> of finding words in the inverted index is relatively time consuming for a large search engine. So the development is split into two parts:</a:t>
+            </a:r>
+          </a:p>
+          <a:p>
+            <a:pPr lvl="2"/>
+            <a:r>
+              <a:rPr lang="en-US" dirty="0"/>
+              <a:t>Forward index</a:t>
+            </a:r>
+          </a:p>
+          <a:p>
+            <a:endParaRPr lang="en-US" dirty="0" smtClean="0"/>
+          </a:p>
+          <a:p>
             <a:endParaRPr lang="en-US" dirty="0"/>
           </a:p>
           <a:p>
-            <a:pPr lvl="1"/>
             <a:endParaRPr lang="en-US" dirty="0" smtClean="0"/>
           </a:p>
-        </p:txBody>
-      </p:sp>
+          <a:p>
+            <a:endParaRPr lang="en-US" dirty="0"/>
+          </a:p>
+        </p:txBody>
+      </p:sp>
+      <p:pic>
+        <p:nvPicPr>
+          <p:cNvPr id="4" name="Picture 2"/>
+          <p:cNvPicPr>
+            <a:picLocks noChangeAspect="1" noChangeArrowheads="1"/>
+          </p:cNvPicPr>
+          <p:nvPr/>
+        </p:nvPicPr>
+        <p:blipFill>
+          <a:blip r:embed="rId2">
+            <a:extLst>
+              <a:ext uri="{28A0092B-C50C-407E-A947-70E740481C1C}">
+                <a14:useLocalDpi xmlns:a14="http://schemas.microsoft.com/office/drawing/2010/main" val="0"/>
+              </a:ext>
+            </a:extLst>
+          </a:blip>
+          <a:srcRect/>
+          <a:stretch>
+            <a:fillRect/>
+          </a:stretch>
+        </p:blipFill>
+        <p:spPr bwMode="auto">
+          <a:xfrm>
+            <a:off x="1219200" y="4724400"/>
+            <a:ext cx="3076575" cy="1381125"/>
+          </a:xfrm>
+          <a:prstGeom prst="rect">
+            <a:avLst/>
+          </a:prstGeom>
+          <a:noFill/>
+          <a:ln>
+            <a:noFill/>
+          </a:ln>
+          <a:effectLst/>
+          <a:extLst>
+            <a:ext uri="{909E8E84-426E-40DD-AFC4-6F175D3DCCD1}">
+              <a14:hiddenFill xmlns:a14="http://schemas.microsoft.com/office/drawing/2010/main">
+                <a:solidFill>
+                  <a:schemeClr val="accent1"/>
+                </a:solidFill>
+              </a14:hiddenFill>
+            </a:ext>
+            <a:ext uri="{91240B29-F687-4F45-9708-019B960494DF}">
+              <a14:hiddenLine xmlns:a14="http://schemas.microsoft.com/office/drawing/2010/main" w="9525">
+                <a:solidFill>
+                  <a:schemeClr val="tx1"/>
+                </a:solidFill>
+                <a:miter lim="800000"/>
+                <a:headEnd/>
+                <a:tailEnd/>
+              </a14:hiddenLine>
+            </a:ext>
+            <a:ext uri="{AF507438-7753-43E0-B8FC-AC1667EBCBE1}">
+              <a14:hiddenEffects xmlns:a14="http://schemas.microsoft.com/office/drawing/2010/main">
+                <a:effectLst>
+                  <a:outerShdw dist="35921" dir="2700000" algn="ctr" rotWithShape="0">
+                    <a:schemeClr val="bg2"/>
+                  </a:outerShdw>
+                </a:effectLst>
+              </a14:hiddenEffects>
+            </a:ext>
+          </a:extLst>
+        </p:spPr>
+      </p:pic>
+      <p:pic>
+        <p:nvPicPr>
+          <p:cNvPr id="1026" name="Picture 2"/>
+          <p:cNvPicPr>
+            <a:picLocks noChangeAspect="1" noChangeArrowheads="1"/>
+          </p:cNvPicPr>
+          <p:nvPr/>
+        </p:nvPicPr>
+        <p:blipFill>
+          <a:blip r:embed="rId3">
+            <a:extLst>
+              <a:ext uri="{28A0092B-C50C-407E-A947-70E740481C1C}">
+                <a14:useLocalDpi xmlns:a14="http://schemas.microsoft.com/office/drawing/2010/main" val="0"/>
+              </a:ext>
+            </a:extLst>
+          </a:blip>
+          <a:srcRect/>
+          <a:stretch>
+            <a:fillRect/>
+          </a:stretch>
+        </p:blipFill>
+        <p:spPr bwMode="auto">
+          <a:xfrm>
+            <a:off x="4495800" y="4733925"/>
+            <a:ext cx="3851384" cy="1362075"/>
+          </a:xfrm>
+          <a:prstGeom prst="rect">
+            <a:avLst/>
+          </a:prstGeom>
+          <a:noFill/>
+          <a:ln>
+            <a:noFill/>
+          </a:ln>
+          <a:effectLst/>
+          <a:extLst>
+            <a:ext uri="{909E8E84-426E-40DD-AFC4-6F175D3DCCD1}">
+              <a14:hiddenFill xmlns:a14="http://schemas.microsoft.com/office/drawing/2010/main">
+                <a:solidFill>
+                  <a:schemeClr val="accent1"/>
+                </a:solidFill>
+              </a14:hiddenFill>
+            </a:ext>
+            <a:ext uri="{91240B29-F687-4F45-9708-019B960494DF}">
+              <a14:hiddenLine xmlns:a14="http://schemas.microsoft.com/office/drawing/2010/main" w="9525">
+                <a:solidFill>
+                  <a:schemeClr val="tx1"/>
+                </a:solidFill>
+                <a:miter lim="800000"/>
+                <a:headEnd/>
+                <a:tailEnd/>
+              </a14:hiddenLine>
+            </a:ext>
+            <a:ext uri="{AF507438-7753-43E0-B8FC-AC1667EBCBE1}">
+              <a14:hiddenEffects xmlns:a14="http://schemas.microsoft.com/office/drawing/2010/main">
+                <a:effectLst>
+                  <a:outerShdw dist="35921" dir="2700000" algn="ctr" rotWithShape="0">
+                    <a:schemeClr val="bg2"/>
+                  </a:outerShdw>
+                </a:effectLst>
+              </a14:hiddenEffects>
+            </a:ext>
+          </a:extLst>
+        </p:spPr>
+      </p:pic>
     </p:spTree>
     <p:extLst>
       <p:ext uri="{BB962C8B-B14F-4D97-AF65-F5344CB8AC3E}">
-        <p14:creationId xmlns:p14="http://schemas.microsoft.com/office/powerpoint/2010/main" val="4084793073"/>
+        <p14:creationId xmlns:p14="http://schemas.microsoft.com/office/powerpoint/2010/main" val="3030785889"/>
       </p:ext>
     </p:extLst>
   </p:cSld>
@@ -4106,7 +4430,7 @@
 </p:sld>
 </file>
 
-<file path=ppt/slides/slide15.xml><?xml version="1.0" encoding="utf-8"?>
+<file path=ppt/slides/slide5.xml><?xml version="1.0" encoding="utf-8"?>
 <p:sld xmlns:a="http://schemas.openxmlformats.org/drawingml/2006/main" xmlns:r="http://schemas.openxmlformats.org/officeDocument/2006/relationships" xmlns:p="http://schemas.openxmlformats.org/presentationml/2006/main">
   <p:cSld>
     <p:spTree>
@@ -4133,54 +4457,339 @@
             <p:ph type="title"/>
           </p:nvPr>
         </p:nvSpPr>
-        <p:spPr>
-          <a:xfrm>
-            <a:off x="457200" y="76200"/>
-            <a:ext cx="8229600" cy="1143000"/>
-          </a:xfrm>
-        </p:spPr>
-        <p:txBody>
-          <a:bodyPr/>
-          <a:lstStyle/>
-          <a:p>
-            <a:r>
-              <a:rPr lang="en-US" dirty="0" smtClean="0"/>
-              <a:t>Algorithm- </a:t>
-            </a:r>
-            <a:r>
-              <a:rPr lang="en-US" dirty="0" err="1" smtClean="0"/>
-              <a:t>cont</a:t>
-            </a:r>
-            <a:r>
-              <a:rPr lang="en-US" dirty="0" smtClean="0"/>
-              <a:t>…</a:t>
-            </a:r>
-            <a:endParaRPr lang="en-US" dirty="0"/>
-          </a:p>
-        </p:txBody>
-      </p:sp>
-      <p:sp>
-        <p:nvSpPr>
-          <p:cNvPr id="3" name="Content Placeholder 2"/>
-          <p:cNvSpPr>
-            <a:spLocks noGrp="1"/>
-          </p:cNvSpPr>
-          <p:nvPr>
-            <p:ph idx="1"/>
-          </p:nvPr>
-        </p:nvSpPr>
-        <p:spPr>
-          <a:xfrm>
-            <a:off x="304800" y="914400"/>
-            <a:ext cx="8686800" cy="5867400"/>
-          </a:xfrm>
-        </p:spPr>
+        <p:spPr/>
         <p:txBody>
           <a:bodyPr>
             <a:normAutofit/>
           </a:bodyPr>
           <a:lstStyle/>
           <a:p>
+            <a:r>
+              <a:rPr lang="en-US" dirty="0" smtClean="0"/>
+              <a:t>Algorithm</a:t>
+            </a:r>
+            <a:endParaRPr lang="en-US" dirty="0"/>
+          </a:p>
+        </p:txBody>
+      </p:sp>
+      <p:sp>
+        <p:nvSpPr>
+          <p:cNvPr id="3" name="Content Placeholder 2"/>
+          <p:cNvSpPr>
+            <a:spLocks noGrp="1"/>
+          </p:cNvSpPr>
+          <p:nvPr>
+            <p:ph idx="1"/>
+          </p:nvPr>
+        </p:nvSpPr>
+        <p:spPr/>
+        <p:txBody>
+          <a:bodyPr>
+            <a:normAutofit/>
+          </a:bodyPr>
+          <a:lstStyle/>
+          <a:p>
+            <a:pPr lvl="1"/>
+            <a:endParaRPr lang="en-US" dirty="0"/>
+          </a:p>
+          <a:p>
+            <a:pPr lvl="1"/>
+            <a:endParaRPr lang="en-US" dirty="0" smtClean="0"/>
+          </a:p>
+          <a:p>
+            <a:pPr marL="457200" lvl="1" indent="0">
+              <a:buNone/>
+            </a:pPr>
+            <a:endParaRPr lang="en-US" dirty="0"/>
+          </a:p>
+        </p:txBody>
+      </p:sp>
+      <p:sp>
+        <p:nvSpPr>
+          <p:cNvPr id="4" name="Content Placeholder 2"/>
+          <p:cNvSpPr txBox="1">
+            <a:spLocks/>
+          </p:cNvSpPr>
+          <p:nvPr/>
+        </p:nvSpPr>
+        <p:spPr>
+          <a:xfrm>
+            <a:off x="304800" y="1600200"/>
+            <a:ext cx="8229600" cy="4525963"/>
+          </a:xfrm>
+          <a:prstGeom prst="rect">
+            <a:avLst/>
+          </a:prstGeom>
+        </p:spPr>
+        <p:txBody>
+          <a:bodyPr vert="horz" lIns="91440" tIns="45720" rIns="91440" bIns="45720" rtlCol="0">
+            <a:normAutofit/>
+          </a:bodyPr>
+          <a:lstStyle>
+            <a:lvl1pPr marL="342900" indent="-342900" algn="l" defTabSz="914400" rtl="0" eaLnBrk="1" latinLnBrk="0" hangingPunct="1">
+              <a:spcBef>
+                <a:spcPct val="20000"/>
+              </a:spcBef>
+              <a:buFont typeface="Arial" pitchFamily="34" charset="0"/>
+              <a:buChar char="•"/>
+              <a:defRPr sz="3200" kern="1200">
+                <a:solidFill>
+                  <a:schemeClr val="tx1"/>
+                </a:solidFill>
+                <a:latin typeface="+mn-lt"/>
+                <a:ea typeface="+mn-ea"/>
+                <a:cs typeface="+mn-cs"/>
+              </a:defRPr>
+            </a:lvl1pPr>
+            <a:lvl2pPr marL="742950" indent="-285750" algn="l" defTabSz="914400" rtl="0" eaLnBrk="1" latinLnBrk="0" hangingPunct="1">
+              <a:spcBef>
+                <a:spcPct val="20000"/>
+              </a:spcBef>
+              <a:buFont typeface="Arial" pitchFamily="34" charset="0"/>
+              <a:buChar char="–"/>
+              <a:defRPr sz="2800" kern="1200">
+                <a:solidFill>
+                  <a:schemeClr val="tx1"/>
+                </a:solidFill>
+                <a:latin typeface="+mn-lt"/>
+                <a:ea typeface="+mn-ea"/>
+                <a:cs typeface="+mn-cs"/>
+              </a:defRPr>
+            </a:lvl2pPr>
+            <a:lvl3pPr marL="1143000" indent="-228600" algn="l" defTabSz="914400" rtl="0" eaLnBrk="1" latinLnBrk="0" hangingPunct="1">
+              <a:spcBef>
+                <a:spcPct val="20000"/>
+              </a:spcBef>
+              <a:buFont typeface="Arial" pitchFamily="34" charset="0"/>
+              <a:buChar char="•"/>
+              <a:defRPr sz="2400" kern="1200">
+                <a:solidFill>
+                  <a:schemeClr val="tx1"/>
+                </a:solidFill>
+                <a:latin typeface="+mn-lt"/>
+                <a:ea typeface="+mn-ea"/>
+                <a:cs typeface="+mn-cs"/>
+              </a:defRPr>
+            </a:lvl3pPr>
+            <a:lvl4pPr marL="1600200" indent="-228600" algn="l" defTabSz="914400" rtl="0" eaLnBrk="1" latinLnBrk="0" hangingPunct="1">
+              <a:spcBef>
+                <a:spcPct val="20000"/>
+              </a:spcBef>
+              <a:buFont typeface="Arial" pitchFamily="34" charset="0"/>
+              <a:buChar char="–"/>
+              <a:defRPr sz="2000" kern="1200">
+                <a:solidFill>
+                  <a:schemeClr val="tx1"/>
+                </a:solidFill>
+                <a:latin typeface="+mn-lt"/>
+                <a:ea typeface="+mn-ea"/>
+                <a:cs typeface="+mn-cs"/>
+              </a:defRPr>
+            </a:lvl4pPr>
+            <a:lvl5pPr marL="2057400" indent="-228600" algn="l" defTabSz="914400" rtl="0" eaLnBrk="1" latinLnBrk="0" hangingPunct="1">
+              <a:spcBef>
+                <a:spcPct val="20000"/>
+              </a:spcBef>
+              <a:buFont typeface="Arial" pitchFamily="34" charset="0"/>
+              <a:buChar char="»"/>
+              <a:defRPr sz="2000" kern="1200">
+                <a:solidFill>
+                  <a:schemeClr val="tx1"/>
+                </a:solidFill>
+                <a:latin typeface="+mn-lt"/>
+                <a:ea typeface="+mn-ea"/>
+                <a:cs typeface="+mn-cs"/>
+              </a:defRPr>
+            </a:lvl5pPr>
+            <a:lvl6pPr marL="2514600" indent="-228600" algn="l" defTabSz="914400" rtl="0" eaLnBrk="1" latinLnBrk="0" hangingPunct="1">
+              <a:spcBef>
+                <a:spcPct val="20000"/>
+              </a:spcBef>
+              <a:buFont typeface="Arial" pitchFamily="34" charset="0"/>
+              <a:buChar char="•"/>
+              <a:defRPr sz="2000" kern="1200">
+                <a:solidFill>
+                  <a:schemeClr val="tx1"/>
+                </a:solidFill>
+                <a:latin typeface="+mn-lt"/>
+                <a:ea typeface="+mn-ea"/>
+                <a:cs typeface="+mn-cs"/>
+              </a:defRPr>
+            </a:lvl6pPr>
+            <a:lvl7pPr marL="2971800" indent="-228600" algn="l" defTabSz="914400" rtl="0" eaLnBrk="1" latinLnBrk="0" hangingPunct="1">
+              <a:spcBef>
+                <a:spcPct val="20000"/>
+              </a:spcBef>
+              <a:buFont typeface="Arial" pitchFamily="34" charset="0"/>
+              <a:buChar char="•"/>
+              <a:defRPr sz="2000" kern="1200">
+                <a:solidFill>
+                  <a:schemeClr val="tx1"/>
+                </a:solidFill>
+                <a:latin typeface="+mn-lt"/>
+                <a:ea typeface="+mn-ea"/>
+                <a:cs typeface="+mn-cs"/>
+              </a:defRPr>
+            </a:lvl7pPr>
+            <a:lvl8pPr marL="3429000" indent="-228600" algn="l" defTabSz="914400" rtl="0" eaLnBrk="1" latinLnBrk="0" hangingPunct="1">
+              <a:spcBef>
+                <a:spcPct val="20000"/>
+              </a:spcBef>
+              <a:buFont typeface="Arial" pitchFamily="34" charset="0"/>
+              <a:buChar char="•"/>
+              <a:defRPr sz="2000" kern="1200">
+                <a:solidFill>
+                  <a:schemeClr val="tx1"/>
+                </a:solidFill>
+                <a:latin typeface="+mn-lt"/>
+                <a:ea typeface="+mn-ea"/>
+                <a:cs typeface="+mn-cs"/>
+              </a:defRPr>
+            </a:lvl8pPr>
+            <a:lvl9pPr marL="3886200" indent="-228600" algn="l" defTabSz="914400" rtl="0" eaLnBrk="1" latinLnBrk="0" hangingPunct="1">
+              <a:spcBef>
+                <a:spcPct val="20000"/>
+              </a:spcBef>
+              <a:buFont typeface="Arial" pitchFamily="34" charset="0"/>
+              <a:buChar char="•"/>
+              <a:defRPr sz="2000" kern="1200">
+                <a:solidFill>
+                  <a:schemeClr val="tx1"/>
+                </a:solidFill>
+                <a:latin typeface="+mn-lt"/>
+                <a:ea typeface="+mn-ea"/>
+                <a:cs typeface="+mn-cs"/>
+              </a:defRPr>
+            </a:lvl9pPr>
+          </a:lstStyle>
+          <a:p>
+            <a:r>
+              <a:rPr lang="en-US" sz="2400" dirty="0" smtClean="0"/>
+              <a:t> Initialize the </a:t>
+            </a:r>
+            <a:r>
+              <a:rPr lang="en-US" sz="2400" dirty="0" err="1" smtClean="0"/>
+              <a:t>hashtable</a:t>
+            </a:r>
+            <a:r>
+              <a:rPr lang="en-US" sz="2400" dirty="0" smtClean="0"/>
+              <a:t> </a:t>
+            </a:r>
+          </a:p>
+          <a:p>
+            <a:r>
+              <a:rPr lang="en-US" sz="2400" dirty="0" smtClean="0"/>
+              <a:t>Create the database for entered files in argument</a:t>
+            </a:r>
+          </a:p>
+          <a:p>
+            <a:pPr lvl="1"/>
+            <a:r>
+              <a:rPr lang="en-US" sz="2000" dirty="0" smtClean="0"/>
+              <a:t>For each </a:t>
+            </a:r>
+            <a:r>
+              <a:rPr lang="en-US" sz="2000" dirty="0" err="1" smtClean="0"/>
+              <a:t>arg</a:t>
+            </a:r>
+            <a:r>
+              <a:rPr lang="en-US" sz="2000" dirty="0" smtClean="0"/>
+              <a:t>/ files read the files to process word and insert into the </a:t>
+            </a:r>
+            <a:r>
+              <a:rPr lang="en-US" sz="2000" dirty="0" err="1" smtClean="0"/>
+              <a:t>hashtable</a:t>
+            </a:r>
+            <a:r>
+              <a:rPr lang="en-US" sz="2000" dirty="0" smtClean="0"/>
+              <a:t> in loop</a:t>
+            </a:r>
+          </a:p>
+          <a:p>
+            <a:pPr lvl="2"/>
+            <a:r>
+              <a:rPr lang="en-US" sz="1600" dirty="0"/>
+              <a:t>Inverted </a:t>
+            </a:r>
+            <a:r>
+              <a:rPr lang="en-US" sz="1600" dirty="0" err="1"/>
+              <a:t>hashtable</a:t>
+            </a:r>
+            <a:r>
+              <a:rPr lang="en-US" sz="1600" dirty="0"/>
+              <a:t> [files: word and word count]</a:t>
+            </a:r>
+          </a:p>
+          <a:p>
+            <a:pPr lvl="2"/>
+            <a:r>
+              <a:rPr lang="en-US" sz="1600" dirty="0" smtClean="0"/>
+              <a:t>Forward </a:t>
+            </a:r>
+            <a:r>
+              <a:rPr lang="en-US" sz="1600" dirty="0" err="1"/>
+              <a:t>hashtable</a:t>
+            </a:r>
+            <a:r>
+              <a:rPr lang="en-US" sz="1600" dirty="0"/>
+              <a:t> [words: file names</a:t>
+            </a:r>
+            <a:r>
+              <a:rPr lang="en-US" sz="1600" dirty="0" smtClean="0"/>
+              <a:t>]</a:t>
+            </a:r>
+          </a:p>
+          <a:p>
+            <a:r>
+              <a:rPr lang="en-US" sz="2400" dirty="0" smtClean="0"/>
+              <a:t>Search for the word entered by the user</a:t>
+            </a:r>
+          </a:p>
+          <a:p>
+            <a:pPr lvl="1"/>
+            <a:r>
+              <a:rPr lang="en-US" sz="2000" dirty="0" smtClean="0"/>
+              <a:t>Given the word, find the key value and go to the key index of the hash table and search for that word’s filename and it’s count and print accordingly</a:t>
+            </a:r>
+          </a:p>
+          <a:p>
+            <a:r>
+              <a:rPr lang="en-US" sz="2400" dirty="0" smtClean="0"/>
+              <a:t>Print the </a:t>
+            </a:r>
+            <a:r>
+              <a:rPr lang="en-US" sz="2400" dirty="0" err="1" smtClean="0"/>
+              <a:t>hashtable</a:t>
+            </a:r>
+            <a:r>
+              <a:rPr lang="en-US" sz="2400" dirty="0" smtClean="0"/>
+              <a:t> data</a:t>
+            </a:r>
+          </a:p>
+          <a:p>
+            <a:pPr lvl="1"/>
+            <a:r>
+              <a:rPr lang="en-US" sz="2000" dirty="0" smtClean="0"/>
+              <a:t>Print the filename, the word count for a given word each time</a:t>
+            </a:r>
+          </a:p>
+          <a:p>
+            <a:pPr lvl="1"/>
+            <a:endParaRPr lang="en-US" sz="2000" dirty="0" smtClean="0"/>
+          </a:p>
+          <a:p>
+            <a:endParaRPr lang="en-US" dirty="0" smtClean="0"/>
+          </a:p>
+          <a:p>
+            <a:endParaRPr lang="en-US" dirty="0" smtClean="0"/>
+          </a:p>
+          <a:p>
+            <a:endParaRPr lang="en-US" dirty="0" smtClean="0"/>
+          </a:p>
+          <a:p>
+            <a:endParaRPr lang="en-US" dirty="0" smtClean="0"/>
+          </a:p>
+          <a:p>
             <a:endParaRPr lang="en-US" dirty="0"/>
           </a:p>
         </p:txBody>
@@ -4188,7 +4797,7 @@
     </p:spTree>
     <p:extLst>
       <p:ext uri="{BB962C8B-B14F-4D97-AF65-F5344CB8AC3E}">
-        <p14:creationId xmlns:p14="http://schemas.microsoft.com/office/powerpoint/2010/main" val="2716211004"/>
+        <p14:creationId xmlns:p14="http://schemas.microsoft.com/office/powerpoint/2010/main" val="3651843759"/>
       </p:ext>
     </p:extLst>
   </p:cSld>
@@ -4205,7 +4814,7 @@
 </p:sld>
 </file>
 
-<file path=ppt/slides/slide16.xml><?xml version="1.0" encoding="utf-8"?>
+<file path=ppt/slides/slide6.xml><?xml version="1.0" encoding="utf-8"?>
 <p:sld xmlns:a="http://schemas.openxmlformats.org/drawingml/2006/main" xmlns:r="http://schemas.openxmlformats.org/officeDocument/2006/relationships" xmlns:p="http://schemas.openxmlformats.org/presentationml/2006/main">
   <p:cSld>
     <p:spTree>
@@ -4232,46 +4841,41 @@
             <p:ph type="title"/>
           </p:nvPr>
         </p:nvSpPr>
+        <p:spPr/>
+        <p:txBody>
+          <a:bodyPr/>
+          <a:lstStyle/>
+          <a:p>
+            <a:r>
+              <a:rPr lang="en-US" dirty="0" smtClean="0"/>
+              <a:t>Algorithm- </a:t>
+            </a:r>
+            <a:r>
+              <a:rPr lang="en-US" dirty="0" err="1" smtClean="0"/>
+              <a:t>cont</a:t>
+            </a:r>
+            <a:r>
+              <a:rPr lang="en-US" dirty="0" smtClean="0"/>
+              <a:t>…</a:t>
+            </a:r>
+            <a:endParaRPr lang="en-US" dirty="0"/>
+          </a:p>
+        </p:txBody>
+      </p:sp>
+      <p:sp>
+        <p:nvSpPr>
+          <p:cNvPr id="3" name="Content Placeholder 2"/>
+          <p:cNvSpPr>
+            <a:spLocks noGrp="1"/>
+          </p:cNvSpPr>
+          <p:nvPr>
+            <p:ph idx="1"/>
+          </p:nvPr>
+        </p:nvSpPr>
         <p:spPr>
           <a:xfrm>
-            <a:off x="457200" y="76200"/>
-            <a:ext cx="8229600" cy="1143000"/>
-          </a:xfrm>
-        </p:spPr>
-        <p:txBody>
-          <a:bodyPr/>
-          <a:lstStyle/>
-          <a:p>
-            <a:r>
-              <a:rPr lang="en-US" dirty="0" smtClean="0"/>
-              <a:t>Algorithm- </a:t>
-            </a:r>
-            <a:r>
-              <a:rPr lang="en-US" dirty="0" err="1" smtClean="0"/>
-              <a:t>cont</a:t>
-            </a:r>
-            <a:r>
-              <a:rPr lang="en-US" dirty="0" smtClean="0"/>
-              <a:t>…</a:t>
-            </a:r>
-            <a:endParaRPr lang="en-US" dirty="0"/>
-          </a:p>
-        </p:txBody>
-      </p:sp>
-      <p:sp>
-        <p:nvSpPr>
-          <p:cNvPr id="3" name="Content Placeholder 2"/>
-          <p:cNvSpPr>
-            <a:spLocks noGrp="1"/>
-          </p:cNvSpPr>
-          <p:nvPr>
-            <p:ph idx="1"/>
-          </p:nvPr>
-        </p:nvSpPr>
-        <p:spPr>
-          <a:xfrm>
-            <a:off x="304800" y="914400"/>
-            <a:ext cx="8686800" cy="5867400"/>
+            <a:off x="457200" y="1447800"/>
+            <a:ext cx="8382000" cy="4876800"/>
           </a:xfrm>
         </p:spPr>
         <p:txBody>
@@ -4280,6 +4884,294 @@
           </a:bodyPr>
           <a:lstStyle/>
           <a:p>
+            <a:pPr lvl="1"/>
+            <a:endParaRPr lang="en-US" dirty="0" smtClean="0"/>
+          </a:p>
+          <a:p>
+            <a:pPr marL="457200" lvl="1" indent="0">
+              <a:buNone/>
+            </a:pPr>
+            <a:endParaRPr lang="en-US" dirty="0"/>
+          </a:p>
+        </p:txBody>
+      </p:sp>
+      <p:sp>
+        <p:nvSpPr>
+          <p:cNvPr id="4" name="Content Placeholder 2"/>
+          <p:cNvSpPr txBox="1">
+            <a:spLocks/>
+          </p:cNvSpPr>
+          <p:nvPr/>
+        </p:nvSpPr>
+        <p:spPr>
+          <a:xfrm>
+            <a:off x="304800" y="1600200"/>
+            <a:ext cx="8229600" cy="4525963"/>
+          </a:xfrm>
+          <a:prstGeom prst="rect">
+            <a:avLst/>
+          </a:prstGeom>
+        </p:spPr>
+        <p:txBody>
+          <a:bodyPr vert="horz" lIns="91440" tIns="45720" rIns="91440" bIns="45720" rtlCol="0">
+            <a:normAutofit/>
+          </a:bodyPr>
+          <a:lstStyle>
+            <a:lvl1pPr marL="342900" indent="-342900" algn="l" defTabSz="914400" rtl="0" eaLnBrk="1" latinLnBrk="0" hangingPunct="1">
+              <a:spcBef>
+                <a:spcPct val="20000"/>
+              </a:spcBef>
+              <a:buFont typeface="Arial" pitchFamily="34" charset="0"/>
+              <a:buChar char="•"/>
+              <a:defRPr sz="3200" kern="1200">
+                <a:solidFill>
+                  <a:schemeClr val="tx1"/>
+                </a:solidFill>
+                <a:latin typeface="+mn-lt"/>
+                <a:ea typeface="+mn-ea"/>
+                <a:cs typeface="+mn-cs"/>
+              </a:defRPr>
+            </a:lvl1pPr>
+            <a:lvl2pPr marL="742950" indent="-285750" algn="l" defTabSz="914400" rtl="0" eaLnBrk="1" latinLnBrk="0" hangingPunct="1">
+              <a:spcBef>
+                <a:spcPct val="20000"/>
+              </a:spcBef>
+              <a:buFont typeface="Arial" pitchFamily="34" charset="0"/>
+              <a:buChar char="–"/>
+              <a:defRPr sz="2800" kern="1200">
+                <a:solidFill>
+                  <a:schemeClr val="tx1"/>
+                </a:solidFill>
+                <a:latin typeface="+mn-lt"/>
+                <a:ea typeface="+mn-ea"/>
+                <a:cs typeface="+mn-cs"/>
+              </a:defRPr>
+            </a:lvl2pPr>
+            <a:lvl3pPr marL="1143000" indent="-228600" algn="l" defTabSz="914400" rtl="0" eaLnBrk="1" latinLnBrk="0" hangingPunct="1">
+              <a:spcBef>
+                <a:spcPct val="20000"/>
+              </a:spcBef>
+              <a:buFont typeface="Arial" pitchFamily="34" charset="0"/>
+              <a:buChar char="•"/>
+              <a:defRPr sz="2400" kern="1200">
+                <a:solidFill>
+                  <a:schemeClr val="tx1"/>
+                </a:solidFill>
+                <a:latin typeface="+mn-lt"/>
+                <a:ea typeface="+mn-ea"/>
+                <a:cs typeface="+mn-cs"/>
+              </a:defRPr>
+            </a:lvl3pPr>
+            <a:lvl4pPr marL="1600200" indent="-228600" algn="l" defTabSz="914400" rtl="0" eaLnBrk="1" latinLnBrk="0" hangingPunct="1">
+              <a:spcBef>
+                <a:spcPct val="20000"/>
+              </a:spcBef>
+              <a:buFont typeface="Arial" pitchFamily="34" charset="0"/>
+              <a:buChar char="–"/>
+              <a:defRPr sz="2000" kern="1200">
+                <a:solidFill>
+                  <a:schemeClr val="tx1"/>
+                </a:solidFill>
+                <a:latin typeface="+mn-lt"/>
+                <a:ea typeface="+mn-ea"/>
+                <a:cs typeface="+mn-cs"/>
+              </a:defRPr>
+            </a:lvl4pPr>
+            <a:lvl5pPr marL="2057400" indent="-228600" algn="l" defTabSz="914400" rtl="0" eaLnBrk="1" latinLnBrk="0" hangingPunct="1">
+              <a:spcBef>
+                <a:spcPct val="20000"/>
+              </a:spcBef>
+              <a:buFont typeface="Arial" pitchFamily="34" charset="0"/>
+              <a:buChar char="»"/>
+              <a:defRPr sz="2000" kern="1200">
+                <a:solidFill>
+                  <a:schemeClr val="tx1"/>
+                </a:solidFill>
+                <a:latin typeface="+mn-lt"/>
+                <a:ea typeface="+mn-ea"/>
+                <a:cs typeface="+mn-cs"/>
+              </a:defRPr>
+            </a:lvl5pPr>
+            <a:lvl6pPr marL="2514600" indent="-228600" algn="l" defTabSz="914400" rtl="0" eaLnBrk="1" latinLnBrk="0" hangingPunct="1">
+              <a:spcBef>
+                <a:spcPct val="20000"/>
+              </a:spcBef>
+              <a:buFont typeface="Arial" pitchFamily="34" charset="0"/>
+              <a:buChar char="•"/>
+              <a:defRPr sz="2000" kern="1200">
+                <a:solidFill>
+                  <a:schemeClr val="tx1"/>
+                </a:solidFill>
+                <a:latin typeface="+mn-lt"/>
+                <a:ea typeface="+mn-ea"/>
+                <a:cs typeface="+mn-cs"/>
+              </a:defRPr>
+            </a:lvl6pPr>
+            <a:lvl7pPr marL="2971800" indent="-228600" algn="l" defTabSz="914400" rtl="0" eaLnBrk="1" latinLnBrk="0" hangingPunct="1">
+              <a:spcBef>
+                <a:spcPct val="20000"/>
+              </a:spcBef>
+              <a:buFont typeface="Arial" pitchFamily="34" charset="0"/>
+              <a:buChar char="•"/>
+              <a:defRPr sz="2000" kern="1200">
+                <a:solidFill>
+                  <a:schemeClr val="tx1"/>
+                </a:solidFill>
+                <a:latin typeface="+mn-lt"/>
+                <a:ea typeface="+mn-ea"/>
+                <a:cs typeface="+mn-cs"/>
+              </a:defRPr>
+            </a:lvl7pPr>
+            <a:lvl8pPr marL="3429000" indent="-228600" algn="l" defTabSz="914400" rtl="0" eaLnBrk="1" latinLnBrk="0" hangingPunct="1">
+              <a:spcBef>
+                <a:spcPct val="20000"/>
+              </a:spcBef>
+              <a:buFont typeface="Arial" pitchFamily="34" charset="0"/>
+              <a:buChar char="•"/>
+              <a:defRPr sz="2000" kern="1200">
+                <a:solidFill>
+                  <a:schemeClr val="tx1"/>
+                </a:solidFill>
+                <a:latin typeface="+mn-lt"/>
+                <a:ea typeface="+mn-ea"/>
+                <a:cs typeface="+mn-cs"/>
+              </a:defRPr>
+            </a:lvl8pPr>
+            <a:lvl9pPr marL="3886200" indent="-228600" algn="l" defTabSz="914400" rtl="0" eaLnBrk="1" latinLnBrk="0" hangingPunct="1">
+              <a:spcBef>
+                <a:spcPct val="20000"/>
+              </a:spcBef>
+              <a:buFont typeface="Arial" pitchFamily="34" charset="0"/>
+              <a:buChar char="•"/>
+              <a:defRPr sz="2000" kern="1200">
+                <a:solidFill>
+                  <a:schemeClr val="tx1"/>
+                </a:solidFill>
+                <a:latin typeface="+mn-lt"/>
+                <a:ea typeface="+mn-ea"/>
+                <a:cs typeface="+mn-cs"/>
+              </a:defRPr>
+            </a:lvl9pPr>
+          </a:lstStyle>
+          <a:p>
+            <a:r>
+              <a:rPr lang="en-US" sz="2400" dirty="0" smtClean="0"/>
+              <a:t>Save the </a:t>
+            </a:r>
+            <a:r>
+              <a:rPr lang="en-US" sz="2400" dirty="0" err="1" smtClean="0"/>
+              <a:t>hashtable</a:t>
+            </a:r>
+            <a:r>
+              <a:rPr lang="en-US" sz="2400" dirty="0" smtClean="0"/>
+              <a:t> contents into .txt file</a:t>
+            </a:r>
+          </a:p>
+          <a:p>
+            <a:pPr lvl="1"/>
+            <a:r>
+              <a:rPr lang="en-US" sz="2000" dirty="0" smtClean="0"/>
+              <a:t>Write the contents of the </a:t>
+            </a:r>
+            <a:r>
+              <a:rPr lang="en-US" sz="2000" dirty="0" err="1" smtClean="0"/>
+              <a:t>hashtable</a:t>
+            </a:r>
+            <a:r>
+              <a:rPr lang="en-US" sz="2000" dirty="0" smtClean="0"/>
+              <a:t> into a file called ‘backup.txt’</a:t>
+            </a:r>
+          </a:p>
+          <a:p>
+            <a:r>
+              <a:rPr lang="en-US" sz="2400" dirty="0" smtClean="0"/>
+              <a:t>Update the given </a:t>
+            </a:r>
+            <a:r>
+              <a:rPr lang="en-US" sz="2400" dirty="0" err="1" smtClean="0"/>
+              <a:t>hashtable</a:t>
+            </a:r>
+            <a:r>
+              <a:rPr lang="en-US" sz="2400" dirty="0" smtClean="0"/>
+              <a:t> with a new file data</a:t>
+            </a:r>
+          </a:p>
+          <a:p>
+            <a:pPr lvl="1"/>
+            <a:r>
+              <a:rPr lang="en-US" sz="2000" dirty="0" smtClean="0"/>
+              <a:t>Read a new file and insert this data into the hash table and update with the existing data</a:t>
+            </a:r>
+          </a:p>
+          <a:p>
+            <a:r>
+              <a:rPr lang="en-US" sz="2400" dirty="0" smtClean="0"/>
+              <a:t>Destroy the </a:t>
+            </a:r>
+            <a:r>
+              <a:rPr lang="en-US" sz="2400" dirty="0" err="1" smtClean="0"/>
+              <a:t>hashtable</a:t>
+            </a:r>
+            <a:r>
+              <a:rPr lang="en-US" sz="2400" dirty="0" smtClean="0"/>
+              <a:t> contents</a:t>
+            </a:r>
+          </a:p>
+          <a:p>
+            <a:pPr lvl="1"/>
+            <a:r>
+              <a:rPr lang="en-US" sz="2000" dirty="0" smtClean="0"/>
+              <a:t>Free the memory allocated for the </a:t>
+            </a:r>
+            <a:r>
+              <a:rPr lang="en-US" sz="2000" dirty="0" err="1" smtClean="0"/>
+              <a:t>hashtable</a:t>
+            </a:r>
+            <a:endParaRPr lang="en-US" sz="2000" dirty="0"/>
+          </a:p>
+          <a:p>
+            <a:pPr lvl="2"/>
+            <a:r>
+              <a:rPr lang="en-US" sz="1600" dirty="0" smtClean="0"/>
+              <a:t>Free each link </a:t>
+            </a:r>
+            <a:r>
+              <a:rPr lang="en-US" sz="1600" dirty="0" err="1" smtClean="0"/>
+              <a:t>filetable</a:t>
+            </a:r>
+            <a:r>
+              <a:rPr lang="en-US" sz="1600" dirty="0" smtClean="0"/>
+              <a:t> contents links</a:t>
+            </a:r>
+          </a:p>
+          <a:p>
+            <a:pPr lvl="2"/>
+            <a:r>
+              <a:rPr lang="en-US" sz="1600" dirty="0" smtClean="0"/>
+              <a:t>Free each element </a:t>
+            </a:r>
+          </a:p>
+          <a:p>
+            <a:pPr lvl="2"/>
+            <a:endParaRPr lang="en-US" sz="1200" dirty="0" smtClean="0"/>
+          </a:p>
+          <a:p>
+            <a:pPr lvl="1"/>
+            <a:endParaRPr lang="en-US" sz="2000" dirty="0" smtClean="0"/>
+          </a:p>
+          <a:p>
+            <a:endParaRPr lang="en-US" dirty="0" smtClean="0"/>
+          </a:p>
+          <a:p>
+            <a:endParaRPr lang="en-US" dirty="0" smtClean="0"/>
+          </a:p>
+          <a:p>
+            <a:endParaRPr lang="en-US" dirty="0" smtClean="0"/>
+          </a:p>
+          <a:p>
+            <a:endParaRPr lang="en-US" dirty="0" smtClean="0"/>
+          </a:p>
+          <a:p>
             <a:endParaRPr lang="en-US" dirty="0"/>
           </a:p>
         </p:txBody>
@@ -4287,7 +5179,7 @@
     </p:spTree>
     <p:extLst>
       <p:ext uri="{BB962C8B-B14F-4D97-AF65-F5344CB8AC3E}">
-        <p14:creationId xmlns:p14="http://schemas.microsoft.com/office/powerpoint/2010/main" val="2318003554"/>
+        <p14:creationId xmlns:p14="http://schemas.microsoft.com/office/powerpoint/2010/main" val="4021731000"/>
       </p:ext>
     </p:extLst>
   </p:cSld>
@@ -4304,7 +5196,7 @@
 </p:sld>
 </file>
 
-<file path=ppt/slides/slide17.xml><?xml version="1.0" encoding="utf-8"?>
+<file path=ppt/slides/slide7.xml><?xml version="1.0" encoding="utf-8"?>
 <p:sld xmlns:a="http://schemas.openxmlformats.org/drawingml/2006/main" xmlns:r="http://schemas.openxmlformats.org/officeDocument/2006/relationships" xmlns:p="http://schemas.openxmlformats.org/presentationml/2006/main">
   <p:cSld>
     <p:spTree>
@@ -4370,23 +5262,14 @@
             <a:pPr lvl="1"/>
             <a:r>
               <a:rPr lang="en-US" dirty="0" smtClean="0"/>
-              <a:t>:  </a:t>
-            </a:r>
+              <a:t>:  search engines</a:t>
+            </a:r>
+          </a:p>
+          <a:p>
+            <a:pPr lvl="1"/>
             <a:r>
               <a:rPr lang="en-US" dirty="0" smtClean="0"/>
-              <a:t>search engines</a:t>
-            </a:r>
-            <a:endParaRPr lang="en-US" dirty="0" smtClean="0"/>
-          </a:p>
-          <a:p>
-            <a:pPr lvl="1"/>
-            <a:r>
-              <a:rPr lang="en-US" dirty="0" smtClean="0"/>
-              <a:t>:  </a:t>
-            </a:r>
-            <a:r>
-              <a:rPr lang="en-US" dirty="0" smtClean="0"/>
-              <a:t>biotechnology – Hiding message in DNA sequence </a:t>
+              <a:t>:  biotechnology – Hiding message in DNA sequence </a:t>
             </a:r>
           </a:p>
           <a:p>
@@ -4410,7 +5293,6 @@
               <a:rPr lang="en-US" dirty="0"/>
               <a:t>the forward index to an inverted index is only a matter of sorting the pairs by the words. </a:t>
             </a:r>
-            <a:endParaRPr lang="en-US" dirty="0"/>
           </a:p>
         </p:txBody>
       </p:sp>
@@ -4444,7 +5326,6 @@
               <a:rPr lang="en-US" dirty="0" smtClean="0"/>
               <a:t>Search is time consuming for a large database</a:t>
             </a:r>
-            <a:endParaRPr lang="en-US" dirty="0" smtClean="0"/>
           </a:p>
           <a:p>
             <a:endParaRPr lang="en-US" dirty="0" smtClean="0"/>
@@ -4489,7 +5370,7 @@
 </p:sld>
 </file>
 
-<file path=ppt/slides/slide18.xml><?xml version="1.0" encoding="utf-8"?>
+<file path=ppt/slides/slide8.xml><?xml version="1.0" encoding="utf-8"?>
 <p:sld xmlns:a="http://schemas.openxmlformats.org/drawingml/2006/main" xmlns:r="http://schemas.openxmlformats.org/officeDocument/2006/relationships" xmlns:p="http://schemas.openxmlformats.org/presentationml/2006/main">
   <p:cSld>
     <p:spTree>
@@ -4549,7 +5430,7 @@
         </p:spPr>
         <p:txBody>
           <a:bodyPr>
-            <a:normAutofit fontScale="92500" lnSpcReduction="10000"/>
+            <a:normAutofit/>
           </a:bodyPr>
           <a:lstStyle/>
           <a:p>
@@ -4567,11 +5448,7 @@
           <a:p>
             <a:r>
               <a:rPr lang="en-US" dirty="0" smtClean="0"/>
-              <a:t>Lookup speed: how quickly a word can be found in th</a:t>
-            </a:r>
-            <a:r>
-              <a:rPr lang="en-US" dirty="0" smtClean="0"/>
-              <a:t>e inverted index. </a:t>
+              <a:t>Lookup speed: how quickly a word can be found in the inverted index. </a:t>
             </a:r>
             <a:r>
               <a:rPr lang="en-US" dirty="0" err="1" smtClean="0"/>
@@ -4581,7 +5458,6 @@
               <a:rPr lang="en-US" dirty="0" smtClean="0"/>
               <a:t> the speed of finding an entry in the data structure, as compared with how quickly it can be updated or removed.</a:t>
             </a:r>
-            <a:endParaRPr lang="en-US" dirty="0" smtClean="0"/>
           </a:p>
           <a:p>
             <a:pPr marL="0" indent="0">
@@ -4780,7 +5656,7 @@
 </p:sld>
 </file>
 
-<file path=ppt/slides/slide19.xml><?xml version="1.0" encoding="utf-8"?>
+<file path=ppt/slides/slide9.xml><?xml version="1.0" encoding="utf-8"?>
 <p:sld xmlns:a="http://schemas.openxmlformats.org/drawingml/2006/main" xmlns:r="http://schemas.openxmlformats.org/officeDocument/2006/relationships" xmlns:p="http://schemas.openxmlformats.org/presentationml/2006/main">
   <p:cSld>
     <p:spTree>
@@ -4887,1721 +5763,53 @@
 </p:sld>
 </file>
 
-<file path=ppt/slides/slide2.xml><?xml version="1.0" encoding="utf-8"?>
-<p:sld xmlns:a="http://schemas.openxmlformats.org/drawingml/2006/main" xmlns:r="http://schemas.openxmlformats.org/officeDocument/2006/relationships" xmlns:p="http://schemas.openxmlformats.org/presentationml/2006/main">
-  <p:cSld>
-    <p:spTree>
-      <p:nvGrpSpPr>
-        <p:cNvPr id="1" name=""/>
-        <p:cNvGrpSpPr/>
-        <p:nvPr/>
-      </p:nvGrpSpPr>
-      <p:grpSpPr>
-        <a:xfrm>
-          <a:off x="0" y="0"/>
-          <a:ext cx="0" cy="0"/>
-          <a:chOff x="0" y="0"/>
-          <a:chExt cx="0" cy="0"/>
-        </a:xfrm>
-      </p:grpSpPr>
-      <p:sp>
-        <p:nvSpPr>
-          <p:cNvPr id="2" name="Title 1"/>
-          <p:cNvSpPr>
-            <a:spLocks noGrp="1"/>
-          </p:cNvSpPr>
-          <p:nvPr>
-            <p:ph type="title"/>
-          </p:nvPr>
-        </p:nvSpPr>
-        <p:spPr/>
-        <p:txBody>
-          <a:bodyPr/>
-          <a:lstStyle/>
-          <a:p>
-            <a:r>
-              <a:rPr lang="en-US" dirty="0" smtClean="0"/>
-              <a:t>Abstract</a:t>
-            </a:r>
-            <a:endParaRPr lang="en-US" dirty="0"/>
-          </a:p>
-        </p:txBody>
-      </p:sp>
-      <p:sp>
-        <p:nvSpPr>
-          <p:cNvPr id="3" name="Content Placeholder 2"/>
-          <p:cNvSpPr>
-            <a:spLocks noGrp="1"/>
-          </p:cNvSpPr>
-          <p:nvPr>
-            <p:ph idx="1"/>
-          </p:nvPr>
-        </p:nvSpPr>
-        <p:spPr/>
-        <p:txBody>
-          <a:bodyPr>
-            <a:normAutofit lnSpcReduction="10000"/>
-          </a:bodyPr>
-          <a:lstStyle/>
-          <a:p>
-            <a:r>
-              <a:rPr lang="en-US" dirty="0" smtClean="0"/>
-              <a:t>Introduction</a:t>
-            </a:r>
-          </a:p>
-          <a:p>
-            <a:r>
-              <a:rPr lang="en-US" dirty="0" smtClean="0"/>
-              <a:t>Flowchart</a:t>
-            </a:r>
-          </a:p>
-          <a:p>
-            <a:r>
-              <a:rPr lang="en-US" dirty="0" smtClean="0"/>
-              <a:t>Algorithm</a:t>
-            </a:r>
-          </a:p>
-          <a:p>
-            <a:r>
-              <a:rPr lang="en-US" dirty="0" smtClean="0"/>
-              <a:t>Advantages and Disadvantages</a:t>
-            </a:r>
-          </a:p>
-          <a:p>
-            <a:r>
-              <a:rPr lang="en-US" dirty="0" smtClean="0"/>
-              <a:t>Challenges</a:t>
-            </a:r>
-          </a:p>
-          <a:p>
-            <a:r>
-              <a:rPr lang="en-US" dirty="0" smtClean="0"/>
-              <a:t>Further Improvements</a:t>
-            </a:r>
-          </a:p>
-          <a:p>
-            <a:r>
-              <a:rPr lang="en-US" dirty="0" smtClean="0"/>
-              <a:t>References</a:t>
-            </a:r>
-          </a:p>
-          <a:p>
-            <a:r>
-              <a:rPr lang="en-US" dirty="0" smtClean="0"/>
-              <a:t>Conclusion</a:t>
-            </a:r>
-          </a:p>
-          <a:p>
-            <a:pPr marL="0" indent="0">
-              <a:buNone/>
-            </a:pPr>
-            <a:endParaRPr lang="en-US" dirty="0"/>
-          </a:p>
-        </p:txBody>
-      </p:sp>
-    </p:spTree>
-    <p:extLst>
-      <p:ext uri="{BB962C8B-B14F-4D97-AF65-F5344CB8AC3E}">
-        <p14:creationId xmlns:p14="http://schemas.microsoft.com/office/powerpoint/2010/main" val="265109911"/>
-      </p:ext>
-    </p:extLst>
-  </p:cSld>
-  <p:clrMapOvr>
-    <a:masterClrMapping/>
-  </p:clrMapOvr>
-  <p:timing>
-    <p:tnLst>
-      <p:par>
-        <p:cTn id="1" dur="indefinite" restart="never" nodeType="tmRoot"/>
-      </p:par>
-    </p:tnLst>
-  </p:timing>
-</p:sld>
-</file>
-
-<file path=ppt/slides/slide20.xml><?xml version="1.0" encoding="utf-8"?>
-<p:sld xmlns:a="http://schemas.openxmlformats.org/drawingml/2006/main" xmlns:r="http://schemas.openxmlformats.org/officeDocument/2006/relationships" xmlns:p="http://schemas.openxmlformats.org/presentationml/2006/main">
-  <p:cSld>
-    <p:spTree>
-      <p:nvGrpSpPr>
-        <p:cNvPr id="1" name=""/>
-        <p:cNvGrpSpPr/>
-        <p:nvPr/>
-      </p:nvGrpSpPr>
-      <p:grpSpPr>
-        <a:xfrm>
-          <a:off x="0" y="0"/>
-          <a:ext cx="0" cy="0"/>
-          <a:chOff x="0" y="0"/>
-          <a:chExt cx="0" cy="0"/>
-        </a:xfrm>
-      </p:grpSpPr>
-      <p:sp>
-        <p:nvSpPr>
-          <p:cNvPr id="2" name="Title 1"/>
-          <p:cNvSpPr>
-            <a:spLocks noGrp="1"/>
-          </p:cNvSpPr>
-          <p:nvPr>
-            <p:ph type="title"/>
-          </p:nvPr>
-        </p:nvSpPr>
-        <p:spPr/>
-        <p:txBody>
-          <a:bodyPr/>
-          <a:lstStyle/>
-          <a:p>
-            <a:r>
-              <a:rPr lang="en-US" dirty="0" smtClean="0"/>
-              <a:t>Conclusion</a:t>
-            </a:r>
-            <a:endParaRPr lang="en-US" dirty="0"/>
-          </a:p>
-        </p:txBody>
-      </p:sp>
-      <p:sp>
-        <p:nvSpPr>
-          <p:cNvPr id="3" name="Content Placeholder 2"/>
-          <p:cNvSpPr>
-            <a:spLocks noGrp="1"/>
-          </p:cNvSpPr>
-          <p:nvPr>
-            <p:ph idx="1"/>
-          </p:nvPr>
-        </p:nvSpPr>
-        <p:spPr>
-          <a:xfrm>
-            <a:off x="457200" y="1524000"/>
-            <a:ext cx="8229600" cy="4525963"/>
-          </a:xfrm>
-        </p:spPr>
-        <p:txBody>
-          <a:bodyPr/>
-          <a:lstStyle/>
-          <a:p>
-            <a:pPr marL="0" indent="0">
-              <a:buNone/>
-            </a:pPr>
-            <a:r>
-              <a:rPr lang="en-US" dirty="0" smtClean="0"/>
-              <a:t>Proposed text Indexing is </a:t>
-            </a:r>
-            <a:r>
-              <a:rPr lang="en-US" dirty="0" smtClean="0"/>
-              <a:t>a good proposal for </a:t>
-            </a:r>
-            <a:r>
-              <a:rPr lang="en-US" dirty="0" smtClean="0"/>
-              <a:t>small </a:t>
-            </a:r>
-            <a:r>
-              <a:rPr lang="en-US" dirty="0" smtClean="0"/>
-              <a:t>data </a:t>
-            </a:r>
-            <a:r>
-              <a:rPr lang="en-US" dirty="0" smtClean="0"/>
-              <a:t>search engine. Helps in retrieval of information like searching for a word from a set of documents.  </a:t>
-            </a:r>
-            <a:endParaRPr lang="en-US" dirty="0"/>
-          </a:p>
-        </p:txBody>
-      </p:sp>
-    </p:spTree>
-    <p:extLst>
-      <p:ext uri="{BB962C8B-B14F-4D97-AF65-F5344CB8AC3E}">
-        <p14:creationId xmlns:p14="http://schemas.microsoft.com/office/powerpoint/2010/main" val="2097359749"/>
-      </p:ext>
-    </p:extLst>
-  </p:cSld>
-  <p:clrMapOvr>
-    <a:masterClrMapping/>
-  </p:clrMapOvr>
-  <p:timing>
-    <p:tnLst>
-      <p:par>
-        <p:cTn id="1" dur="indefinite" restart="never" nodeType="tmRoot"/>
-      </p:par>
-    </p:tnLst>
-  </p:timing>
-</p:sld>
-</file>
-
-<file path=ppt/slides/slide21.xml><?xml version="1.0" encoding="utf-8"?>
-<p:sld xmlns:a="http://schemas.openxmlformats.org/drawingml/2006/main" xmlns:r="http://schemas.openxmlformats.org/officeDocument/2006/relationships" xmlns:p="http://schemas.openxmlformats.org/presentationml/2006/main">
-  <p:cSld>
-    <p:spTree>
-      <p:nvGrpSpPr>
-        <p:cNvPr id="1" name=""/>
-        <p:cNvGrpSpPr/>
-        <p:nvPr/>
-      </p:nvGrpSpPr>
-      <p:grpSpPr>
-        <a:xfrm>
-          <a:off x="0" y="0"/>
-          <a:ext cx="0" cy="0"/>
-          <a:chOff x="0" y="0"/>
-          <a:chExt cx="0" cy="0"/>
-        </a:xfrm>
-      </p:grpSpPr>
-      <p:sp>
-        <p:nvSpPr>
-          <p:cNvPr id="2" name="Title 1"/>
-          <p:cNvSpPr>
-            <a:spLocks noGrp="1"/>
-          </p:cNvSpPr>
-          <p:nvPr>
-            <p:ph type="title"/>
-          </p:nvPr>
-        </p:nvSpPr>
-        <p:spPr/>
-        <p:txBody>
-          <a:bodyPr/>
-          <a:lstStyle/>
-          <a:p>
-            <a:r>
-              <a:rPr lang="en-US" dirty="0" smtClean="0"/>
-              <a:t>References</a:t>
-            </a:r>
-            <a:endParaRPr lang="en-US" dirty="0"/>
-          </a:p>
-        </p:txBody>
-      </p:sp>
-      <p:sp>
-        <p:nvSpPr>
-          <p:cNvPr id="3" name="Content Placeholder 2"/>
-          <p:cNvSpPr>
-            <a:spLocks noGrp="1"/>
-          </p:cNvSpPr>
-          <p:nvPr>
-            <p:ph idx="1"/>
-          </p:nvPr>
-        </p:nvSpPr>
-        <p:spPr/>
-        <p:txBody>
-          <a:bodyPr>
-            <a:normAutofit/>
-          </a:bodyPr>
-          <a:lstStyle/>
-          <a:p>
-            <a:pPr marL="0" indent="0">
-              <a:buNone/>
-            </a:pPr>
-            <a:r>
-              <a:rPr lang="en-US" sz="1400" dirty="0"/>
-              <a:t>1</a:t>
-            </a:r>
-            <a:r>
-              <a:rPr lang="en-US" sz="1400" dirty="0" smtClean="0"/>
-              <a:t>.</a:t>
-            </a:r>
-            <a:r>
-              <a:rPr lang="en-US" sz="1400" b="1" dirty="0"/>
-              <a:t> </a:t>
-            </a:r>
-            <a:r>
-              <a:rPr lang="en-US" sz="1400" b="1" dirty="0"/>
-              <a:t>https://en.wikipedia.org/wiki/Search_engine_indexing</a:t>
-            </a:r>
-            <a:endParaRPr lang="en-US" sz="1400" dirty="0"/>
-          </a:p>
-          <a:p>
-            <a:pPr marL="0" indent="0">
-              <a:buNone/>
-            </a:pPr>
-            <a:endParaRPr lang="en-US" sz="1400" dirty="0" smtClean="0"/>
-          </a:p>
-          <a:p>
-            <a:pPr marL="0" indent="0">
-              <a:buNone/>
-            </a:pPr>
-            <a:endParaRPr lang="en-US" sz="1400" dirty="0" smtClean="0"/>
-          </a:p>
-          <a:p>
-            <a:pPr marL="0" indent="0">
-              <a:buNone/>
-            </a:pPr>
-            <a:endParaRPr lang="en-US" sz="1400" dirty="0"/>
-          </a:p>
-          <a:p>
-            <a:pPr marL="0" indent="0">
-              <a:buNone/>
-            </a:pPr>
-            <a:endParaRPr lang="en-US" sz="1400" dirty="0"/>
-          </a:p>
-        </p:txBody>
-      </p:sp>
-    </p:spTree>
-    <p:extLst>
-      <p:ext uri="{BB962C8B-B14F-4D97-AF65-F5344CB8AC3E}">
-        <p14:creationId xmlns:p14="http://schemas.microsoft.com/office/powerpoint/2010/main" val="2090016322"/>
-      </p:ext>
-    </p:extLst>
-  </p:cSld>
-  <p:clrMapOvr>
-    <a:masterClrMapping/>
-  </p:clrMapOvr>
-  <p:timing>
-    <p:tnLst>
-      <p:par>
-        <p:cTn id="1" dur="indefinite" restart="never" nodeType="tmRoot"/>
-      </p:par>
-    </p:tnLst>
-  </p:timing>
-</p:sld>
-</file>
-
-<file path=ppt/slides/slide3.xml><?xml version="1.0" encoding="utf-8"?>
-<p:sld xmlns:a="http://schemas.openxmlformats.org/drawingml/2006/main" xmlns:r="http://schemas.openxmlformats.org/officeDocument/2006/relationships" xmlns:p="http://schemas.openxmlformats.org/presentationml/2006/main">
-  <p:cSld>
-    <p:spTree>
-      <p:nvGrpSpPr>
-        <p:cNvPr id="1" name=""/>
-        <p:cNvGrpSpPr/>
-        <p:nvPr/>
-      </p:nvGrpSpPr>
-      <p:grpSpPr>
-        <a:xfrm>
-          <a:off x="0" y="0"/>
-          <a:ext cx="0" cy="0"/>
-          <a:chOff x="0" y="0"/>
-          <a:chExt cx="0" cy="0"/>
-        </a:xfrm>
-      </p:grpSpPr>
-      <p:sp>
-        <p:nvSpPr>
-          <p:cNvPr id="2" name="Title 1"/>
-          <p:cNvSpPr>
-            <a:spLocks noGrp="1"/>
-          </p:cNvSpPr>
-          <p:nvPr>
-            <p:ph type="title"/>
-          </p:nvPr>
-        </p:nvSpPr>
-        <p:spPr>
-          <a:xfrm>
-            <a:off x="457200" y="274638"/>
-            <a:ext cx="8153400" cy="715962"/>
-          </a:xfrm>
-        </p:spPr>
-        <p:txBody>
-          <a:bodyPr>
-            <a:normAutofit fontScale="90000"/>
-          </a:bodyPr>
-          <a:lstStyle/>
-          <a:p>
-            <a:r>
-              <a:rPr lang="en-US" dirty="0" smtClean="0"/>
-              <a:t>Introduction</a:t>
-            </a:r>
-            <a:endParaRPr lang="en-US" dirty="0"/>
-          </a:p>
-        </p:txBody>
-      </p:sp>
-      <p:sp>
-        <p:nvSpPr>
-          <p:cNvPr id="3" name="Content Placeholder 2"/>
-          <p:cNvSpPr>
-            <a:spLocks noGrp="1"/>
-          </p:cNvSpPr>
-          <p:nvPr>
-            <p:ph idx="1"/>
-          </p:nvPr>
-        </p:nvSpPr>
-        <p:spPr>
-          <a:xfrm>
-            <a:off x="457200" y="1066800"/>
-            <a:ext cx="8229600" cy="5059363"/>
-          </a:xfrm>
-        </p:spPr>
-        <p:txBody>
-          <a:bodyPr>
-            <a:normAutofit/>
-          </a:bodyPr>
-          <a:lstStyle/>
-          <a:p>
-            <a:r>
-              <a:rPr lang="en-US" sz="2400" dirty="0" smtClean="0"/>
-              <a:t>This project is about text indexing, a method to collect, parse and store data for fast and efficient ways of retrieving/searching information</a:t>
-            </a:r>
-          </a:p>
-          <a:p>
-            <a:r>
-              <a:rPr lang="en-US" sz="2400" dirty="0" smtClean="0"/>
-              <a:t>Helps in finding required words within one or more text files and thus serves as a search query through a database.</a:t>
-            </a:r>
-          </a:p>
-          <a:p>
-            <a:r>
-              <a:rPr lang="en-US" sz="2400" dirty="0" smtClean="0"/>
-              <a:t>Index data structure:</a:t>
-            </a:r>
-          </a:p>
-          <a:p>
-            <a:pPr lvl="1"/>
-            <a:r>
-              <a:rPr lang="en-US" sz="2000" dirty="0" smtClean="0"/>
-              <a:t>Stores a list of occurrence of the words in the form of </a:t>
-            </a:r>
-            <a:r>
-              <a:rPr lang="en-US" sz="2000" dirty="0" err="1" smtClean="0"/>
-              <a:t>hashtable</a:t>
-            </a:r>
-            <a:r>
-              <a:rPr lang="en-US" sz="2000" dirty="0" smtClean="0"/>
-              <a:t>. </a:t>
-            </a:r>
-          </a:p>
-        </p:txBody>
-      </p:sp>
-    </p:spTree>
-    <p:extLst>
-      <p:ext uri="{BB962C8B-B14F-4D97-AF65-F5344CB8AC3E}">
-        <p14:creationId xmlns:p14="http://schemas.microsoft.com/office/powerpoint/2010/main" val="794887019"/>
-      </p:ext>
-    </p:extLst>
-  </p:cSld>
-  <p:clrMapOvr>
-    <a:masterClrMapping/>
-  </p:clrMapOvr>
-  <p:timing>
-    <p:tnLst>
-      <p:par>
-        <p:cTn id="1" dur="indefinite" restart="never" nodeType="tmRoot"/>
-      </p:par>
-    </p:tnLst>
-  </p:timing>
-</p:sld>
-</file>
-
-<file path=ppt/slides/slide4.xml><?xml version="1.0" encoding="utf-8"?>
-<p:sld xmlns:a="http://schemas.openxmlformats.org/drawingml/2006/main" xmlns:r="http://schemas.openxmlformats.org/officeDocument/2006/relationships" xmlns:p="http://schemas.openxmlformats.org/presentationml/2006/main">
-  <p:cSld>
-    <p:spTree>
-      <p:nvGrpSpPr>
-        <p:cNvPr id="1" name=""/>
-        <p:cNvGrpSpPr/>
-        <p:nvPr/>
-      </p:nvGrpSpPr>
-      <p:grpSpPr>
-        <a:xfrm>
-          <a:off x="0" y="0"/>
-          <a:ext cx="0" cy="0"/>
-          <a:chOff x="0" y="0"/>
-          <a:chExt cx="0" cy="0"/>
-        </a:xfrm>
-      </p:grpSpPr>
-      <p:sp>
-        <p:nvSpPr>
-          <p:cNvPr id="3" name="Content Placeholder 2"/>
-          <p:cNvSpPr>
-            <a:spLocks noGrp="1"/>
-          </p:cNvSpPr>
-          <p:nvPr>
-            <p:ph idx="1"/>
-          </p:nvPr>
-        </p:nvSpPr>
-        <p:spPr>
-          <a:xfrm>
-            <a:off x="457200" y="609600"/>
-            <a:ext cx="8229600" cy="4525963"/>
-          </a:xfrm>
-        </p:spPr>
-        <p:txBody>
-          <a:bodyPr>
-            <a:normAutofit fontScale="92500" lnSpcReduction="20000"/>
-          </a:bodyPr>
-          <a:lstStyle/>
-          <a:p>
-            <a:r>
-              <a:rPr lang="en-US" sz="2400" dirty="0"/>
-              <a:t> Index inverted/ merging:</a:t>
-            </a:r>
-          </a:p>
-          <a:p>
-            <a:pPr lvl="1"/>
-            <a:r>
-              <a:rPr lang="en-US" dirty="0"/>
-              <a:t>This architecture supports incremental indexing, where a merge identifies the documents to be added or updated and then parse each document into words. </a:t>
-            </a:r>
-          </a:p>
-          <a:p>
-            <a:pPr lvl="1"/>
-            <a:r>
-              <a:rPr lang="en-US" dirty="0"/>
-              <a:t>After parsing, the indexer adds the referenced documents to the document list for the appropriate words.</a:t>
-            </a:r>
-          </a:p>
-          <a:p>
-            <a:pPr lvl="1"/>
-            <a:r>
-              <a:rPr lang="en-US" dirty="0" err="1"/>
-              <a:t>Th</a:t>
-            </a:r>
-            <a:r>
-              <a:rPr lang="en-US" dirty="0"/>
-              <a:t> </a:t>
-            </a:r>
-            <a:r>
-              <a:rPr lang="en-US" dirty="0" err="1"/>
-              <a:t>eprocess</a:t>
-            </a:r>
-            <a:r>
-              <a:rPr lang="en-US" dirty="0"/>
-              <a:t> of finding words in the inverted index is relatively time consuming for a large search engine. So the development is split into two parts:</a:t>
-            </a:r>
-          </a:p>
-          <a:p>
-            <a:pPr lvl="2"/>
-            <a:r>
-              <a:rPr lang="en-US" dirty="0"/>
-              <a:t>Forward index</a:t>
-            </a:r>
-          </a:p>
-          <a:p>
-            <a:endParaRPr lang="en-US" dirty="0" smtClean="0"/>
-          </a:p>
-          <a:p>
-            <a:endParaRPr lang="en-US" dirty="0"/>
-          </a:p>
-          <a:p>
-            <a:endParaRPr lang="en-US" dirty="0" smtClean="0"/>
-          </a:p>
-          <a:p>
-            <a:endParaRPr lang="en-US" dirty="0"/>
-          </a:p>
-        </p:txBody>
-      </p:sp>
-      <p:pic>
-        <p:nvPicPr>
-          <p:cNvPr id="4" name="Picture 2"/>
-          <p:cNvPicPr>
-            <a:picLocks noChangeAspect="1" noChangeArrowheads="1"/>
-          </p:cNvPicPr>
-          <p:nvPr/>
-        </p:nvPicPr>
-        <p:blipFill>
-          <a:blip r:embed="rId2">
-            <a:extLst>
-              <a:ext uri="{28A0092B-C50C-407E-A947-70E740481C1C}">
-                <a14:useLocalDpi xmlns:a14="http://schemas.microsoft.com/office/drawing/2010/main" val="0"/>
-              </a:ext>
-            </a:extLst>
-          </a:blip>
-          <a:srcRect/>
-          <a:stretch>
-            <a:fillRect/>
-          </a:stretch>
-        </p:blipFill>
-        <p:spPr bwMode="auto">
-          <a:xfrm>
-            <a:off x="1219200" y="4724400"/>
-            <a:ext cx="3076575" cy="1381125"/>
-          </a:xfrm>
-          <a:prstGeom prst="rect">
-            <a:avLst/>
-          </a:prstGeom>
-          <a:noFill/>
-          <a:ln>
-            <a:noFill/>
-          </a:ln>
-          <a:effectLst/>
-          <a:extLst>
-            <a:ext uri="{909E8E84-426E-40DD-AFC4-6F175D3DCCD1}">
-              <a14:hiddenFill xmlns:a14="http://schemas.microsoft.com/office/drawing/2010/main">
-                <a:solidFill>
-                  <a:schemeClr val="accent1"/>
-                </a:solidFill>
-              </a14:hiddenFill>
-            </a:ext>
-            <a:ext uri="{91240B29-F687-4F45-9708-019B960494DF}">
-              <a14:hiddenLine xmlns:a14="http://schemas.microsoft.com/office/drawing/2010/main" w="9525">
-                <a:solidFill>
-                  <a:schemeClr val="tx1"/>
-                </a:solidFill>
-                <a:miter lim="800000"/>
-                <a:headEnd/>
-                <a:tailEnd/>
-              </a14:hiddenLine>
-            </a:ext>
-            <a:ext uri="{AF507438-7753-43E0-B8FC-AC1667EBCBE1}">
-              <a14:hiddenEffects xmlns:a14="http://schemas.microsoft.com/office/drawing/2010/main">
-                <a:effectLst>
-                  <a:outerShdw dist="35921" dir="2700000" algn="ctr" rotWithShape="0">
-                    <a:schemeClr val="bg2"/>
-                  </a:outerShdw>
-                </a:effectLst>
-              </a14:hiddenEffects>
-            </a:ext>
-          </a:extLst>
-        </p:spPr>
-      </p:pic>
-    </p:spTree>
-    <p:extLst>
-      <p:ext uri="{BB962C8B-B14F-4D97-AF65-F5344CB8AC3E}">
-        <p14:creationId xmlns:p14="http://schemas.microsoft.com/office/powerpoint/2010/main" val="3030785889"/>
-      </p:ext>
-    </p:extLst>
-  </p:cSld>
-  <p:clrMapOvr>
-    <a:masterClrMapping/>
-  </p:clrMapOvr>
-</p:sld>
-</file>
-
-<file path=ppt/slides/slide5.xml><?xml version="1.0" encoding="utf-8"?>
-<p:sld xmlns:a="http://schemas.openxmlformats.org/drawingml/2006/main" xmlns:r="http://schemas.openxmlformats.org/officeDocument/2006/relationships" xmlns:p="http://schemas.openxmlformats.org/presentationml/2006/main">
-  <p:cSld>
-    <p:spTree>
-      <p:nvGrpSpPr>
-        <p:cNvPr id="1" name=""/>
-        <p:cNvGrpSpPr/>
-        <p:nvPr/>
-      </p:nvGrpSpPr>
-      <p:grpSpPr>
-        <a:xfrm>
-          <a:off x="0" y="0"/>
-          <a:ext cx="0" cy="0"/>
-          <a:chOff x="0" y="0"/>
-          <a:chExt cx="0" cy="0"/>
-        </a:xfrm>
-      </p:grpSpPr>
-      <p:sp>
-        <p:nvSpPr>
-          <p:cNvPr id="2" name="Title 1"/>
-          <p:cNvSpPr>
-            <a:spLocks noGrp="1"/>
-          </p:cNvSpPr>
-          <p:nvPr>
-            <p:ph type="title"/>
-          </p:nvPr>
-        </p:nvSpPr>
-        <p:spPr/>
-        <p:txBody>
-          <a:bodyPr/>
-          <a:lstStyle/>
-          <a:p>
-            <a:r>
-              <a:rPr lang="en-US" dirty="0"/>
-              <a:t>Flowchart</a:t>
-            </a:r>
-          </a:p>
-        </p:txBody>
-      </p:sp>
-      <p:pic>
-        <p:nvPicPr>
-          <p:cNvPr id="4" name="Content Placeholder 3"/>
-          <p:cNvPicPr>
-            <a:picLocks noGrp="1" noChangeAspect="1"/>
-          </p:cNvPicPr>
-          <p:nvPr>
-            <p:ph idx="1"/>
-          </p:nvPr>
-        </p:nvPicPr>
-        <p:blipFill>
-          <a:blip r:embed="rId2">
-            <a:extLst>
-              <a:ext uri="{28A0092B-C50C-407E-A947-70E740481C1C}">
-                <a14:useLocalDpi xmlns:a14="http://schemas.microsoft.com/office/drawing/2010/main" val="0"/>
-              </a:ext>
-            </a:extLst>
-          </a:blip>
-          <a:stretch>
-            <a:fillRect/>
-          </a:stretch>
-        </p:blipFill>
-        <p:spPr>
-          <a:xfrm>
-            <a:off x="1904627" y="1295400"/>
-            <a:ext cx="6226675" cy="4492101"/>
-          </a:xfrm>
-        </p:spPr>
-      </p:pic>
-      <p:sp>
-        <p:nvSpPr>
-          <p:cNvPr id="5" name="Text Placeholder 5"/>
-          <p:cNvSpPr txBox="1">
-            <a:spLocks/>
-          </p:cNvSpPr>
-          <p:nvPr/>
-        </p:nvSpPr>
-        <p:spPr>
-          <a:xfrm>
-            <a:off x="2895600" y="5867400"/>
-            <a:ext cx="2286000" cy="546100"/>
-          </a:xfrm>
-          <a:prstGeom prst="rect">
-            <a:avLst/>
-          </a:prstGeom>
-        </p:spPr>
-        <p:txBody>
-          <a:bodyPr vert="horz" lIns="91440" tIns="45720" rIns="91440" bIns="45720" rtlCol="0">
-            <a:normAutofit lnSpcReduction="10000"/>
-          </a:bodyPr>
-          <a:lstStyle>
-            <a:lvl1pPr marL="342900" indent="-342900" algn="l" defTabSz="914400" rtl="0" eaLnBrk="1" latinLnBrk="0" hangingPunct="1">
-              <a:spcBef>
-                <a:spcPct val="20000"/>
-              </a:spcBef>
-              <a:buFont typeface="Arial" pitchFamily="34" charset="0"/>
-              <a:buChar char="•"/>
-              <a:defRPr sz="3200" kern="1200">
-                <a:solidFill>
-                  <a:schemeClr val="tx1"/>
-                </a:solidFill>
-                <a:latin typeface="+mn-lt"/>
-                <a:ea typeface="+mn-ea"/>
-                <a:cs typeface="+mn-cs"/>
-              </a:defRPr>
-            </a:lvl1pPr>
-            <a:lvl2pPr marL="742950" indent="-285750" algn="l" defTabSz="914400" rtl="0" eaLnBrk="1" latinLnBrk="0" hangingPunct="1">
-              <a:spcBef>
-                <a:spcPct val="20000"/>
-              </a:spcBef>
-              <a:buFont typeface="Arial" pitchFamily="34" charset="0"/>
-              <a:buChar char="–"/>
-              <a:defRPr sz="2800" kern="1200">
-                <a:solidFill>
-                  <a:schemeClr val="tx1"/>
-                </a:solidFill>
-                <a:latin typeface="+mn-lt"/>
-                <a:ea typeface="+mn-ea"/>
-                <a:cs typeface="+mn-cs"/>
-              </a:defRPr>
-            </a:lvl2pPr>
-            <a:lvl3pPr marL="1143000" indent="-228600" algn="l" defTabSz="914400" rtl="0" eaLnBrk="1" latinLnBrk="0" hangingPunct="1">
-              <a:spcBef>
-                <a:spcPct val="20000"/>
-              </a:spcBef>
-              <a:buFont typeface="Arial" pitchFamily="34" charset="0"/>
-              <a:buChar char="•"/>
-              <a:defRPr sz="2400" kern="1200">
-                <a:solidFill>
-                  <a:schemeClr val="tx1"/>
-                </a:solidFill>
-                <a:latin typeface="+mn-lt"/>
-                <a:ea typeface="+mn-ea"/>
-                <a:cs typeface="+mn-cs"/>
-              </a:defRPr>
-            </a:lvl3pPr>
-            <a:lvl4pPr marL="1600200" indent="-228600" algn="l" defTabSz="914400" rtl="0" eaLnBrk="1" latinLnBrk="0" hangingPunct="1">
-              <a:spcBef>
-                <a:spcPct val="20000"/>
-              </a:spcBef>
-              <a:buFont typeface="Arial" pitchFamily="34" charset="0"/>
-              <a:buChar char="–"/>
-              <a:defRPr sz="2000" kern="1200">
-                <a:solidFill>
-                  <a:schemeClr val="tx1"/>
-                </a:solidFill>
-                <a:latin typeface="+mn-lt"/>
-                <a:ea typeface="+mn-ea"/>
-                <a:cs typeface="+mn-cs"/>
-              </a:defRPr>
-            </a:lvl4pPr>
-            <a:lvl5pPr marL="2057400" indent="-228600" algn="l" defTabSz="914400" rtl="0" eaLnBrk="1" latinLnBrk="0" hangingPunct="1">
-              <a:spcBef>
-                <a:spcPct val="20000"/>
-              </a:spcBef>
-              <a:buFont typeface="Arial" pitchFamily="34" charset="0"/>
-              <a:buChar char="»"/>
-              <a:defRPr sz="2000" kern="1200">
-                <a:solidFill>
-                  <a:schemeClr val="tx1"/>
-                </a:solidFill>
-                <a:latin typeface="+mn-lt"/>
-                <a:ea typeface="+mn-ea"/>
-                <a:cs typeface="+mn-cs"/>
-              </a:defRPr>
-            </a:lvl5pPr>
-            <a:lvl6pPr marL="2514600" indent="-228600" algn="l" defTabSz="914400" rtl="0" eaLnBrk="1" latinLnBrk="0" hangingPunct="1">
-              <a:spcBef>
-                <a:spcPct val="20000"/>
-              </a:spcBef>
-              <a:buFont typeface="Arial" pitchFamily="34" charset="0"/>
-              <a:buChar char="•"/>
-              <a:defRPr sz="2000" kern="1200">
-                <a:solidFill>
-                  <a:schemeClr val="tx1"/>
-                </a:solidFill>
-                <a:latin typeface="+mn-lt"/>
-                <a:ea typeface="+mn-ea"/>
-                <a:cs typeface="+mn-cs"/>
-              </a:defRPr>
-            </a:lvl6pPr>
-            <a:lvl7pPr marL="2971800" indent="-228600" algn="l" defTabSz="914400" rtl="0" eaLnBrk="1" latinLnBrk="0" hangingPunct="1">
-              <a:spcBef>
-                <a:spcPct val="20000"/>
-              </a:spcBef>
-              <a:buFont typeface="Arial" pitchFamily="34" charset="0"/>
-              <a:buChar char="•"/>
-              <a:defRPr sz="2000" kern="1200">
-                <a:solidFill>
-                  <a:schemeClr val="tx1"/>
-                </a:solidFill>
-                <a:latin typeface="+mn-lt"/>
-                <a:ea typeface="+mn-ea"/>
-                <a:cs typeface="+mn-cs"/>
-              </a:defRPr>
-            </a:lvl7pPr>
-            <a:lvl8pPr marL="3429000" indent="-228600" algn="l" defTabSz="914400" rtl="0" eaLnBrk="1" latinLnBrk="0" hangingPunct="1">
-              <a:spcBef>
-                <a:spcPct val="20000"/>
-              </a:spcBef>
-              <a:buFont typeface="Arial" pitchFamily="34" charset="0"/>
-              <a:buChar char="•"/>
-              <a:defRPr sz="2000" kern="1200">
-                <a:solidFill>
-                  <a:schemeClr val="tx1"/>
-                </a:solidFill>
-                <a:latin typeface="+mn-lt"/>
-                <a:ea typeface="+mn-ea"/>
-                <a:cs typeface="+mn-cs"/>
-              </a:defRPr>
-            </a:lvl8pPr>
-            <a:lvl9pPr marL="3886200" indent="-228600" algn="l" defTabSz="914400" rtl="0" eaLnBrk="1" latinLnBrk="0" hangingPunct="1">
-              <a:spcBef>
-                <a:spcPct val="20000"/>
-              </a:spcBef>
-              <a:buFont typeface="Arial" pitchFamily="34" charset="0"/>
-              <a:buChar char="•"/>
-              <a:defRPr sz="2000" kern="1200">
-                <a:solidFill>
-                  <a:schemeClr val="tx1"/>
-                </a:solidFill>
-                <a:latin typeface="+mn-lt"/>
-                <a:ea typeface="+mn-ea"/>
-                <a:cs typeface="+mn-cs"/>
-              </a:defRPr>
-            </a:lvl9pPr>
-          </a:lstStyle>
-          <a:p>
-            <a:pPr marL="0" indent="0">
-              <a:buFont typeface="Arial" pitchFamily="34" charset="0"/>
-              <a:buNone/>
-            </a:pPr>
-            <a:r>
-              <a:rPr lang="en-US" dirty="0" smtClean="0"/>
-              <a:t>main()</a:t>
-            </a:r>
-            <a:endParaRPr lang="en-US" dirty="0"/>
-          </a:p>
-        </p:txBody>
-      </p:sp>
-    </p:spTree>
-    <p:extLst>
-      <p:ext uri="{BB962C8B-B14F-4D97-AF65-F5344CB8AC3E}">
-        <p14:creationId xmlns:p14="http://schemas.microsoft.com/office/powerpoint/2010/main" val="1656632913"/>
-      </p:ext>
-    </p:extLst>
-  </p:cSld>
-  <p:clrMapOvr>
-    <a:masterClrMapping/>
-  </p:clrMapOvr>
-  <p:timing>
-    <p:tnLst>
-      <p:par>
-        <p:cTn id="1" dur="indefinite" restart="never" nodeType="tmRoot"/>
-      </p:par>
-    </p:tnLst>
-  </p:timing>
-</p:sld>
-</file>
-
-<file path=ppt/slides/slide6.xml><?xml version="1.0" encoding="utf-8"?>
-<p:sld xmlns:a="http://schemas.openxmlformats.org/drawingml/2006/main" xmlns:r="http://schemas.openxmlformats.org/officeDocument/2006/relationships" xmlns:p="http://schemas.openxmlformats.org/presentationml/2006/main">
-  <p:cSld>
-    <p:spTree>
-      <p:nvGrpSpPr>
-        <p:cNvPr id="1" name=""/>
-        <p:cNvGrpSpPr/>
-        <p:nvPr/>
-      </p:nvGrpSpPr>
-      <p:grpSpPr>
-        <a:xfrm>
-          <a:off x="0" y="0"/>
-          <a:ext cx="0" cy="0"/>
-          <a:chOff x="0" y="0"/>
-          <a:chExt cx="0" cy="0"/>
-        </a:xfrm>
-      </p:grpSpPr>
-      <p:sp>
-        <p:nvSpPr>
-          <p:cNvPr id="2" name="Title 1"/>
-          <p:cNvSpPr>
-            <a:spLocks noGrp="1"/>
-          </p:cNvSpPr>
-          <p:nvPr>
-            <p:ph type="title"/>
-          </p:nvPr>
-        </p:nvSpPr>
-        <p:spPr/>
-        <p:txBody>
-          <a:bodyPr>
-            <a:normAutofit/>
-          </a:bodyPr>
-          <a:lstStyle/>
-          <a:p>
-            <a:r>
-              <a:rPr lang="en-US" dirty="0"/>
-              <a:t>Flowchart – cont</a:t>
-            </a:r>
-            <a:r>
-              <a:rPr lang="en-US" dirty="0" smtClean="0"/>
-              <a:t>..</a:t>
-            </a:r>
-            <a:endParaRPr lang="en-US" dirty="0"/>
-          </a:p>
-        </p:txBody>
-      </p:sp>
-      <p:pic>
-        <p:nvPicPr>
-          <p:cNvPr id="4" name="Content Placeholder 3"/>
-          <p:cNvPicPr>
-            <a:picLocks noGrp="1" noChangeAspect="1"/>
-          </p:cNvPicPr>
-          <p:nvPr>
-            <p:ph idx="1"/>
-          </p:nvPr>
-        </p:nvPicPr>
-        <p:blipFill>
-          <a:blip r:embed="rId2">
-            <a:extLst>
-              <a:ext uri="{28A0092B-C50C-407E-A947-70E740481C1C}">
-                <a14:useLocalDpi xmlns:a14="http://schemas.microsoft.com/office/drawing/2010/main" val="0"/>
-              </a:ext>
-            </a:extLst>
-          </a:blip>
-          <a:stretch>
-            <a:fillRect/>
-          </a:stretch>
-        </p:blipFill>
-        <p:spPr>
-          <a:xfrm>
-            <a:off x="533400" y="1295400"/>
-            <a:ext cx="8079470" cy="4350484"/>
-          </a:xfrm>
-        </p:spPr>
-      </p:pic>
-      <p:sp>
-        <p:nvSpPr>
-          <p:cNvPr id="5" name="Text Placeholder 5"/>
-          <p:cNvSpPr txBox="1">
-            <a:spLocks/>
-          </p:cNvSpPr>
-          <p:nvPr/>
-        </p:nvSpPr>
-        <p:spPr>
-          <a:xfrm>
-            <a:off x="2895600" y="5867400"/>
-            <a:ext cx="3429000" cy="546100"/>
-          </a:xfrm>
-          <a:prstGeom prst="rect">
-            <a:avLst/>
-          </a:prstGeom>
-        </p:spPr>
-        <p:txBody>
-          <a:bodyPr vert="horz" lIns="91440" tIns="45720" rIns="91440" bIns="45720" rtlCol="0">
-            <a:normAutofit fontScale="92500" lnSpcReduction="10000"/>
-          </a:bodyPr>
-          <a:lstStyle>
-            <a:lvl1pPr marL="342900" indent="-342900" algn="l" defTabSz="914400" rtl="0" eaLnBrk="1" latinLnBrk="0" hangingPunct="1">
-              <a:spcBef>
-                <a:spcPct val="20000"/>
-              </a:spcBef>
-              <a:buFont typeface="Arial" pitchFamily="34" charset="0"/>
-              <a:buChar char="•"/>
-              <a:defRPr sz="3200" kern="1200">
-                <a:solidFill>
-                  <a:schemeClr val="tx1"/>
-                </a:solidFill>
-                <a:latin typeface="+mn-lt"/>
-                <a:ea typeface="+mn-ea"/>
-                <a:cs typeface="+mn-cs"/>
-              </a:defRPr>
-            </a:lvl1pPr>
-            <a:lvl2pPr marL="742950" indent="-285750" algn="l" defTabSz="914400" rtl="0" eaLnBrk="1" latinLnBrk="0" hangingPunct="1">
-              <a:spcBef>
-                <a:spcPct val="20000"/>
-              </a:spcBef>
-              <a:buFont typeface="Arial" pitchFamily="34" charset="0"/>
-              <a:buChar char="–"/>
-              <a:defRPr sz="2800" kern="1200">
-                <a:solidFill>
-                  <a:schemeClr val="tx1"/>
-                </a:solidFill>
-                <a:latin typeface="+mn-lt"/>
-                <a:ea typeface="+mn-ea"/>
-                <a:cs typeface="+mn-cs"/>
-              </a:defRPr>
-            </a:lvl2pPr>
-            <a:lvl3pPr marL="1143000" indent="-228600" algn="l" defTabSz="914400" rtl="0" eaLnBrk="1" latinLnBrk="0" hangingPunct="1">
-              <a:spcBef>
-                <a:spcPct val="20000"/>
-              </a:spcBef>
-              <a:buFont typeface="Arial" pitchFamily="34" charset="0"/>
-              <a:buChar char="•"/>
-              <a:defRPr sz="2400" kern="1200">
-                <a:solidFill>
-                  <a:schemeClr val="tx1"/>
-                </a:solidFill>
-                <a:latin typeface="+mn-lt"/>
-                <a:ea typeface="+mn-ea"/>
-                <a:cs typeface="+mn-cs"/>
-              </a:defRPr>
-            </a:lvl3pPr>
-            <a:lvl4pPr marL="1600200" indent="-228600" algn="l" defTabSz="914400" rtl="0" eaLnBrk="1" latinLnBrk="0" hangingPunct="1">
-              <a:spcBef>
-                <a:spcPct val="20000"/>
-              </a:spcBef>
-              <a:buFont typeface="Arial" pitchFamily="34" charset="0"/>
-              <a:buChar char="–"/>
-              <a:defRPr sz="2000" kern="1200">
-                <a:solidFill>
-                  <a:schemeClr val="tx1"/>
-                </a:solidFill>
-                <a:latin typeface="+mn-lt"/>
-                <a:ea typeface="+mn-ea"/>
-                <a:cs typeface="+mn-cs"/>
-              </a:defRPr>
-            </a:lvl4pPr>
-            <a:lvl5pPr marL="2057400" indent="-228600" algn="l" defTabSz="914400" rtl="0" eaLnBrk="1" latinLnBrk="0" hangingPunct="1">
-              <a:spcBef>
-                <a:spcPct val="20000"/>
-              </a:spcBef>
-              <a:buFont typeface="Arial" pitchFamily="34" charset="0"/>
-              <a:buChar char="»"/>
-              <a:defRPr sz="2000" kern="1200">
-                <a:solidFill>
-                  <a:schemeClr val="tx1"/>
-                </a:solidFill>
-                <a:latin typeface="+mn-lt"/>
-                <a:ea typeface="+mn-ea"/>
-                <a:cs typeface="+mn-cs"/>
-              </a:defRPr>
-            </a:lvl5pPr>
-            <a:lvl6pPr marL="2514600" indent="-228600" algn="l" defTabSz="914400" rtl="0" eaLnBrk="1" latinLnBrk="0" hangingPunct="1">
-              <a:spcBef>
-                <a:spcPct val="20000"/>
-              </a:spcBef>
-              <a:buFont typeface="Arial" pitchFamily="34" charset="0"/>
-              <a:buChar char="•"/>
-              <a:defRPr sz="2000" kern="1200">
-                <a:solidFill>
-                  <a:schemeClr val="tx1"/>
-                </a:solidFill>
-                <a:latin typeface="+mn-lt"/>
-                <a:ea typeface="+mn-ea"/>
-                <a:cs typeface="+mn-cs"/>
-              </a:defRPr>
-            </a:lvl6pPr>
-            <a:lvl7pPr marL="2971800" indent="-228600" algn="l" defTabSz="914400" rtl="0" eaLnBrk="1" latinLnBrk="0" hangingPunct="1">
-              <a:spcBef>
-                <a:spcPct val="20000"/>
-              </a:spcBef>
-              <a:buFont typeface="Arial" pitchFamily="34" charset="0"/>
-              <a:buChar char="•"/>
-              <a:defRPr sz="2000" kern="1200">
-                <a:solidFill>
-                  <a:schemeClr val="tx1"/>
-                </a:solidFill>
-                <a:latin typeface="+mn-lt"/>
-                <a:ea typeface="+mn-ea"/>
-                <a:cs typeface="+mn-cs"/>
-              </a:defRPr>
-            </a:lvl7pPr>
-            <a:lvl8pPr marL="3429000" indent="-228600" algn="l" defTabSz="914400" rtl="0" eaLnBrk="1" latinLnBrk="0" hangingPunct="1">
-              <a:spcBef>
-                <a:spcPct val="20000"/>
-              </a:spcBef>
-              <a:buFont typeface="Arial" pitchFamily="34" charset="0"/>
-              <a:buChar char="•"/>
-              <a:defRPr sz="2000" kern="1200">
-                <a:solidFill>
-                  <a:schemeClr val="tx1"/>
-                </a:solidFill>
-                <a:latin typeface="+mn-lt"/>
-                <a:ea typeface="+mn-ea"/>
-                <a:cs typeface="+mn-cs"/>
-              </a:defRPr>
-            </a:lvl8pPr>
-            <a:lvl9pPr marL="3886200" indent="-228600" algn="l" defTabSz="914400" rtl="0" eaLnBrk="1" latinLnBrk="0" hangingPunct="1">
-              <a:spcBef>
-                <a:spcPct val="20000"/>
-              </a:spcBef>
-              <a:buFont typeface="Arial" pitchFamily="34" charset="0"/>
-              <a:buChar char="•"/>
-              <a:defRPr sz="2000" kern="1200">
-                <a:solidFill>
-                  <a:schemeClr val="tx1"/>
-                </a:solidFill>
-                <a:latin typeface="+mn-lt"/>
-                <a:ea typeface="+mn-ea"/>
-                <a:cs typeface="+mn-cs"/>
-              </a:defRPr>
-            </a:lvl9pPr>
-          </a:lstStyle>
-          <a:p>
-            <a:pPr marL="0" indent="0">
-              <a:buFont typeface="Arial" pitchFamily="34" charset="0"/>
-              <a:buNone/>
-            </a:pPr>
-            <a:r>
-              <a:rPr lang="en-US" dirty="0" smtClean="0"/>
-              <a:t>main()…{ </a:t>
-            </a:r>
-            <a:r>
-              <a:rPr lang="en-US" dirty="0" err="1" smtClean="0"/>
-              <a:t>e_encode</a:t>
-            </a:r>
-            <a:r>
-              <a:rPr lang="en-US" dirty="0" smtClean="0"/>
-              <a:t>}</a:t>
-            </a:r>
-            <a:endParaRPr lang="en-US" dirty="0"/>
-          </a:p>
-        </p:txBody>
-      </p:sp>
-    </p:spTree>
-    <p:extLst>
-      <p:ext uri="{BB962C8B-B14F-4D97-AF65-F5344CB8AC3E}">
-        <p14:creationId xmlns:p14="http://schemas.microsoft.com/office/powerpoint/2010/main" val="1283940430"/>
-      </p:ext>
-    </p:extLst>
-  </p:cSld>
-  <p:clrMapOvr>
-    <a:masterClrMapping/>
-  </p:clrMapOvr>
-  <p:timing>
-    <p:tnLst>
-      <p:par>
-        <p:cTn id="1" dur="indefinite" restart="never" nodeType="tmRoot"/>
-      </p:par>
-    </p:tnLst>
-  </p:timing>
-</p:sld>
-</file>
-
-<file path=ppt/slides/slide7.xml><?xml version="1.0" encoding="utf-8"?>
-<p:sld xmlns:a="http://schemas.openxmlformats.org/drawingml/2006/main" xmlns:r="http://schemas.openxmlformats.org/officeDocument/2006/relationships" xmlns:p="http://schemas.openxmlformats.org/presentationml/2006/main">
-  <p:cSld>
-    <p:spTree>
-      <p:nvGrpSpPr>
-        <p:cNvPr id="1" name=""/>
-        <p:cNvGrpSpPr/>
-        <p:nvPr/>
-      </p:nvGrpSpPr>
-      <p:grpSpPr>
-        <a:xfrm>
-          <a:off x="0" y="0"/>
-          <a:ext cx="0" cy="0"/>
-          <a:chOff x="0" y="0"/>
-          <a:chExt cx="0" cy="0"/>
-        </a:xfrm>
-      </p:grpSpPr>
-      <p:sp>
-        <p:nvSpPr>
-          <p:cNvPr id="2" name="Title 1"/>
-          <p:cNvSpPr>
-            <a:spLocks noGrp="1"/>
-          </p:cNvSpPr>
-          <p:nvPr>
-            <p:ph type="title"/>
-          </p:nvPr>
-        </p:nvSpPr>
-        <p:spPr>
-          <a:xfrm>
-            <a:off x="304800" y="228600"/>
-            <a:ext cx="8229600" cy="1143000"/>
-          </a:xfrm>
-        </p:spPr>
-        <p:txBody>
-          <a:bodyPr>
-            <a:normAutofit/>
-          </a:bodyPr>
-          <a:lstStyle/>
-          <a:p>
-            <a:r>
-              <a:rPr lang="en-US" dirty="0"/>
-              <a:t>Flowchart – cont</a:t>
-            </a:r>
-            <a:r>
-              <a:rPr lang="en-US" dirty="0" smtClean="0"/>
-              <a:t>..</a:t>
-            </a:r>
-            <a:endParaRPr lang="en-US" dirty="0"/>
-          </a:p>
-        </p:txBody>
-      </p:sp>
-      <p:sp>
-        <p:nvSpPr>
-          <p:cNvPr id="5" name="Text Placeholder 5"/>
-          <p:cNvSpPr txBox="1">
-            <a:spLocks/>
-          </p:cNvSpPr>
-          <p:nvPr/>
-        </p:nvSpPr>
-        <p:spPr>
-          <a:xfrm>
-            <a:off x="2895600" y="5867400"/>
-            <a:ext cx="3429000" cy="546100"/>
-          </a:xfrm>
-          <a:prstGeom prst="rect">
-            <a:avLst/>
-          </a:prstGeom>
-        </p:spPr>
-        <p:txBody>
-          <a:bodyPr vert="horz" lIns="91440" tIns="45720" rIns="91440" bIns="45720" rtlCol="0">
-            <a:normAutofit fontScale="92500" lnSpcReduction="10000"/>
-          </a:bodyPr>
-          <a:lstStyle>
-            <a:lvl1pPr marL="342900" indent="-342900" algn="l" defTabSz="914400" rtl="0" eaLnBrk="1" latinLnBrk="0" hangingPunct="1">
-              <a:spcBef>
-                <a:spcPct val="20000"/>
-              </a:spcBef>
-              <a:buFont typeface="Arial" pitchFamily="34" charset="0"/>
-              <a:buChar char="•"/>
-              <a:defRPr sz="3200" kern="1200">
-                <a:solidFill>
-                  <a:schemeClr val="tx1"/>
-                </a:solidFill>
-                <a:latin typeface="+mn-lt"/>
-                <a:ea typeface="+mn-ea"/>
-                <a:cs typeface="+mn-cs"/>
-              </a:defRPr>
-            </a:lvl1pPr>
-            <a:lvl2pPr marL="742950" indent="-285750" algn="l" defTabSz="914400" rtl="0" eaLnBrk="1" latinLnBrk="0" hangingPunct="1">
-              <a:spcBef>
-                <a:spcPct val="20000"/>
-              </a:spcBef>
-              <a:buFont typeface="Arial" pitchFamily="34" charset="0"/>
-              <a:buChar char="–"/>
-              <a:defRPr sz="2800" kern="1200">
-                <a:solidFill>
-                  <a:schemeClr val="tx1"/>
-                </a:solidFill>
-                <a:latin typeface="+mn-lt"/>
-                <a:ea typeface="+mn-ea"/>
-                <a:cs typeface="+mn-cs"/>
-              </a:defRPr>
-            </a:lvl2pPr>
-            <a:lvl3pPr marL="1143000" indent="-228600" algn="l" defTabSz="914400" rtl="0" eaLnBrk="1" latinLnBrk="0" hangingPunct="1">
-              <a:spcBef>
-                <a:spcPct val="20000"/>
-              </a:spcBef>
-              <a:buFont typeface="Arial" pitchFamily="34" charset="0"/>
-              <a:buChar char="•"/>
-              <a:defRPr sz="2400" kern="1200">
-                <a:solidFill>
-                  <a:schemeClr val="tx1"/>
-                </a:solidFill>
-                <a:latin typeface="+mn-lt"/>
-                <a:ea typeface="+mn-ea"/>
-                <a:cs typeface="+mn-cs"/>
-              </a:defRPr>
-            </a:lvl3pPr>
-            <a:lvl4pPr marL="1600200" indent="-228600" algn="l" defTabSz="914400" rtl="0" eaLnBrk="1" latinLnBrk="0" hangingPunct="1">
-              <a:spcBef>
-                <a:spcPct val="20000"/>
-              </a:spcBef>
-              <a:buFont typeface="Arial" pitchFamily="34" charset="0"/>
-              <a:buChar char="–"/>
-              <a:defRPr sz="2000" kern="1200">
-                <a:solidFill>
-                  <a:schemeClr val="tx1"/>
-                </a:solidFill>
-                <a:latin typeface="+mn-lt"/>
-                <a:ea typeface="+mn-ea"/>
-                <a:cs typeface="+mn-cs"/>
-              </a:defRPr>
-            </a:lvl4pPr>
-            <a:lvl5pPr marL="2057400" indent="-228600" algn="l" defTabSz="914400" rtl="0" eaLnBrk="1" latinLnBrk="0" hangingPunct="1">
-              <a:spcBef>
-                <a:spcPct val="20000"/>
-              </a:spcBef>
-              <a:buFont typeface="Arial" pitchFamily="34" charset="0"/>
-              <a:buChar char="»"/>
-              <a:defRPr sz="2000" kern="1200">
-                <a:solidFill>
-                  <a:schemeClr val="tx1"/>
-                </a:solidFill>
-                <a:latin typeface="+mn-lt"/>
-                <a:ea typeface="+mn-ea"/>
-                <a:cs typeface="+mn-cs"/>
-              </a:defRPr>
-            </a:lvl5pPr>
-            <a:lvl6pPr marL="2514600" indent="-228600" algn="l" defTabSz="914400" rtl="0" eaLnBrk="1" latinLnBrk="0" hangingPunct="1">
-              <a:spcBef>
-                <a:spcPct val="20000"/>
-              </a:spcBef>
-              <a:buFont typeface="Arial" pitchFamily="34" charset="0"/>
-              <a:buChar char="•"/>
-              <a:defRPr sz="2000" kern="1200">
-                <a:solidFill>
-                  <a:schemeClr val="tx1"/>
-                </a:solidFill>
-                <a:latin typeface="+mn-lt"/>
-                <a:ea typeface="+mn-ea"/>
-                <a:cs typeface="+mn-cs"/>
-              </a:defRPr>
-            </a:lvl6pPr>
-            <a:lvl7pPr marL="2971800" indent="-228600" algn="l" defTabSz="914400" rtl="0" eaLnBrk="1" latinLnBrk="0" hangingPunct="1">
-              <a:spcBef>
-                <a:spcPct val="20000"/>
-              </a:spcBef>
-              <a:buFont typeface="Arial" pitchFamily="34" charset="0"/>
-              <a:buChar char="•"/>
-              <a:defRPr sz="2000" kern="1200">
-                <a:solidFill>
-                  <a:schemeClr val="tx1"/>
-                </a:solidFill>
-                <a:latin typeface="+mn-lt"/>
-                <a:ea typeface="+mn-ea"/>
-                <a:cs typeface="+mn-cs"/>
-              </a:defRPr>
-            </a:lvl7pPr>
-            <a:lvl8pPr marL="3429000" indent="-228600" algn="l" defTabSz="914400" rtl="0" eaLnBrk="1" latinLnBrk="0" hangingPunct="1">
-              <a:spcBef>
-                <a:spcPct val="20000"/>
-              </a:spcBef>
-              <a:buFont typeface="Arial" pitchFamily="34" charset="0"/>
-              <a:buChar char="•"/>
-              <a:defRPr sz="2000" kern="1200">
-                <a:solidFill>
-                  <a:schemeClr val="tx1"/>
-                </a:solidFill>
-                <a:latin typeface="+mn-lt"/>
-                <a:ea typeface="+mn-ea"/>
-                <a:cs typeface="+mn-cs"/>
-              </a:defRPr>
-            </a:lvl8pPr>
-            <a:lvl9pPr marL="3886200" indent="-228600" algn="l" defTabSz="914400" rtl="0" eaLnBrk="1" latinLnBrk="0" hangingPunct="1">
-              <a:spcBef>
-                <a:spcPct val="20000"/>
-              </a:spcBef>
-              <a:buFont typeface="Arial" pitchFamily="34" charset="0"/>
-              <a:buChar char="•"/>
-              <a:defRPr sz="2000" kern="1200">
-                <a:solidFill>
-                  <a:schemeClr val="tx1"/>
-                </a:solidFill>
-                <a:latin typeface="+mn-lt"/>
-                <a:ea typeface="+mn-ea"/>
-                <a:cs typeface="+mn-cs"/>
-              </a:defRPr>
-            </a:lvl9pPr>
-          </a:lstStyle>
-          <a:p>
-            <a:pPr marL="0" indent="0">
-              <a:buFont typeface="Arial" pitchFamily="34" charset="0"/>
-              <a:buNone/>
-            </a:pPr>
-            <a:r>
-              <a:rPr lang="en-US" dirty="0" smtClean="0"/>
-              <a:t>main()…{ </a:t>
-            </a:r>
-            <a:r>
-              <a:rPr lang="en-US" dirty="0" err="1" smtClean="0"/>
-              <a:t>e_decode</a:t>
-            </a:r>
-            <a:r>
-              <a:rPr lang="en-US" dirty="0" smtClean="0"/>
-              <a:t>}</a:t>
-            </a:r>
-            <a:endParaRPr lang="en-US" dirty="0"/>
-          </a:p>
-        </p:txBody>
-      </p:sp>
-      <p:pic>
-        <p:nvPicPr>
-          <p:cNvPr id="6" name="Content Placeholder 5"/>
-          <p:cNvPicPr>
-            <a:picLocks noGrp="1" noChangeAspect="1"/>
-          </p:cNvPicPr>
-          <p:nvPr>
-            <p:ph idx="1"/>
-          </p:nvPr>
-        </p:nvPicPr>
-        <p:blipFill>
-          <a:blip r:embed="rId2">
-            <a:extLst>
-              <a:ext uri="{28A0092B-C50C-407E-A947-70E740481C1C}">
-                <a14:useLocalDpi xmlns:a14="http://schemas.microsoft.com/office/drawing/2010/main" val="0"/>
-              </a:ext>
-            </a:extLst>
-          </a:blip>
-          <a:stretch>
-            <a:fillRect/>
-          </a:stretch>
-        </p:blipFill>
-        <p:spPr>
-          <a:xfrm>
-            <a:off x="2066363" y="1143000"/>
-            <a:ext cx="5087474" cy="4567164"/>
-          </a:xfrm>
-        </p:spPr>
-      </p:pic>
-    </p:spTree>
-    <p:extLst>
-      <p:ext uri="{BB962C8B-B14F-4D97-AF65-F5344CB8AC3E}">
-        <p14:creationId xmlns:p14="http://schemas.microsoft.com/office/powerpoint/2010/main" val="2401601824"/>
-      </p:ext>
-    </p:extLst>
-  </p:cSld>
-  <p:clrMapOvr>
-    <a:masterClrMapping/>
-  </p:clrMapOvr>
-  <p:timing>
-    <p:tnLst>
-      <p:par>
-        <p:cTn id="1" dur="indefinite" restart="never" nodeType="tmRoot"/>
-      </p:par>
-    </p:tnLst>
-  </p:timing>
-</p:sld>
-</file>
-
-<file path=ppt/slides/slide8.xml><?xml version="1.0" encoding="utf-8"?>
-<p:sld xmlns:a="http://schemas.openxmlformats.org/drawingml/2006/main" xmlns:r="http://schemas.openxmlformats.org/officeDocument/2006/relationships" xmlns:p="http://schemas.openxmlformats.org/presentationml/2006/main">
-  <p:cSld>
-    <p:spTree>
-      <p:nvGrpSpPr>
-        <p:cNvPr id="1" name=""/>
-        <p:cNvGrpSpPr/>
-        <p:nvPr/>
-      </p:nvGrpSpPr>
-      <p:grpSpPr>
-        <a:xfrm>
-          <a:off x="0" y="0"/>
-          <a:ext cx="0" cy="0"/>
-          <a:chOff x="0" y="0"/>
-          <a:chExt cx="0" cy="0"/>
-        </a:xfrm>
-      </p:grpSpPr>
-      <p:sp>
-        <p:nvSpPr>
-          <p:cNvPr id="2" name="Title 1"/>
-          <p:cNvSpPr>
-            <a:spLocks noGrp="1"/>
-          </p:cNvSpPr>
-          <p:nvPr>
-            <p:ph type="title"/>
-          </p:nvPr>
-        </p:nvSpPr>
-        <p:spPr/>
-        <p:txBody>
-          <a:bodyPr>
-            <a:normAutofit/>
-          </a:bodyPr>
-          <a:lstStyle/>
-          <a:p>
-            <a:r>
-              <a:rPr lang="en-US" dirty="0" smtClean="0"/>
-              <a:t>Algorithm</a:t>
-            </a:r>
-            <a:endParaRPr lang="en-US" dirty="0"/>
-          </a:p>
-        </p:txBody>
-      </p:sp>
-      <p:sp>
-        <p:nvSpPr>
-          <p:cNvPr id="3" name="Content Placeholder 2"/>
-          <p:cNvSpPr>
-            <a:spLocks noGrp="1"/>
-          </p:cNvSpPr>
-          <p:nvPr>
-            <p:ph idx="1"/>
-          </p:nvPr>
-        </p:nvSpPr>
-        <p:spPr/>
-        <p:txBody>
-          <a:bodyPr>
-            <a:normAutofit/>
-          </a:bodyPr>
-          <a:lstStyle/>
-          <a:p>
-            <a:pPr lvl="1"/>
-            <a:endParaRPr lang="en-US" dirty="0"/>
-          </a:p>
-          <a:p>
-            <a:pPr lvl="1"/>
-            <a:endParaRPr lang="en-US" dirty="0" smtClean="0"/>
-          </a:p>
-          <a:p>
-            <a:pPr marL="457200" lvl="1" indent="0">
-              <a:buNone/>
-            </a:pPr>
-            <a:endParaRPr lang="en-US" dirty="0"/>
-          </a:p>
-        </p:txBody>
-      </p:sp>
-    </p:spTree>
-    <p:extLst>
-      <p:ext uri="{BB962C8B-B14F-4D97-AF65-F5344CB8AC3E}">
-        <p14:creationId xmlns:p14="http://schemas.microsoft.com/office/powerpoint/2010/main" val="3651843759"/>
-      </p:ext>
-    </p:extLst>
-  </p:cSld>
-  <p:clrMapOvr>
-    <a:masterClrMapping/>
-  </p:clrMapOvr>
-  <p:timing>
-    <p:tnLst>
-      <p:par>
-        <p:cTn id="1" dur="indefinite" restart="never" nodeType="tmRoot"/>
-      </p:par>
-    </p:tnLst>
-  </p:timing>
-</p:sld>
-</file>
-
-<file path=ppt/slides/slide9.xml><?xml version="1.0" encoding="utf-8"?>
-<p:sld xmlns:a="http://schemas.openxmlformats.org/drawingml/2006/main" xmlns:r="http://schemas.openxmlformats.org/officeDocument/2006/relationships" xmlns:p="http://schemas.openxmlformats.org/presentationml/2006/main">
-  <p:cSld>
-    <p:spTree>
-      <p:nvGrpSpPr>
-        <p:cNvPr id="1" name=""/>
-        <p:cNvGrpSpPr/>
-        <p:nvPr/>
-      </p:nvGrpSpPr>
-      <p:grpSpPr>
-        <a:xfrm>
-          <a:off x="0" y="0"/>
-          <a:ext cx="0" cy="0"/>
-          <a:chOff x="0" y="0"/>
-          <a:chExt cx="0" cy="0"/>
-        </a:xfrm>
-      </p:grpSpPr>
-      <p:sp>
-        <p:nvSpPr>
-          <p:cNvPr id="2" name="Title 1"/>
-          <p:cNvSpPr>
-            <a:spLocks noGrp="1"/>
-          </p:cNvSpPr>
-          <p:nvPr>
-            <p:ph type="title"/>
-          </p:nvPr>
-        </p:nvSpPr>
-        <p:spPr/>
-        <p:txBody>
-          <a:bodyPr/>
-          <a:lstStyle/>
-          <a:p>
-            <a:r>
-              <a:rPr lang="en-US" dirty="0" smtClean="0"/>
-              <a:t>Algorithm- </a:t>
-            </a:r>
-            <a:r>
-              <a:rPr lang="en-US" dirty="0" err="1" smtClean="0"/>
-              <a:t>cont</a:t>
-            </a:r>
-            <a:r>
-              <a:rPr lang="en-US" dirty="0" smtClean="0"/>
-              <a:t>…</a:t>
-            </a:r>
-            <a:endParaRPr lang="en-US" dirty="0"/>
-          </a:p>
-        </p:txBody>
-      </p:sp>
-      <p:sp>
-        <p:nvSpPr>
-          <p:cNvPr id="3" name="Content Placeholder 2"/>
-          <p:cNvSpPr>
-            <a:spLocks noGrp="1"/>
-          </p:cNvSpPr>
-          <p:nvPr>
-            <p:ph idx="1"/>
-          </p:nvPr>
-        </p:nvSpPr>
-        <p:spPr>
-          <a:xfrm>
-            <a:off x="457200" y="1447800"/>
-            <a:ext cx="8382000" cy="4876800"/>
-          </a:xfrm>
-        </p:spPr>
-        <p:txBody>
-          <a:bodyPr>
-            <a:normAutofit/>
-          </a:bodyPr>
-          <a:lstStyle/>
-          <a:p>
-            <a:pPr lvl="1"/>
-            <a:endParaRPr lang="en-US" dirty="0" smtClean="0"/>
-          </a:p>
-          <a:p>
-            <a:pPr marL="457200" lvl="1" indent="0">
-              <a:buNone/>
-            </a:pPr>
-            <a:endParaRPr lang="en-US" dirty="0"/>
-          </a:p>
-        </p:txBody>
-      </p:sp>
-    </p:spTree>
-    <p:extLst>
-      <p:ext uri="{BB962C8B-B14F-4D97-AF65-F5344CB8AC3E}">
-        <p14:creationId xmlns:p14="http://schemas.microsoft.com/office/powerpoint/2010/main" val="4021731000"/>
-      </p:ext>
-    </p:extLst>
-  </p:cSld>
-  <p:clrMapOvr>
-    <a:masterClrMapping/>
-  </p:clrMapOvr>
-  <p:timing>
-    <p:tnLst>
-      <p:par>
-        <p:cTn id="1" dur="indefinite" restart="never" nodeType="tmRoot"/>
-      </p:par>
-    </p:tnLst>
-  </p:timing>
-</p:sld>
-</file>
-
 <file path=ppt/theme/theme1.xml><?xml version="1.0" encoding="utf-8"?>
-<a:theme xmlns:a="http://schemas.openxmlformats.org/drawingml/2006/main" name="Office Theme">
+<a:theme xmlns:a="http://schemas.openxmlformats.org/drawingml/2006/main" name="Adjacency">
   <a:themeElements>
-    <a:clrScheme name="Office">
+    <a:clrScheme name="Adjacency">
       <a:dk1>
-        <a:sysClr val="windowText" lastClr="000000"/>
+        <a:srgbClr val="2F2B20"/>
       </a:dk1>
       <a:lt1>
-        <a:sysClr val="window" lastClr="FFFFFF"/>
+        <a:srgbClr val="FFFFFF"/>
       </a:lt1>
       <a:dk2>
-        <a:srgbClr val="1F497D"/>
+        <a:srgbClr val="675E47"/>
       </a:dk2>
       <a:lt2>
-        <a:srgbClr val="EEECE1"/>
+        <a:srgbClr val="DFDCB7"/>
       </a:lt2>
       <a:accent1>
-        <a:srgbClr val="4F81BD"/>
+        <a:srgbClr val="A9A57C"/>
       </a:accent1>
       <a:accent2>
-        <a:srgbClr val="C0504D"/>
+        <a:srgbClr val="9CBEBD"/>
       </a:accent2>
       <a:accent3>
-        <a:srgbClr val="9BBB59"/>
+        <a:srgbClr val="D2CB6C"/>
       </a:accent3>
       <a:accent4>
-        <a:srgbClr val="8064A2"/>
+        <a:srgbClr val="95A39D"/>
       </a:accent4>
       <a:accent5>
-        <a:srgbClr val="4BACC6"/>
+        <a:srgbClr val="C89F5D"/>
       </a:accent5>
       <a:accent6>
-        <a:srgbClr val="F79646"/>
+        <a:srgbClr val="B1A089"/>
       </a:accent6>
       <a:hlink>
-        <a:srgbClr val="0000FF"/>
+        <a:srgbClr val="D25814"/>
       </a:hlink>
       <a:folHlink>
-        <a:srgbClr val="800080"/>
+        <a:srgbClr val="849A0A"/>
       </a:folHlink>
     </a:clrScheme>
     <a:fontScheme name="Office">
       <a:majorFont>
-        <a:latin typeface="Calibri"/>
+        <a:latin typeface="Cambria"/>
         <a:ea typeface=""/>
         <a:cs typeface=""/>
-        <a:font script="Jpan" typeface="ＭＳ Ｐゴシック"/>
+        <a:font script="Jpan" typeface="ＭＳ ゴシック"/>
         <a:font script="Hang" typeface="맑은 고딕"/>
         <a:font script="Hans" typeface="宋体"/>
         <a:font script="Hant" typeface="新細明體"/>
@@ -6630,12 +5838,13 @@
         <a:font script="Mong" typeface="Mongolian Baiti"/>
         <a:font script="Viet" typeface="Times New Roman"/>
         <a:font script="Uigh" typeface="Microsoft Uighur"/>
+        <a:font script="Geor" typeface="Sylfaen"/>
       </a:majorFont>
       <a:minorFont>
         <a:latin typeface="Calibri"/>
         <a:ea typeface=""/>
         <a:cs typeface=""/>
-        <a:font script="Jpan" typeface="ＭＳ Ｐゴシック"/>
+        <a:font script="Jpan" typeface="ＭＳ 明朝"/>
         <a:font script="Hang" typeface="맑은 고딕"/>
         <a:font script="Hans" typeface="宋体"/>
         <a:font script="Hant" typeface="新細明體"/>
@@ -6664,62 +5873,25 @@
         <a:font script="Mong" typeface="Mongolian Baiti"/>
         <a:font script="Viet" typeface="Arial"/>
         <a:font script="Uigh" typeface="Microsoft Uighur"/>
+        <a:font script="Geor" typeface="Sylfaen"/>
       </a:minorFont>
     </a:fontScheme>
-    <a:fmtScheme name="Office">
+    <a:fmtScheme name="Adjacency">
       <a:fillStyleLst>
         <a:solidFill>
           <a:schemeClr val="phClr"/>
         </a:solidFill>
-        <a:gradFill rotWithShape="1">
-          <a:gsLst>
-            <a:gs pos="0">
-              <a:schemeClr val="phClr">
-                <a:tint val="50000"/>
-                <a:satMod val="300000"/>
-              </a:schemeClr>
-            </a:gs>
-            <a:gs pos="35000">
-              <a:schemeClr val="phClr">
-                <a:tint val="37000"/>
-                <a:satMod val="300000"/>
-              </a:schemeClr>
-            </a:gs>
-            <a:gs pos="100000">
-              <a:schemeClr val="phClr">
-                <a:tint val="15000"/>
-                <a:satMod val="350000"/>
-              </a:schemeClr>
-            </a:gs>
-          </a:gsLst>
-          <a:lin ang="16200000" scaled="1"/>
-        </a:gradFill>
-        <a:gradFill rotWithShape="1">
-          <a:gsLst>
-            <a:gs pos="0">
-              <a:schemeClr val="phClr">
-                <a:shade val="51000"/>
-                <a:satMod val="130000"/>
-              </a:schemeClr>
-            </a:gs>
-            <a:gs pos="80000">
-              <a:schemeClr val="phClr">
-                <a:shade val="93000"/>
-                <a:satMod val="130000"/>
-              </a:schemeClr>
-            </a:gs>
-            <a:gs pos="100000">
-              <a:schemeClr val="phClr">
-                <a:shade val="94000"/>
-                <a:satMod val="135000"/>
-              </a:schemeClr>
-            </a:gs>
-          </a:gsLst>
-          <a:lin ang="16200000" scaled="0"/>
-        </a:gradFill>
+        <a:solidFill>
+          <a:schemeClr val="phClr">
+            <a:tint val="55000"/>
+          </a:schemeClr>
+        </a:solidFill>
+        <a:solidFill>
+          <a:schemeClr val="phClr"/>
+        </a:solidFill>
       </a:fillStyleLst>
       <a:lnStyleLst>
-        <a:ln w="9525" cap="flat" cmpd="sng" algn="ctr">
+        <a:ln w="12700" cap="flat" cmpd="sng" algn="ctr">
           <a:solidFill>
             <a:schemeClr val="phClr">
               <a:shade val="95000"/>
@@ -6743,41 +5915,35 @@
       </a:lnStyleLst>
       <a:effectStyleLst>
         <a:effectStyle>
+          <a:effectLst/>
+        </a:effectStyle>
+        <a:effectStyle>
           <a:effectLst>
-            <a:outerShdw blurRad="40000" dist="20000" dir="5400000" rotWithShape="0">
+            <a:outerShdw blurRad="50800" dist="25400" algn="bl" rotWithShape="0">
               <a:srgbClr val="000000">
-                <a:alpha val="38000"/>
+                <a:alpha val="60000"/>
               </a:srgbClr>
             </a:outerShdw>
           </a:effectLst>
         </a:effectStyle>
         <a:effectStyle>
-          <a:effectLst>
-            <a:outerShdw blurRad="40000" dist="23000" dir="5400000" rotWithShape="0">
-              <a:srgbClr val="000000">
-                <a:alpha val="35000"/>
-              </a:srgbClr>
-            </a:outerShdw>
-          </a:effectLst>
-        </a:effectStyle>
-        <a:effectStyle>
-          <a:effectLst>
-            <a:outerShdw blurRad="40000" dist="23000" dir="5400000" rotWithShape="0">
-              <a:srgbClr val="000000">
-                <a:alpha val="35000"/>
-              </a:srgbClr>
-            </a:outerShdw>
-          </a:effectLst>
+          <a:effectLst/>
           <a:scene3d>
             <a:camera prst="orthographicFront">
               <a:rot lat="0" lon="0" rev="0"/>
             </a:camera>
-            <a:lightRig rig="threePt" dir="t">
-              <a:rot lat="0" lon="0" rev="1200000"/>
+            <a:lightRig rig="brightRoom" dir="tl">
+              <a:rot lat="0" lon="0" rev="1800000"/>
             </a:lightRig>
           </a:scene3d>
-          <a:sp3d>
-            <a:bevelT w="63500" h="25400"/>
+          <a:sp3d contourW="10160" prstMaterial="dkEdge">
+            <a:bevelT w="38100" h="50800" prst="angle"/>
+            <a:contourClr>
+              <a:schemeClr val="phClr">
+                <a:shade val="40000"/>
+                <a:satMod val="150000"/>
+              </a:schemeClr>
+            </a:contourClr>
           </a:sp3d>
         </a:effectStyle>
       </a:effectStyleLst>
@@ -6789,47 +5955,39 @@
           <a:gsLst>
             <a:gs pos="0">
               <a:schemeClr val="phClr">
-                <a:tint val="40000"/>
-                <a:satMod val="350000"/>
+                <a:tint val="90000"/>
               </a:schemeClr>
             </a:gs>
-            <a:gs pos="40000">
+            <a:gs pos="75000">
               <a:schemeClr val="phClr">
-                <a:tint val="45000"/>
-                <a:shade val="99000"/>
-                <a:satMod val="350000"/>
+                <a:shade val="100000"/>
+                <a:satMod val="115000"/>
               </a:schemeClr>
             </a:gs>
             <a:gs pos="100000">
               <a:schemeClr val="phClr">
-                <a:shade val="20000"/>
-                <a:satMod val="255000"/>
+                <a:shade val="70000"/>
+                <a:satMod val="130000"/>
               </a:schemeClr>
             </a:gs>
           </a:gsLst>
           <a:path path="circle">
-            <a:fillToRect l="50000" t="-80000" r="50000" b="180000"/>
+            <a:fillToRect l="20000" t="50000" r="100000" b="50000"/>
           </a:path>
         </a:gradFill>
-        <a:gradFill rotWithShape="1">
-          <a:gsLst>
-            <a:gs pos="0">
+        <a:blipFill rotWithShape="1">
+          <a:blip xmlns:r="http://schemas.openxmlformats.org/officeDocument/2006/relationships" r:embed="rId1">
+            <a:duotone>
               <a:schemeClr val="phClr">
-                <a:tint val="80000"/>
-                <a:satMod val="300000"/>
+                <a:tint val="97000"/>
               </a:schemeClr>
-            </a:gs>
-            <a:gs pos="100000">
               <a:schemeClr val="phClr">
-                <a:shade val="30000"/>
-                <a:satMod val="200000"/>
+                <a:shade val="96000"/>
               </a:schemeClr>
-            </a:gs>
-          </a:gsLst>
-          <a:path path="circle">
-            <a:fillToRect l="50000" t="50000" r="50000" b="50000"/>
-          </a:path>
-        </a:gradFill>
+            </a:duotone>
+          </a:blip>
+          <a:tile tx="0" ty="0" sx="32000" sy="32000" flip="none" algn="tl"/>
+        </a:blipFill>
       </a:bgFillStyleLst>
     </a:fmtScheme>
   </a:themeElements>

</xml_diff>